<commit_message>
Added conductor & schematic sections
</commit_message>
<xml_diff>
--- a/Electronics 101.pptx
+++ b/Electronics 101.pptx
@@ -5,7 +5,7 @@
     <p:sldMasterId id="2147483660" r:id="rId1"/>
   </p:sldMasterIdLst>
   <p:notesMasterIdLst>
-    <p:notesMasterId r:id="rId35"/>
+    <p:notesMasterId r:id="rId43"/>
   </p:notesMasterIdLst>
   <p:sldIdLst>
     <p:sldId id="256" r:id="rId2"/>
@@ -24,23 +24,31 @@
     <p:sldId id="267" r:id="rId15"/>
     <p:sldId id="270" r:id="rId16"/>
     <p:sldId id="271" r:id="rId17"/>
-    <p:sldId id="272" r:id="rId18"/>
-    <p:sldId id="274" r:id="rId19"/>
-    <p:sldId id="273" r:id="rId20"/>
-    <p:sldId id="275" r:id="rId21"/>
-    <p:sldId id="283" r:id="rId22"/>
-    <p:sldId id="284" r:id="rId23"/>
-    <p:sldId id="285" r:id="rId24"/>
-    <p:sldId id="276" r:id="rId25"/>
-    <p:sldId id="277" r:id="rId26"/>
-    <p:sldId id="278" r:id="rId27"/>
-    <p:sldId id="279" r:id="rId28"/>
-    <p:sldId id="280" r:id="rId29"/>
-    <p:sldId id="281" r:id="rId30"/>
-    <p:sldId id="282" r:id="rId31"/>
-    <p:sldId id="286" r:id="rId32"/>
-    <p:sldId id="288" r:id="rId33"/>
-    <p:sldId id="287" r:id="rId34"/>
+    <p:sldId id="291" r:id="rId18"/>
+    <p:sldId id="292" r:id="rId19"/>
+    <p:sldId id="293" r:id="rId20"/>
+    <p:sldId id="294" r:id="rId21"/>
+    <p:sldId id="295" r:id="rId22"/>
+    <p:sldId id="296" r:id="rId23"/>
+    <p:sldId id="272" r:id="rId24"/>
+    <p:sldId id="274" r:id="rId25"/>
+    <p:sldId id="273" r:id="rId26"/>
+    <p:sldId id="275" r:id="rId27"/>
+    <p:sldId id="283" r:id="rId28"/>
+    <p:sldId id="284" r:id="rId29"/>
+    <p:sldId id="285" r:id="rId30"/>
+    <p:sldId id="276" r:id="rId31"/>
+    <p:sldId id="277" r:id="rId32"/>
+    <p:sldId id="278" r:id="rId33"/>
+    <p:sldId id="279" r:id="rId34"/>
+    <p:sldId id="280" r:id="rId35"/>
+    <p:sldId id="281" r:id="rId36"/>
+    <p:sldId id="282" r:id="rId37"/>
+    <p:sldId id="286" r:id="rId38"/>
+    <p:sldId id="288" r:id="rId39"/>
+    <p:sldId id="287" r:id="rId40"/>
+    <p:sldId id="289" r:id="rId41"/>
+    <p:sldId id="290" r:id="rId42"/>
   </p:sldIdLst>
   <p:sldSz cx="9144000" cy="6858000" type="screen4x3"/>
   <p:notesSz cx="6858000" cy="9144000"/>
@@ -9945,7 +9953,6 @@
               </a:p>
             </c:rich>
           </c:tx>
-          <c:layout/>
           <c:overlay val="0"/>
           <c:spPr>
             <a:noFill/>
@@ -10060,7 +10067,6 @@
               </a:p>
             </c:rich>
           </c:tx>
-          <c:layout/>
           <c:overlay val="0"/>
           <c:spPr>
             <a:noFill/>
@@ -21740,10 +21746,9 @@
           <a:lstStyle/>
           <a:p>
             <a:r>
-              <a:rPr lang="en-US" smtClean="0"/>
+              <a:rPr lang="en-US"/>
               <a:t>Click to edit Master title style</a:t>
             </a:r>
-            <a:endParaRPr lang="en-US"/>
           </a:p>
         </p:txBody>
       </p:sp>
@@ -21859,10 +21864,9 @@
           </a:lstStyle>
           <a:p>
             <a:r>
-              <a:rPr lang="en-US" smtClean="0"/>
+              <a:rPr lang="en-US"/>
               <a:t>Click to edit Master subtitle style</a:t>
             </a:r>
-            <a:endParaRPr lang="en-US"/>
           </a:p>
         </p:txBody>
       </p:sp>
@@ -21977,10 +21981,9 @@
           <a:lstStyle/>
           <a:p>
             <a:r>
-              <a:rPr lang="en-US" smtClean="0"/>
+              <a:rPr lang="en-US"/>
               <a:t>Click to edit Master title style</a:t>
             </a:r>
-            <a:endParaRPr lang="en-US"/>
           </a:p>
         </p:txBody>
       </p:sp>
@@ -22001,38 +22004,37 @@
           <a:p>
             <a:pPr lvl="0"/>
             <a:r>
-              <a:rPr lang="en-US" smtClean="0"/>
+              <a:rPr lang="en-US"/>
               <a:t>Edit Master text styles</a:t>
             </a:r>
           </a:p>
           <a:p>
             <a:pPr lvl="1"/>
             <a:r>
-              <a:rPr lang="en-US" smtClean="0"/>
+              <a:rPr lang="en-US"/>
               <a:t>Second level</a:t>
             </a:r>
           </a:p>
           <a:p>
             <a:pPr lvl="2"/>
             <a:r>
-              <a:rPr lang="en-US" smtClean="0"/>
+              <a:rPr lang="en-US"/>
               <a:t>Third level</a:t>
             </a:r>
           </a:p>
           <a:p>
             <a:pPr lvl="3"/>
             <a:r>
-              <a:rPr lang="en-US" smtClean="0"/>
+              <a:rPr lang="en-US"/>
               <a:t>Fourth level</a:t>
             </a:r>
           </a:p>
           <a:p>
             <a:pPr lvl="4"/>
             <a:r>
-              <a:rPr lang="en-US" smtClean="0"/>
+              <a:rPr lang="en-US"/>
               <a:t>Fifth level</a:t>
             </a:r>
-            <a:endParaRPr lang="en-US"/>
           </a:p>
         </p:txBody>
       </p:sp>
@@ -22152,10 +22154,9 @@
           <a:lstStyle/>
           <a:p>
             <a:r>
-              <a:rPr lang="en-US" smtClean="0"/>
+              <a:rPr lang="en-US"/>
               <a:t>Click to edit Master title style</a:t>
             </a:r>
-            <a:endParaRPr lang="en-US"/>
           </a:p>
         </p:txBody>
       </p:sp>
@@ -22181,38 +22182,37 @@
           <a:p>
             <a:pPr lvl="0"/>
             <a:r>
-              <a:rPr lang="en-US" smtClean="0"/>
+              <a:rPr lang="en-US"/>
               <a:t>Edit Master text styles</a:t>
             </a:r>
           </a:p>
           <a:p>
             <a:pPr lvl="1"/>
             <a:r>
-              <a:rPr lang="en-US" smtClean="0"/>
+              <a:rPr lang="en-US"/>
               <a:t>Second level</a:t>
             </a:r>
           </a:p>
           <a:p>
             <a:pPr lvl="2"/>
             <a:r>
-              <a:rPr lang="en-US" smtClean="0"/>
+              <a:rPr lang="en-US"/>
               <a:t>Third level</a:t>
             </a:r>
           </a:p>
           <a:p>
             <a:pPr lvl="3"/>
             <a:r>
-              <a:rPr lang="en-US" smtClean="0"/>
+              <a:rPr lang="en-US"/>
               <a:t>Fourth level</a:t>
             </a:r>
           </a:p>
           <a:p>
             <a:pPr lvl="4"/>
             <a:r>
-              <a:rPr lang="en-US" smtClean="0"/>
+              <a:rPr lang="en-US"/>
               <a:t>Fifth level</a:t>
             </a:r>
-            <a:endParaRPr lang="en-US"/>
           </a:p>
         </p:txBody>
       </p:sp>
@@ -22327,10 +22327,9 @@
           <a:lstStyle/>
           <a:p>
             <a:r>
-              <a:rPr lang="en-US" smtClean="0"/>
+              <a:rPr lang="en-US"/>
               <a:t>Click to edit Master title style</a:t>
             </a:r>
-            <a:endParaRPr lang="en-US"/>
           </a:p>
         </p:txBody>
       </p:sp>
@@ -22351,38 +22350,37 @@
           <a:p>
             <a:pPr lvl="0"/>
             <a:r>
-              <a:rPr lang="en-US" smtClean="0"/>
+              <a:rPr lang="en-US"/>
               <a:t>Edit Master text styles</a:t>
             </a:r>
           </a:p>
           <a:p>
             <a:pPr lvl="1"/>
             <a:r>
-              <a:rPr lang="en-US" smtClean="0"/>
+              <a:rPr lang="en-US"/>
               <a:t>Second level</a:t>
             </a:r>
           </a:p>
           <a:p>
             <a:pPr lvl="2"/>
             <a:r>
-              <a:rPr lang="en-US" smtClean="0"/>
+              <a:rPr lang="en-US"/>
               <a:t>Third level</a:t>
             </a:r>
           </a:p>
           <a:p>
             <a:pPr lvl="3"/>
             <a:r>
-              <a:rPr lang="en-US" smtClean="0"/>
+              <a:rPr lang="en-US"/>
               <a:t>Fourth level</a:t>
             </a:r>
           </a:p>
           <a:p>
             <a:pPr lvl="4"/>
             <a:r>
-              <a:rPr lang="en-US" smtClean="0"/>
+              <a:rPr lang="en-US"/>
               <a:t>Fifth level</a:t>
             </a:r>
-            <a:endParaRPr lang="en-US"/>
           </a:p>
         </p:txBody>
       </p:sp>
@@ -22506,10 +22504,9 @@
           </a:lstStyle>
           <a:p>
             <a:r>
-              <a:rPr lang="en-US" smtClean="0"/>
+              <a:rPr lang="en-US"/>
               <a:t>Click to edit Master title style</a:t>
             </a:r>
-            <a:endParaRPr lang="en-US"/>
           </a:p>
         </p:txBody>
       </p:sp>
@@ -22626,7 +22623,7 @@
           <a:p>
             <a:pPr lvl="0"/>
             <a:r>
-              <a:rPr lang="en-US" smtClean="0"/>
+              <a:rPr lang="en-US"/>
               <a:t>Edit Master text styles</a:t>
             </a:r>
           </a:p>
@@ -22743,10 +22740,9 @@
           <a:lstStyle/>
           <a:p>
             <a:r>
-              <a:rPr lang="en-US" smtClean="0"/>
+              <a:rPr lang="en-US"/>
               <a:t>Click to edit Master title style</a:t>
             </a:r>
-            <a:endParaRPr lang="en-US"/>
           </a:p>
         </p:txBody>
       </p:sp>
@@ -22800,38 +22796,37 @@
           <a:p>
             <a:pPr lvl="0"/>
             <a:r>
-              <a:rPr lang="en-US" smtClean="0"/>
+              <a:rPr lang="en-US"/>
               <a:t>Edit Master text styles</a:t>
             </a:r>
           </a:p>
           <a:p>
             <a:pPr lvl="1"/>
             <a:r>
-              <a:rPr lang="en-US" smtClean="0"/>
+              <a:rPr lang="en-US"/>
               <a:t>Second level</a:t>
             </a:r>
           </a:p>
           <a:p>
             <a:pPr lvl="2"/>
             <a:r>
-              <a:rPr lang="en-US" smtClean="0"/>
+              <a:rPr lang="en-US"/>
               <a:t>Third level</a:t>
             </a:r>
           </a:p>
           <a:p>
             <a:pPr lvl="3"/>
             <a:r>
-              <a:rPr lang="en-US" smtClean="0"/>
+              <a:rPr lang="en-US"/>
               <a:t>Fourth level</a:t>
             </a:r>
           </a:p>
           <a:p>
             <a:pPr lvl="4"/>
             <a:r>
-              <a:rPr lang="en-US" smtClean="0"/>
+              <a:rPr lang="en-US"/>
               <a:t>Fifth level</a:t>
             </a:r>
-            <a:endParaRPr lang="en-US"/>
           </a:p>
         </p:txBody>
       </p:sp>
@@ -22885,38 +22880,37 @@
           <a:p>
             <a:pPr lvl="0"/>
             <a:r>
-              <a:rPr lang="en-US" smtClean="0"/>
+              <a:rPr lang="en-US"/>
               <a:t>Edit Master text styles</a:t>
             </a:r>
           </a:p>
           <a:p>
             <a:pPr lvl="1"/>
             <a:r>
-              <a:rPr lang="en-US" smtClean="0"/>
+              <a:rPr lang="en-US"/>
               <a:t>Second level</a:t>
             </a:r>
           </a:p>
           <a:p>
             <a:pPr lvl="2"/>
             <a:r>
-              <a:rPr lang="en-US" smtClean="0"/>
+              <a:rPr lang="en-US"/>
               <a:t>Third level</a:t>
             </a:r>
           </a:p>
           <a:p>
             <a:pPr lvl="3"/>
             <a:r>
-              <a:rPr lang="en-US" smtClean="0"/>
+              <a:rPr lang="en-US"/>
               <a:t>Fourth level</a:t>
             </a:r>
           </a:p>
           <a:p>
             <a:pPr lvl="4"/>
             <a:r>
-              <a:rPr lang="en-US" smtClean="0"/>
+              <a:rPr lang="en-US"/>
               <a:t>Fifth level</a:t>
             </a:r>
-            <a:endParaRPr lang="en-US"/>
           </a:p>
         </p:txBody>
       </p:sp>
@@ -23035,10 +23029,9 @@
           </a:lstStyle>
           <a:p>
             <a:r>
-              <a:rPr lang="en-US" smtClean="0"/>
+              <a:rPr lang="en-US"/>
               <a:t>Click to edit Master title style</a:t>
             </a:r>
-            <a:endParaRPr lang="en-US"/>
           </a:p>
         </p:txBody>
       </p:sp>
@@ -23101,7 +23094,7 @@
           <a:p>
             <a:pPr lvl="0"/>
             <a:r>
-              <a:rPr lang="en-US" smtClean="0"/>
+              <a:rPr lang="en-US"/>
               <a:t>Edit Master text styles</a:t>
             </a:r>
           </a:p>
@@ -23157,38 +23150,37 @@
           <a:p>
             <a:pPr lvl="0"/>
             <a:r>
-              <a:rPr lang="en-US" smtClean="0"/>
+              <a:rPr lang="en-US"/>
               <a:t>Edit Master text styles</a:t>
             </a:r>
           </a:p>
           <a:p>
             <a:pPr lvl="1"/>
             <a:r>
-              <a:rPr lang="en-US" smtClean="0"/>
+              <a:rPr lang="en-US"/>
               <a:t>Second level</a:t>
             </a:r>
           </a:p>
           <a:p>
             <a:pPr lvl="2"/>
             <a:r>
-              <a:rPr lang="en-US" smtClean="0"/>
+              <a:rPr lang="en-US"/>
               <a:t>Third level</a:t>
             </a:r>
           </a:p>
           <a:p>
             <a:pPr lvl="3"/>
             <a:r>
-              <a:rPr lang="en-US" smtClean="0"/>
+              <a:rPr lang="en-US"/>
               <a:t>Fourth level</a:t>
             </a:r>
           </a:p>
           <a:p>
             <a:pPr lvl="4"/>
             <a:r>
-              <a:rPr lang="en-US" smtClean="0"/>
+              <a:rPr lang="en-US"/>
               <a:t>Fifth level</a:t>
             </a:r>
-            <a:endParaRPr lang="en-US"/>
           </a:p>
         </p:txBody>
       </p:sp>
@@ -23251,7 +23243,7 @@
           <a:p>
             <a:pPr lvl="0"/>
             <a:r>
-              <a:rPr lang="en-US" smtClean="0"/>
+              <a:rPr lang="en-US"/>
               <a:t>Edit Master text styles</a:t>
             </a:r>
           </a:p>
@@ -23307,38 +23299,37 @@
           <a:p>
             <a:pPr lvl="0"/>
             <a:r>
-              <a:rPr lang="en-US" smtClean="0"/>
+              <a:rPr lang="en-US"/>
               <a:t>Edit Master text styles</a:t>
             </a:r>
           </a:p>
           <a:p>
             <a:pPr lvl="1"/>
             <a:r>
-              <a:rPr lang="en-US" smtClean="0"/>
+              <a:rPr lang="en-US"/>
               <a:t>Second level</a:t>
             </a:r>
           </a:p>
           <a:p>
             <a:pPr lvl="2"/>
             <a:r>
-              <a:rPr lang="en-US" smtClean="0"/>
+              <a:rPr lang="en-US"/>
               <a:t>Third level</a:t>
             </a:r>
           </a:p>
           <a:p>
             <a:pPr lvl="3"/>
             <a:r>
-              <a:rPr lang="en-US" smtClean="0"/>
+              <a:rPr lang="en-US"/>
               <a:t>Fourth level</a:t>
             </a:r>
           </a:p>
           <a:p>
             <a:pPr lvl="4"/>
             <a:r>
-              <a:rPr lang="en-US" smtClean="0"/>
+              <a:rPr lang="en-US"/>
               <a:t>Fifth level</a:t>
             </a:r>
-            <a:endParaRPr lang="en-US"/>
           </a:p>
         </p:txBody>
       </p:sp>
@@ -23453,10 +23444,9 @@
           <a:lstStyle/>
           <a:p>
             <a:r>
-              <a:rPr lang="en-US" smtClean="0"/>
+              <a:rPr lang="en-US"/>
               <a:t>Click to edit Master title style</a:t>
             </a:r>
-            <a:endParaRPr lang="en-US"/>
           </a:p>
         </p:txBody>
       </p:sp>
@@ -23675,10 +23665,9 @@
           </a:lstStyle>
           <a:p>
             <a:r>
-              <a:rPr lang="en-US" smtClean="0"/>
+              <a:rPr lang="en-US"/>
               <a:t>Click to edit Master title style</a:t>
             </a:r>
-            <a:endParaRPr lang="en-US"/>
           </a:p>
         </p:txBody>
       </p:sp>
@@ -23732,38 +23721,37 @@
           <a:p>
             <a:pPr lvl="0"/>
             <a:r>
-              <a:rPr lang="en-US" smtClean="0"/>
+              <a:rPr lang="en-US"/>
               <a:t>Edit Master text styles</a:t>
             </a:r>
           </a:p>
           <a:p>
             <a:pPr lvl="1"/>
             <a:r>
-              <a:rPr lang="en-US" smtClean="0"/>
+              <a:rPr lang="en-US"/>
               <a:t>Second level</a:t>
             </a:r>
           </a:p>
           <a:p>
             <a:pPr lvl="2"/>
             <a:r>
-              <a:rPr lang="en-US" smtClean="0"/>
+              <a:rPr lang="en-US"/>
               <a:t>Third level</a:t>
             </a:r>
           </a:p>
           <a:p>
             <a:pPr lvl="3"/>
             <a:r>
-              <a:rPr lang="en-US" smtClean="0"/>
+              <a:rPr lang="en-US"/>
               <a:t>Fourth level</a:t>
             </a:r>
           </a:p>
           <a:p>
             <a:pPr lvl="4"/>
             <a:r>
-              <a:rPr lang="en-US" smtClean="0"/>
+              <a:rPr lang="en-US"/>
               <a:t>Fifth level</a:t>
             </a:r>
-            <a:endParaRPr lang="en-US"/>
           </a:p>
         </p:txBody>
       </p:sp>
@@ -23826,7 +23814,7 @@
           <a:p>
             <a:pPr lvl="0"/>
             <a:r>
-              <a:rPr lang="en-US" smtClean="0"/>
+              <a:rPr lang="en-US"/>
               <a:t>Edit Master text styles</a:t>
             </a:r>
           </a:p>
@@ -23952,10 +23940,9 @@
           </a:lstStyle>
           <a:p>
             <a:r>
-              <a:rPr lang="en-US" smtClean="0"/>
+              <a:rPr lang="en-US"/>
               <a:t>Click to edit Master title style</a:t>
             </a:r>
-            <a:endParaRPr lang="en-US"/>
           </a:p>
         </p:txBody>
       </p:sp>
@@ -24017,10 +24004,9 @@
           </a:lstStyle>
           <a:p>
             <a:r>
-              <a:rPr lang="en-US" smtClean="0"/>
+              <a:rPr lang="en-US"/>
               <a:t>Click icon to add picture</a:t>
             </a:r>
-            <a:endParaRPr lang="en-US"/>
           </a:p>
         </p:txBody>
       </p:sp>
@@ -24083,7 +24069,7 @@
           <a:p>
             <a:pPr lvl="0"/>
             <a:r>
-              <a:rPr lang="en-US" smtClean="0"/>
+              <a:rPr lang="en-US"/>
               <a:t>Edit Master text styles</a:t>
             </a:r>
           </a:p>
@@ -24218,7 +24204,7 @@
           <a:lstStyle/>
           <a:p>
             <a:r>
-              <a:rPr lang="en-US" smtClean="0"/>
+              <a:rPr lang="en-US"/>
               <a:t>Click to edit Master title style</a:t>
             </a:r>
             <a:endParaRPr lang="en-US" dirty="0"/>
@@ -24252,35 +24238,35 @@
           <a:p>
             <a:pPr lvl="0"/>
             <a:r>
-              <a:rPr lang="en-US" smtClean="0"/>
+              <a:rPr lang="en-US"/>
               <a:t>Edit Master text styles</a:t>
             </a:r>
           </a:p>
           <a:p>
             <a:pPr lvl="1"/>
             <a:r>
-              <a:rPr lang="en-US" smtClean="0"/>
+              <a:rPr lang="en-US"/>
               <a:t>Second level</a:t>
             </a:r>
           </a:p>
           <a:p>
             <a:pPr lvl="2"/>
             <a:r>
-              <a:rPr lang="en-US" smtClean="0"/>
+              <a:rPr lang="en-US"/>
               <a:t>Third level</a:t>
             </a:r>
           </a:p>
           <a:p>
             <a:pPr lvl="3"/>
             <a:r>
-              <a:rPr lang="en-US" smtClean="0"/>
+              <a:rPr lang="en-US"/>
               <a:t>Fourth level</a:t>
             </a:r>
           </a:p>
           <a:p>
             <a:pPr lvl="4"/>
             <a:r>
-              <a:rPr lang="en-US" smtClean="0"/>
+              <a:rPr lang="en-US"/>
               <a:t>Fifth level</a:t>
             </a:r>
             <a:endParaRPr lang="en-US" dirty="0"/>
@@ -24786,13 +24772,6 @@
   <p:clrMapOvr>
     <a:masterClrMapping/>
   </p:clrMapOvr>
-  <p:timing>
-    <p:tnLst>
-      <p:par>
-        <p:cTn id="1" dur="indefinite" restart="never" nodeType="tmRoot"/>
-      </p:par>
-    </p:tnLst>
-  </p:timing>
 </p:sld>
 </file>
 
@@ -24876,9 +24855,12 @@
             </a:r>
             <a:r>
               <a:rPr lang="en-US" i="1" dirty="0"/>
-              <a:t>V</a:t>
+              <a:t>V </a:t>
             </a:r>
-            <a:endParaRPr lang="en-US" dirty="0"/>
+            <a:r>
+              <a:rPr lang="en-US" dirty="0"/>
+              <a:t>(also occasionally U or E, in older documents)</a:t>
+            </a:r>
           </a:p>
           <a:p>
             <a:r>
@@ -24997,13 +24979,6 @@
   <p:clrMapOvr>
     <a:masterClrMapping/>
   </p:clrMapOvr>
-  <p:timing>
-    <p:tnLst>
-      <p:par>
-        <p:cTn id="1" dur="indefinite" restart="never" nodeType="tmRoot"/>
-      </p:par>
-    </p:tnLst>
-  </p:timing>
 </p:sld>
 </file>
 
@@ -25219,16 +25194,12 @@
           </a:bodyPr>
           <a:lstStyle/>
           <a:p>
-            <a:endParaRPr lang="en-US" dirty="0" smtClean="0"/>
+            <a:endParaRPr lang="en-US" dirty="0"/>
           </a:p>
           <a:p>
             <a:r>
-              <a:rPr lang="en-US" dirty="0" smtClean="0"/>
-              <a:t>12 </a:t>
-            </a:r>
-            <a:r>
               <a:rPr lang="en-US" dirty="0"/>
-              <a:t>V</a:t>
+              <a:t>12 V</a:t>
             </a:r>
           </a:p>
         </p:txBody>
@@ -25333,13 +25304,6 @@
   <p:clrMapOvr>
     <a:masterClrMapping/>
   </p:clrMapOvr>
-  <p:timing>
-    <p:tnLst>
-      <p:par>
-        <p:cTn id="1" dur="indefinite" restart="never" nodeType="tmRoot"/>
-      </p:par>
-    </p:tnLst>
-  </p:timing>
 </p:sld>
 </file>
 
@@ -25444,13 +25408,6 @@
   <p:clrMapOvr>
     <a:masterClrMapping/>
   </p:clrMapOvr>
-  <p:timing>
-    <p:tnLst>
-      <p:par>
-        <p:cTn id="1" dur="indefinite" restart="never" nodeType="tmRoot"/>
-      </p:par>
-    </p:tnLst>
-  </p:timing>
 </p:sld>
 </file>
 
@@ -25570,13 +25527,6 @@
   <p:clrMapOvr>
     <a:masterClrMapping/>
   </p:clrMapOvr>
-  <p:timing>
-    <p:tnLst>
-      <p:par>
-        <p:cTn id="1" dur="indefinite" restart="never" nodeType="tmRoot"/>
-      </p:par>
-    </p:tnLst>
-  </p:timing>
 </p:sld>
 </file>
 
@@ -26033,13 +25983,6 @@
   <p:clrMapOvr>
     <a:masterClrMapping/>
   </p:clrMapOvr>
-  <p:timing>
-    <p:tnLst>
-      <p:par>
-        <p:cTn id="1" dur="indefinite" restart="never" nodeType="tmRoot"/>
-      </p:par>
-    </p:tnLst>
-  </p:timing>
 </p:sld>
 </file>
 
@@ -26169,13 +26112,6 @@
   <p:clrMapOvr>
     <a:masterClrMapping/>
   </p:clrMapOvr>
-  <p:timing>
-    <p:tnLst>
-      <p:par>
-        <p:cTn id="1" dur="indefinite" restart="never" nodeType="tmRoot"/>
-      </p:par>
-    </p:tnLst>
-  </p:timing>
 </p:sld>
 </file>
 
@@ -26495,17 +26431,1012 @@
   <p:clrMapOvr>
     <a:masterClrMapping/>
   </p:clrMapOvr>
-  <p:timing>
-    <p:tnLst>
-      <p:par>
-        <p:cTn id="1" dur="indefinite" restart="never" nodeType="tmRoot"/>
-      </p:par>
-    </p:tnLst>
-  </p:timing>
 </p:sld>
 </file>
 
 <file path=ppt/slides/slide17.xml><?xml version="1.0" encoding="utf-8"?>
+<p:sld xmlns:a="http://schemas.openxmlformats.org/drawingml/2006/main" xmlns:r="http://schemas.openxmlformats.org/officeDocument/2006/relationships" xmlns:p="http://schemas.openxmlformats.org/presentationml/2006/main">
+  <p:cSld>
+    <p:spTree>
+      <p:nvGrpSpPr>
+        <p:cNvPr id="1" name=""/>
+        <p:cNvGrpSpPr/>
+        <p:nvPr/>
+      </p:nvGrpSpPr>
+      <p:grpSpPr>
+        <a:xfrm>
+          <a:off x="0" y="0"/>
+          <a:ext cx="0" cy="0"/>
+          <a:chOff x="0" y="0"/>
+          <a:chExt cx="0" cy="0"/>
+        </a:xfrm>
+      </p:grpSpPr>
+      <p:sp>
+        <p:nvSpPr>
+          <p:cNvPr id="2" name="Title 1">
+            <a:extLst>
+              <a:ext uri="{FF2B5EF4-FFF2-40B4-BE49-F238E27FC236}">
+                <a16:creationId xmlns:a16="http://schemas.microsoft.com/office/drawing/2014/main" id="{0454EF7B-0EDC-49F3-9706-AB735756782D}"/>
+              </a:ext>
+            </a:extLst>
+          </p:cNvPr>
+          <p:cNvSpPr>
+            <a:spLocks noGrp="1"/>
+          </p:cNvSpPr>
+          <p:nvPr>
+            <p:ph type="title"/>
+          </p:nvPr>
+        </p:nvSpPr>
+        <p:spPr/>
+        <p:txBody>
+          <a:bodyPr/>
+          <a:lstStyle/>
+          <a:p>
+            <a:r>
+              <a:rPr lang="en-US" dirty="0"/>
+              <a:t>Conductors &amp; Insulators</a:t>
+            </a:r>
+          </a:p>
+        </p:txBody>
+      </p:sp>
+      <p:sp>
+        <p:nvSpPr>
+          <p:cNvPr id="3" name="Content Placeholder 2">
+            <a:extLst>
+              <a:ext uri="{FF2B5EF4-FFF2-40B4-BE49-F238E27FC236}">
+                <a16:creationId xmlns:a16="http://schemas.microsoft.com/office/drawing/2014/main" id="{8D84A34D-A1F7-4FE4-9730-FBFF39AF091C}"/>
+              </a:ext>
+            </a:extLst>
+          </p:cNvPr>
+          <p:cNvSpPr>
+            <a:spLocks noGrp="1"/>
+          </p:cNvSpPr>
+          <p:nvPr>
+            <p:ph idx="1"/>
+          </p:nvPr>
+        </p:nvSpPr>
+        <p:spPr/>
+        <p:txBody>
+          <a:bodyPr>
+            <a:normAutofit/>
+          </a:bodyPr>
+          <a:lstStyle/>
+          <a:p>
+            <a:r>
+              <a:rPr lang="en-US" dirty="0"/>
+              <a:t>Conductors are materials through which current can easily flow</a:t>
+            </a:r>
+          </a:p>
+          <a:p>
+            <a:pPr lvl="1"/>
+            <a:r>
+              <a:rPr lang="en-US" dirty="0"/>
+              <a:t>Metals, saltwater, certain forms of carbon</a:t>
+            </a:r>
+          </a:p>
+          <a:p>
+            <a:r>
+              <a:rPr lang="en-US" dirty="0"/>
+              <a:t>Insulators do not allow current to flow through them*</a:t>
+            </a:r>
+          </a:p>
+          <a:p>
+            <a:pPr lvl="1"/>
+            <a:r>
+              <a:rPr lang="en-US" dirty="0"/>
+              <a:t>Rubber, wood, air…</a:t>
+            </a:r>
+          </a:p>
+          <a:p>
+            <a:pPr lvl="1"/>
+            <a:r>
+              <a:rPr lang="en-US" dirty="0"/>
+              <a:t>*Technically, they don’t allow </a:t>
+            </a:r>
+            <a:r>
+              <a:rPr lang="en-US" i="1" dirty="0"/>
+              <a:t>much</a:t>
+            </a:r>
+            <a:r>
+              <a:rPr lang="en-US" dirty="0"/>
+              <a:t> current to flow, i.e., they have high resistance</a:t>
+            </a:r>
+          </a:p>
+        </p:txBody>
+      </p:sp>
+    </p:spTree>
+    <p:extLst>
+      <p:ext uri="{BB962C8B-B14F-4D97-AF65-F5344CB8AC3E}">
+        <p14:creationId xmlns:p14="http://schemas.microsoft.com/office/powerpoint/2010/main" val="4072301746"/>
+      </p:ext>
+    </p:extLst>
+  </p:cSld>
+  <p:clrMapOvr>
+    <a:masterClrMapping/>
+  </p:clrMapOvr>
+</p:sld>
+</file>
+
+<file path=ppt/slides/slide18.xml><?xml version="1.0" encoding="utf-8"?>
+<p:sld xmlns:a="http://schemas.openxmlformats.org/drawingml/2006/main" xmlns:r="http://schemas.openxmlformats.org/officeDocument/2006/relationships" xmlns:p="http://schemas.openxmlformats.org/presentationml/2006/main">
+  <p:cSld>
+    <p:spTree>
+      <p:nvGrpSpPr>
+        <p:cNvPr id="1" name=""/>
+        <p:cNvGrpSpPr/>
+        <p:nvPr/>
+      </p:nvGrpSpPr>
+      <p:grpSpPr>
+        <a:xfrm>
+          <a:off x="0" y="0"/>
+          <a:ext cx="0" cy="0"/>
+          <a:chOff x="0" y="0"/>
+          <a:chExt cx="0" cy="0"/>
+        </a:xfrm>
+      </p:grpSpPr>
+      <p:sp>
+        <p:nvSpPr>
+          <p:cNvPr id="2" name="Title 1">
+            <a:extLst>
+              <a:ext uri="{FF2B5EF4-FFF2-40B4-BE49-F238E27FC236}">
+                <a16:creationId xmlns:a16="http://schemas.microsoft.com/office/drawing/2014/main" id="{2AEDF444-AD43-486D-BDAA-157FCE5DF74A}"/>
+              </a:ext>
+            </a:extLst>
+          </p:cNvPr>
+          <p:cNvSpPr>
+            <a:spLocks noGrp="1"/>
+          </p:cNvSpPr>
+          <p:nvPr>
+            <p:ph type="title"/>
+          </p:nvPr>
+        </p:nvSpPr>
+        <p:spPr/>
+        <p:txBody>
+          <a:bodyPr/>
+          <a:lstStyle/>
+          <a:p>
+            <a:r>
+              <a:rPr lang="en-US" dirty="0"/>
+              <a:t>Wires</a:t>
+            </a:r>
+          </a:p>
+        </p:txBody>
+      </p:sp>
+      <p:sp>
+        <p:nvSpPr>
+          <p:cNvPr id="3" name="Content Placeholder 2">
+            <a:extLst>
+              <a:ext uri="{FF2B5EF4-FFF2-40B4-BE49-F238E27FC236}">
+                <a16:creationId xmlns:a16="http://schemas.microsoft.com/office/drawing/2014/main" id="{E77D993E-9833-4421-B93C-35052CA8C3CD}"/>
+              </a:ext>
+            </a:extLst>
+          </p:cNvPr>
+          <p:cNvSpPr>
+            <a:spLocks noGrp="1"/>
+          </p:cNvSpPr>
+          <p:nvPr>
+            <p:ph idx="1"/>
+          </p:nvPr>
+        </p:nvSpPr>
+        <p:spPr/>
+        <p:txBody>
+          <a:bodyPr/>
+          <a:lstStyle/>
+          <a:p>
+            <a:r>
+              <a:rPr lang="en-US" dirty="0"/>
+              <a:t>Wires are how you make current go where you want it to</a:t>
+            </a:r>
+          </a:p>
+          <a:p>
+            <a:r>
+              <a:rPr lang="en-US" dirty="0"/>
+              <a:t>They’re generally made of a metal wire (solid) or several smaller wires twisted together (stranded)</a:t>
+            </a:r>
+          </a:p>
+          <a:p>
+            <a:r>
+              <a:rPr lang="en-US" dirty="0"/>
+              <a:t>Wires are usually coated in an insulator, to keep current from going where you don’t want it to</a:t>
+            </a:r>
+          </a:p>
+          <a:p>
+            <a:endParaRPr lang="en-US" dirty="0"/>
+          </a:p>
+        </p:txBody>
+      </p:sp>
+    </p:spTree>
+    <p:extLst>
+      <p:ext uri="{BB962C8B-B14F-4D97-AF65-F5344CB8AC3E}">
+        <p14:creationId xmlns:p14="http://schemas.microsoft.com/office/powerpoint/2010/main" val="4106520645"/>
+      </p:ext>
+    </p:extLst>
+  </p:cSld>
+  <p:clrMapOvr>
+    <a:masterClrMapping/>
+  </p:clrMapOvr>
+</p:sld>
+</file>
+
+<file path=ppt/slides/slide19.xml><?xml version="1.0" encoding="utf-8"?>
+<p:sld xmlns:a="http://schemas.openxmlformats.org/drawingml/2006/main" xmlns:r="http://schemas.openxmlformats.org/officeDocument/2006/relationships" xmlns:p="http://schemas.openxmlformats.org/presentationml/2006/main">
+  <p:cSld>
+    <p:spTree>
+      <p:nvGrpSpPr>
+        <p:cNvPr id="1" name=""/>
+        <p:cNvGrpSpPr/>
+        <p:nvPr/>
+      </p:nvGrpSpPr>
+      <p:grpSpPr>
+        <a:xfrm>
+          <a:off x="0" y="0"/>
+          <a:ext cx="0" cy="0"/>
+          <a:chOff x="0" y="0"/>
+          <a:chExt cx="0" cy="0"/>
+        </a:xfrm>
+      </p:grpSpPr>
+      <p:sp>
+        <p:nvSpPr>
+          <p:cNvPr id="2" name="Title 1">
+            <a:extLst>
+              <a:ext uri="{FF2B5EF4-FFF2-40B4-BE49-F238E27FC236}">
+                <a16:creationId xmlns:a16="http://schemas.microsoft.com/office/drawing/2014/main" id="{F730DA23-9A7B-4D05-803B-08403E83690E}"/>
+              </a:ext>
+            </a:extLst>
+          </p:cNvPr>
+          <p:cNvSpPr>
+            <a:spLocks noGrp="1"/>
+          </p:cNvSpPr>
+          <p:nvPr>
+            <p:ph type="title"/>
+          </p:nvPr>
+        </p:nvSpPr>
+        <p:spPr/>
+        <p:txBody>
+          <a:bodyPr/>
+          <a:lstStyle/>
+          <a:p>
+            <a:r>
+              <a:rPr lang="en-US" dirty="0"/>
+              <a:t>Schematics</a:t>
+            </a:r>
+          </a:p>
+        </p:txBody>
+      </p:sp>
+      <p:sp>
+        <p:nvSpPr>
+          <p:cNvPr id="3" name="Content Placeholder 2">
+            <a:extLst>
+              <a:ext uri="{FF2B5EF4-FFF2-40B4-BE49-F238E27FC236}">
+                <a16:creationId xmlns:a16="http://schemas.microsoft.com/office/drawing/2014/main" id="{9E8E02C8-640D-4A13-B01F-41846FC62510}"/>
+              </a:ext>
+            </a:extLst>
+          </p:cNvPr>
+          <p:cNvSpPr>
+            <a:spLocks noGrp="1"/>
+          </p:cNvSpPr>
+          <p:nvPr>
+            <p:ph idx="1"/>
+          </p:nvPr>
+        </p:nvSpPr>
+        <p:spPr>
+          <a:xfrm>
+            <a:off x="457200" y="1600202"/>
+            <a:ext cx="5179333" cy="4983160"/>
+          </a:xfrm>
+        </p:spPr>
+        <p:txBody>
+          <a:bodyPr>
+            <a:normAutofit lnSpcReduction="10000"/>
+          </a:bodyPr>
+          <a:lstStyle/>
+          <a:p>
+            <a:r>
+              <a:rPr lang="en-US" dirty="0"/>
+              <a:t>Schematics are a way of showing how a circuit is constructed</a:t>
+            </a:r>
+          </a:p>
+          <a:p>
+            <a:pPr lvl="1"/>
+            <a:r>
+              <a:rPr lang="en-US" dirty="0"/>
+              <a:t>Use standard symbols for components (resistors, capacitors, etc.)</a:t>
+            </a:r>
+          </a:p>
+          <a:p>
+            <a:pPr lvl="1"/>
+            <a:r>
+              <a:rPr lang="en-US" dirty="0"/>
+              <a:t>Are made up of components connected together by lines</a:t>
+            </a:r>
+          </a:p>
+          <a:p>
+            <a:pPr lvl="2"/>
+            <a:r>
+              <a:rPr lang="en-US" dirty="0"/>
+              <a:t>Lines are considered perfect conductors, i.e., zero resistance</a:t>
+            </a:r>
+          </a:p>
+        </p:txBody>
+      </p:sp>
+      <p:pic>
+        <p:nvPicPr>
+          <p:cNvPr id="2050" name="Picture 2" descr="https://upload.wikimedia.org/wikipedia/commons/8/80/Circuit_diagram_%E2%80%93_pictorial_and_schematic.png">
+            <a:extLst>
+              <a:ext uri="{FF2B5EF4-FFF2-40B4-BE49-F238E27FC236}">
+                <a16:creationId xmlns:a16="http://schemas.microsoft.com/office/drawing/2014/main" id="{E645D13E-59B2-434D-A7C6-32CBC8A441AF}"/>
+              </a:ext>
+            </a:extLst>
+          </p:cNvPr>
+          <p:cNvPicPr>
+            <a:picLocks noChangeAspect="1" noChangeArrowheads="1"/>
+          </p:cNvPicPr>
+          <p:nvPr/>
+        </p:nvPicPr>
+        <p:blipFill>
+          <a:blip r:embed="rId2">
+            <a:extLst>
+              <a:ext uri="{28A0092B-C50C-407E-A947-70E740481C1C}">
+                <a14:useLocalDpi xmlns:a14="http://schemas.microsoft.com/office/drawing/2010/main" val="0"/>
+              </a:ext>
+            </a:extLst>
+          </a:blip>
+          <a:srcRect/>
+          <a:stretch>
+            <a:fillRect/>
+          </a:stretch>
+        </p:blipFill>
+        <p:spPr bwMode="auto">
+          <a:xfrm>
+            <a:off x="5636533" y="1417638"/>
+            <a:ext cx="3365136" cy="4658768"/>
+          </a:xfrm>
+          <a:prstGeom prst="rect">
+            <a:avLst/>
+          </a:prstGeom>
+          <a:noFill/>
+          <a:extLst>
+            <a:ext uri="{909E8E84-426E-40DD-AFC4-6F175D3DCCD1}">
+              <a14:hiddenFill xmlns:a14="http://schemas.microsoft.com/office/drawing/2010/main">
+                <a:solidFill>
+                  <a:srgbClr val="FFFFFF"/>
+                </a:solidFill>
+              </a14:hiddenFill>
+            </a:ext>
+          </a:extLst>
+        </p:spPr>
+      </p:pic>
+    </p:spTree>
+    <p:extLst>
+      <p:ext uri="{BB962C8B-B14F-4D97-AF65-F5344CB8AC3E}">
+        <p14:creationId xmlns:p14="http://schemas.microsoft.com/office/powerpoint/2010/main" val="4016623576"/>
+      </p:ext>
+    </p:extLst>
+  </p:cSld>
+  <p:clrMapOvr>
+    <a:masterClrMapping/>
+  </p:clrMapOvr>
+</p:sld>
+</file>
+
+<file path=ppt/slides/slide2.xml><?xml version="1.0" encoding="utf-8"?>
+<p:sld xmlns:a="http://schemas.openxmlformats.org/drawingml/2006/main" xmlns:r="http://schemas.openxmlformats.org/officeDocument/2006/relationships" xmlns:p="http://schemas.openxmlformats.org/presentationml/2006/main">
+  <p:cSld>
+    <p:spTree>
+      <p:nvGrpSpPr>
+        <p:cNvPr id="1" name=""/>
+        <p:cNvGrpSpPr/>
+        <p:nvPr/>
+      </p:nvGrpSpPr>
+      <p:grpSpPr>
+        <a:xfrm>
+          <a:off x="0" y="0"/>
+          <a:ext cx="0" cy="0"/>
+          <a:chOff x="0" y="0"/>
+          <a:chExt cx="0" cy="0"/>
+        </a:xfrm>
+      </p:grpSpPr>
+      <p:sp>
+        <p:nvSpPr>
+          <p:cNvPr id="2" name="Title 1">
+            <a:extLst>
+              <a:ext uri="{FF2B5EF4-FFF2-40B4-BE49-F238E27FC236}">
+                <a16:creationId xmlns:a16="http://schemas.microsoft.com/office/drawing/2014/main" id="{4A4E1BC3-7067-42A7-86F2-0FAAE43314A6}"/>
+              </a:ext>
+            </a:extLst>
+          </p:cNvPr>
+          <p:cNvSpPr>
+            <a:spLocks noGrp="1"/>
+          </p:cNvSpPr>
+          <p:nvPr>
+            <p:ph type="title"/>
+          </p:nvPr>
+        </p:nvSpPr>
+        <p:spPr/>
+        <p:txBody>
+          <a:bodyPr/>
+          <a:lstStyle/>
+          <a:p>
+            <a:pPr algn="ctr"/>
+            <a:r>
+              <a:rPr lang="en-US" dirty="0"/>
+              <a:t>DISCLAIMER</a:t>
+            </a:r>
+          </a:p>
+        </p:txBody>
+      </p:sp>
+      <p:sp>
+        <p:nvSpPr>
+          <p:cNvPr id="3" name="Content Placeholder 2">
+            <a:extLst>
+              <a:ext uri="{FF2B5EF4-FFF2-40B4-BE49-F238E27FC236}">
+                <a16:creationId xmlns:a16="http://schemas.microsoft.com/office/drawing/2014/main" id="{2B349B59-1AEB-4309-B463-65F55B9BFD84}"/>
+              </a:ext>
+            </a:extLst>
+          </p:cNvPr>
+          <p:cNvSpPr>
+            <a:spLocks noGrp="1"/>
+          </p:cNvSpPr>
+          <p:nvPr>
+            <p:ph idx="1"/>
+          </p:nvPr>
+        </p:nvSpPr>
+        <p:spPr/>
+        <p:txBody>
+          <a:bodyPr>
+            <a:normAutofit fontScale="70000" lnSpcReduction="20000"/>
+          </a:bodyPr>
+          <a:lstStyle/>
+          <a:p>
+            <a:r>
+              <a:rPr lang="en-US" dirty="0"/>
+              <a:t>At first, we will look at a very small subset of electrical engineering</a:t>
+            </a:r>
+          </a:p>
+          <a:p>
+            <a:r>
+              <a:rPr lang="en-US" dirty="0"/>
+              <a:t>Specifically, for the time being, we’re focusing on steady-state circuits</a:t>
+            </a:r>
+          </a:p>
+          <a:p>
+            <a:pPr lvl="1"/>
+            <a:r>
+              <a:rPr lang="en-US" dirty="0"/>
+              <a:t>That is, everything stays the same over time; there are no pulses, for example, or sine waves, or signals</a:t>
+            </a:r>
+          </a:p>
+          <a:p>
+            <a:r>
+              <a:rPr lang="en-US" dirty="0"/>
+              <a:t>A lot of the things that I will say are </a:t>
+            </a:r>
+            <a:r>
+              <a:rPr lang="en-US" i="1" dirty="0"/>
+              <a:t>wrong</a:t>
+            </a:r>
+            <a:r>
+              <a:rPr lang="en-US" dirty="0"/>
+              <a:t> in the general sense</a:t>
+            </a:r>
+          </a:p>
+          <a:p>
+            <a:pPr lvl="1"/>
+            <a:r>
+              <a:rPr lang="en-US" dirty="0"/>
+              <a:t>For example, “electricity can’t pass through an insulator”</a:t>
+            </a:r>
+          </a:p>
+          <a:p>
+            <a:r>
+              <a:rPr lang="en-US" dirty="0"/>
+              <a:t>Understand that these things are </a:t>
+            </a:r>
+            <a:r>
+              <a:rPr lang="en-US" i="1" dirty="0"/>
+              <a:t>simplifications</a:t>
+            </a:r>
+            <a:r>
+              <a:rPr lang="en-US" dirty="0"/>
+              <a:t> that make electronics easier to understand under specific circumstances, but are not always true</a:t>
+            </a:r>
+          </a:p>
+          <a:p>
+            <a:r>
+              <a:rPr lang="en-US" dirty="0"/>
+              <a:t>I’ll make it clear when I’m saying something that is a real, no-shit physical law (it’ll be in </a:t>
+            </a:r>
+            <a:r>
+              <a:rPr lang="en-US" dirty="0">
+                <a:solidFill>
+                  <a:srgbClr val="FF0000"/>
+                </a:solidFill>
+              </a:rPr>
+              <a:t>red</a:t>
+            </a:r>
+            <a:r>
+              <a:rPr lang="en-US" dirty="0"/>
+              <a:t>)</a:t>
+            </a:r>
+          </a:p>
+        </p:txBody>
+      </p:sp>
+    </p:spTree>
+    <p:extLst>
+      <p:ext uri="{BB962C8B-B14F-4D97-AF65-F5344CB8AC3E}">
+        <p14:creationId xmlns:p14="http://schemas.microsoft.com/office/powerpoint/2010/main" val="2732836668"/>
+      </p:ext>
+    </p:extLst>
+  </p:cSld>
+  <p:clrMapOvr>
+    <a:masterClrMapping/>
+  </p:clrMapOvr>
+</p:sld>
+</file>
+
+<file path=ppt/slides/slide20.xml><?xml version="1.0" encoding="utf-8"?>
+<p:sld xmlns:a="http://schemas.openxmlformats.org/drawingml/2006/main" xmlns:r="http://schemas.openxmlformats.org/officeDocument/2006/relationships" xmlns:p="http://schemas.openxmlformats.org/presentationml/2006/main">
+  <p:cSld>
+    <p:spTree>
+      <p:nvGrpSpPr>
+        <p:cNvPr id="1" name=""/>
+        <p:cNvGrpSpPr/>
+        <p:nvPr/>
+      </p:nvGrpSpPr>
+      <p:grpSpPr>
+        <a:xfrm>
+          <a:off x="0" y="0"/>
+          <a:ext cx="0" cy="0"/>
+          <a:chOff x="0" y="0"/>
+          <a:chExt cx="0" cy="0"/>
+        </a:xfrm>
+      </p:grpSpPr>
+      <p:sp>
+        <p:nvSpPr>
+          <p:cNvPr id="2" name="Title 1">
+            <a:extLst>
+              <a:ext uri="{FF2B5EF4-FFF2-40B4-BE49-F238E27FC236}">
+                <a16:creationId xmlns:a16="http://schemas.microsoft.com/office/drawing/2014/main" id="{08E35170-8993-42A4-815B-F357787BDFC0}"/>
+              </a:ext>
+            </a:extLst>
+          </p:cNvPr>
+          <p:cNvSpPr>
+            <a:spLocks noGrp="1"/>
+          </p:cNvSpPr>
+          <p:nvPr>
+            <p:ph type="title"/>
+          </p:nvPr>
+        </p:nvSpPr>
+        <p:spPr/>
+        <p:txBody>
+          <a:bodyPr/>
+          <a:lstStyle/>
+          <a:p>
+            <a:r>
+              <a:rPr lang="en-US" dirty="0"/>
+              <a:t>Schematics</a:t>
+            </a:r>
+          </a:p>
+        </p:txBody>
+      </p:sp>
+      <p:pic>
+        <p:nvPicPr>
+          <p:cNvPr id="1026" name="Picture 2" descr="https://87e9b9ae-a-cbb9c62d-s-sites.googlegroups.com/a/mdarc.org/mdarc/resources/operating-aids/schematic-symbols/Schematic%20Symbols%20-%20ARRL.jpg?attachauth=ANoY7cpzax0z9fpTrDVhsunWfEgLsIStQg4QFzMH0-zL0WEfGFZCmR7552GmmX0LFCOdWs_NaM5m7GOqeuiijnUbqQKSFwhC5U_ore1sA75XzmEYXeuK8eKFkpzWQNzVnPolKyjrjDi2sDNzPb2VVY0SK4rHwfhIEd9FdDtmmy7ofL_FGdtcUe0YqD9HB-4x8lICoSttaNxDorP9OvLeOhxcxwGYqkP5SMhti992DXCLTgVO4ITBiLwHUpaWfN03R7EdhsQGrDt_gcfUUTWnakBxFQyMnbTqzA%3D%3D&amp;attredirects=0">
+            <a:extLst>
+              <a:ext uri="{FF2B5EF4-FFF2-40B4-BE49-F238E27FC236}">
+                <a16:creationId xmlns:a16="http://schemas.microsoft.com/office/drawing/2014/main" id="{43D68935-AE49-4D5B-929A-B79C01676EE7}"/>
+              </a:ext>
+            </a:extLst>
+          </p:cNvPr>
+          <p:cNvPicPr>
+            <a:picLocks noGrp="1" noChangeAspect="1" noChangeArrowheads="1"/>
+          </p:cNvPicPr>
+          <p:nvPr>
+            <p:ph idx="1"/>
+          </p:nvPr>
+        </p:nvPicPr>
+        <p:blipFill>
+          <a:blip r:embed="rId2">
+            <a:extLst>
+              <a:ext uri="{28A0092B-C50C-407E-A947-70E740481C1C}">
+                <a14:useLocalDpi xmlns:a14="http://schemas.microsoft.com/office/drawing/2010/main" val="0"/>
+              </a:ext>
+            </a:extLst>
+          </a:blip>
+          <a:srcRect/>
+          <a:stretch>
+            <a:fillRect/>
+          </a:stretch>
+        </p:blipFill>
+        <p:spPr bwMode="auto">
+          <a:xfrm>
+            <a:off x="687150" y="1104369"/>
+            <a:ext cx="7769699" cy="5697304"/>
+          </a:xfrm>
+          <a:prstGeom prst="rect">
+            <a:avLst/>
+          </a:prstGeom>
+          <a:noFill/>
+          <a:extLst>
+            <a:ext uri="{909E8E84-426E-40DD-AFC4-6F175D3DCCD1}">
+              <a14:hiddenFill xmlns:a14="http://schemas.microsoft.com/office/drawing/2010/main">
+                <a:solidFill>
+                  <a:srgbClr val="FFFFFF"/>
+                </a:solidFill>
+              </a14:hiddenFill>
+            </a:ext>
+          </a:extLst>
+        </p:spPr>
+      </p:pic>
+    </p:spTree>
+    <p:extLst>
+      <p:ext uri="{BB962C8B-B14F-4D97-AF65-F5344CB8AC3E}">
+        <p14:creationId xmlns:p14="http://schemas.microsoft.com/office/powerpoint/2010/main" val="1453870699"/>
+      </p:ext>
+    </p:extLst>
+  </p:cSld>
+  <p:clrMapOvr>
+    <a:masterClrMapping/>
+  </p:clrMapOvr>
+</p:sld>
+</file>
+
+<file path=ppt/slides/slide21.xml><?xml version="1.0" encoding="utf-8"?>
+<p:sld xmlns:a="http://schemas.openxmlformats.org/drawingml/2006/main" xmlns:r="http://schemas.openxmlformats.org/officeDocument/2006/relationships" xmlns:p="http://schemas.openxmlformats.org/presentationml/2006/main">
+  <p:cSld>
+    <p:spTree>
+      <p:nvGrpSpPr>
+        <p:cNvPr id="1" name=""/>
+        <p:cNvGrpSpPr/>
+        <p:nvPr/>
+      </p:nvGrpSpPr>
+      <p:grpSpPr>
+        <a:xfrm>
+          <a:off x="0" y="0"/>
+          <a:ext cx="0" cy="0"/>
+          <a:chOff x="0" y="0"/>
+          <a:chExt cx="0" cy="0"/>
+        </a:xfrm>
+      </p:grpSpPr>
+      <p:sp>
+        <p:nvSpPr>
+          <p:cNvPr id="2" name="Title 1">
+            <a:extLst>
+              <a:ext uri="{FF2B5EF4-FFF2-40B4-BE49-F238E27FC236}">
+                <a16:creationId xmlns:a16="http://schemas.microsoft.com/office/drawing/2014/main" id="{E2371417-AE89-4CDA-AB23-83967B21F10A}"/>
+              </a:ext>
+            </a:extLst>
+          </p:cNvPr>
+          <p:cNvSpPr>
+            <a:spLocks noGrp="1"/>
+          </p:cNvSpPr>
+          <p:nvPr>
+            <p:ph type="title"/>
+          </p:nvPr>
+        </p:nvSpPr>
+        <p:spPr/>
+        <p:txBody>
+          <a:bodyPr/>
+          <a:lstStyle/>
+          <a:p>
+            <a:r>
+              <a:rPr lang="en-US" dirty="0"/>
+              <a:t>Schematics</a:t>
+            </a:r>
+          </a:p>
+        </p:txBody>
+      </p:sp>
+      <p:pic>
+        <p:nvPicPr>
+          <p:cNvPr id="3074" name="Picture 2" descr="http://faculty.frostburg.edu/phys/latta/ee/6x2rcvr/schematic/6x2schematicfullres.jpg">
+            <a:extLst>
+              <a:ext uri="{FF2B5EF4-FFF2-40B4-BE49-F238E27FC236}">
+                <a16:creationId xmlns:a16="http://schemas.microsoft.com/office/drawing/2014/main" id="{829F0BD7-7EBD-46D5-B3EE-DE5B262364F8}"/>
+              </a:ext>
+            </a:extLst>
+          </p:cNvPr>
+          <p:cNvPicPr>
+            <a:picLocks noGrp="1" noChangeAspect="1" noChangeArrowheads="1"/>
+          </p:cNvPicPr>
+          <p:nvPr>
+            <p:ph idx="1"/>
+          </p:nvPr>
+        </p:nvPicPr>
+        <p:blipFill rotWithShape="1">
+          <a:blip r:embed="rId2">
+            <a:extLst>
+              <a:ext uri="{28A0092B-C50C-407E-A947-70E740481C1C}">
+                <a14:useLocalDpi xmlns:a14="http://schemas.microsoft.com/office/drawing/2010/main" val="0"/>
+              </a:ext>
+            </a:extLst>
+          </a:blip>
+          <a:srcRect l="2009" r="1312"/>
+          <a:stretch/>
+        </p:blipFill>
+        <p:spPr bwMode="auto">
+          <a:xfrm>
+            <a:off x="76759" y="1994263"/>
+            <a:ext cx="8990481" cy="4012181"/>
+          </a:xfrm>
+          <a:prstGeom prst="rect">
+            <a:avLst/>
+          </a:prstGeom>
+          <a:noFill/>
+          <a:extLst>
+            <a:ext uri="{909E8E84-426E-40DD-AFC4-6F175D3DCCD1}">
+              <a14:hiddenFill xmlns:a14="http://schemas.microsoft.com/office/drawing/2010/main">
+                <a:solidFill>
+                  <a:srgbClr val="FFFFFF"/>
+                </a:solidFill>
+              </a14:hiddenFill>
+            </a:ext>
+          </a:extLst>
+        </p:spPr>
+      </p:pic>
+    </p:spTree>
+    <p:extLst>
+      <p:ext uri="{BB962C8B-B14F-4D97-AF65-F5344CB8AC3E}">
+        <p14:creationId xmlns:p14="http://schemas.microsoft.com/office/powerpoint/2010/main" val="1130809653"/>
+      </p:ext>
+    </p:extLst>
+  </p:cSld>
+  <p:clrMapOvr>
+    <a:masterClrMapping/>
+  </p:clrMapOvr>
+</p:sld>
+</file>
+
+<file path=ppt/slides/slide22.xml><?xml version="1.0" encoding="utf-8"?>
+<p:sld xmlns:a="http://schemas.openxmlformats.org/drawingml/2006/main" xmlns:r="http://schemas.openxmlformats.org/officeDocument/2006/relationships" xmlns:p="http://schemas.openxmlformats.org/presentationml/2006/main">
+  <p:cSld>
+    <p:spTree>
+      <p:nvGrpSpPr>
+        <p:cNvPr id="1" name=""/>
+        <p:cNvGrpSpPr/>
+        <p:nvPr/>
+      </p:nvGrpSpPr>
+      <p:grpSpPr>
+        <a:xfrm>
+          <a:off x="0" y="0"/>
+          <a:ext cx="0" cy="0"/>
+          <a:chOff x="0" y="0"/>
+          <a:chExt cx="0" cy="0"/>
+        </a:xfrm>
+      </p:grpSpPr>
+      <p:sp>
+        <p:nvSpPr>
+          <p:cNvPr id="2" name="Title 1">
+            <a:extLst>
+              <a:ext uri="{FF2B5EF4-FFF2-40B4-BE49-F238E27FC236}">
+                <a16:creationId xmlns:a16="http://schemas.microsoft.com/office/drawing/2014/main" id="{97DB33D9-628F-4E6B-804F-D6FD94401FAB}"/>
+              </a:ext>
+            </a:extLst>
+          </p:cNvPr>
+          <p:cNvSpPr>
+            <a:spLocks noGrp="1"/>
+          </p:cNvSpPr>
+          <p:nvPr>
+            <p:ph type="title"/>
+          </p:nvPr>
+        </p:nvSpPr>
+        <p:spPr/>
+        <p:txBody>
+          <a:bodyPr/>
+          <a:lstStyle/>
+          <a:p>
+            <a:r>
+              <a:rPr lang="en-US" dirty="0"/>
+              <a:t>Schematics</a:t>
+            </a:r>
+          </a:p>
+        </p:txBody>
+      </p:sp>
+      <p:sp>
+        <p:nvSpPr>
+          <p:cNvPr id="3" name="Content Placeholder 2">
+            <a:extLst>
+              <a:ext uri="{FF2B5EF4-FFF2-40B4-BE49-F238E27FC236}">
+                <a16:creationId xmlns:a16="http://schemas.microsoft.com/office/drawing/2014/main" id="{87467815-6178-4969-807C-335C1F539A19}"/>
+              </a:ext>
+            </a:extLst>
+          </p:cNvPr>
+          <p:cNvSpPr>
+            <a:spLocks noGrp="1"/>
+          </p:cNvSpPr>
+          <p:nvPr>
+            <p:ph idx="1"/>
+          </p:nvPr>
+        </p:nvSpPr>
+        <p:spPr>
+          <a:xfrm>
+            <a:off x="457200" y="1600203"/>
+            <a:ext cx="8229600" cy="1828798"/>
+          </a:xfrm>
+        </p:spPr>
+        <p:txBody>
+          <a:bodyPr>
+            <a:normAutofit fontScale="92500" lnSpcReduction="10000"/>
+          </a:bodyPr>
+          <a:lstStyle/>
+          <a:p>
+            <a:r>
+              <a:rPr lang="en-US" dirty="0"/>
+              <a:t>Schematics are </a:t>
+            </a:r>
+            <a:r>
+              <a:rPr lang="en-US" i="1" dirty="0"/>
+              <a:t>logical</a:t>
+            </a:r>
+            <a:r>
+              <a:rPr lang="en-US" dirty="0"/>
+              <a:t> diagrams</a:t>
+            </a:r>
+          </a:p>
+          <a:p>
+            <a:pPr lvl="1"/>
+            <a:r>
+              <a:rPr lang="en-US" dirty="0"/>
+              <a:t>They tell you what things are connected together</a:t>
+            </a:r>
+          </a:p>
+          <a:p>
+            <a:pPr lvl="1"/>
+            <a:r>
+              <a:rPr lang="en-US" dirty="0"/>
+              <a:t>They </a:t>
+            </a:r>
+            <a:r>
+              <a:rPr lang="en-US" b="1" dirty="0"/>
+              <a:t>don’t</a:t>
+            </a:r>
+            <a:r>
+              <a:rPr lang="en-US" dirty="0"/>
+              <a:t> tell you how </a:t>
+            </a:r>
+          </a:p>
+          <a:p>
+            <a:pPr lvl="1"/>
+            <a:r>
+              <a:rPr lang="en-US" dirty="0"/>
+              <a:t>A schematic can be implemented in different ways</a:t>
+            </a:r>
+          </a:p>
+        </p:txBody>
+      </p:sp>
+      <p:pic>
+        <p:nvPicPr>
+          <p:cNvPr id="4" name="Picture 3">
+            <a:extLst>
+              <a:ext uri="{FF2B5EF4-FFF2-40B4-BE49-F238E27FC236}">
+                <a16:creationId xmlns:a16="http://schemas.microsoft.com/office/drawing/2014/main" id="{05C6208A-90A9-41D6-A18D-7643D2F74682}"/>
+              </a:ext>
+            </a:extLst>
+          </p:cNvPr>
+          <p:cNvPicPr>
+            <a:picLocks noChangeAspect="1"/>
+          </p:cNvPicPr>
+          <p:nvPr/>
+        </p:nvPicPr>
+        <p:blipFill>
+          <a:blip r:embed="rId2"/>
+          <a:stretch>
+            <a:fillRect/>
+          </a:stretch>
+        </p:blipFill>
+        <p:spPr>
+          <a:xfrm>
+            <a:off x="3196045" y="5257797"/>
+            <a:ext cx="2751909" cy="1484982"/>
+          </a:xfrm>
+          <a:prstGeom prst="rect">
+            <a:avLst/>
+          </a:prstGeom>
+        </p:spPr>
+      </p:pic>
+      <p:pic>
+        <p:nvPicPr>
+          <p:cNvPr id="6" name="Picture 5">
+            <a:extLst>
+              <a:ext uri="{FF2B5EF4-FFF2-40B4-BE49-F238E27FC236}">
+                <a16:creationId xmlns:a16="http://schemas.microsoft.com/office/drawing/2014/main" id="{4CEB683E-AD68-46D4-AC92-9B2DFF123BC6}"/>
+              </a:ext>
+            </a:extLst>
+          </p:cNvPr>
+          <p:cNvPicPr>
+            <a:picLocks noChangeAspect="1"/>
+          </p:cNvPicPr>
+          <p:nvPr/>
+        </p:nvPicPr>
+        <p:blipFill>
+          <a:blip r:embed="rId3"/>
+          <a:stretch>
+            <a:fillRect/>
+          </a:stretch>
+        </p:blipFill>
+        <p:spPr>
+          <a:xfrm>
+            <a:off x="153625" y="3545208"/>
+            <a:ext cx="2380570" cy="1596382"/>
+          </a:xfrm>
+          <a:prstGeom prst="rect">
+            <a:avLst/>
+          </a:prstGeom>
+        </p:spPr>
+      </p:pic>
+      <p:pic>
+        <p:nvPicPr>
+          <p:cNvPr id="7" name="Picture 6">
+            <a:extLst>
+              <a:ext uri="{FF2B5EF4-FFF2-40B4-BE49-F238E27FC236}">
+                <a16:creationId xmlns:a16="http://schemas.microsoft.com/office/drawing/2014/main" id="{0517A58A-B9D0-47A6-AA33-D36D7CC5F55E}"/>
+              </a:ext>
+            </a:extLst>
+          </p:cNvPr>
+          <p:cNvPicPr>
+            <a:picLocks noChangeAspect="1"/>
+          </p:cNvPicPr>
+          <p:nvPr/>
+        </p:nvPicPr>
+        <p:blipFill>
+          <a:blip r:embed="rId4"/>
+          <a:stretch>
+            <a:fillRect/>
+          </a:stretch>
+        </p:blipFill>
+        <p:spPr>
+          <a:xfrm>
+            <a:off x="3414583" y="3611566"/>
+            <a:ext cx="2314831" cy="1340301"/>
+          </a:xfrm>
+          <a:prstGeom prst="rect">
+            <a:avLst/>
+          </a:prstGeom>
+        </p:spPr>
+      </p:pic>
+      <p:pic>
+        <p:nvPicPr>
+          <p:cNvPr id="8" name="Picture 7">
+            <a:extLst>
+              <a:ext uri="{FF2B5EF4-FFF2-40B4-BE49-F238E27FC236}">
+                <a16:creationId xmlns:a16="http://schemas.microsoft.com/office/drawing/2014/main" id="{C62B7CBA-2612-499A-94DF-0062A07547C4}"/>
+              </a:ext>
+            </a:extLst>
+          </p:cNvPr>
+          <p:cNvPicPr>
+            <a:picLocks noChangeAspect="1"/>
+          </p:cNvPicPr>
+          <p:nvPr/>
+        </p:nvPicPr>
+        <p:blipFill>
+          <a:blip r:embed="rId5"/>
+          <a:stretch>
+            <a:fillRect/>
+          </a:stretch>
+        </p:blipFill>
+        <p:spPr>
+          <a:xfrm>
+            <a:off x="6368278" y="3545234"/>
+            <a:ext cx="2131287" cy="1472963"/>
+          </a:xfrm>
+          <a:prstGeom prst="rect">
+            <a:avLst/>
+          </a:prstGeom>
+        </p:spPr>
+      </p:pic>
+    </p:spTree>
+    <p:extLst>
+      <p:ext uri="{BB962C8B-B14F-4D97-AF65-F5344CB8AC3E}">
+        <p14:creationId xmlns:p14="http://schemas.microsoft.com/office/powerpoint/2010/main" val="2800420792"/>
+      </p:ext>
+    </p:extLst>
+  </p:cSld>
+  <p:clrMapOvr>
+    <a:masterClrMapping/>
+  </p:clrMapOvr>
+</p:sld>
+</file>
+
+<file path=ppt/slides/slide23.xml><?xml version="1.0" encoding="utf-8"?>
 <p:sld xmlns:a="http://schemas.openxmlformats.org/drawingml/2006/main" xmlns:r="http://schemas.openxmlformats.org/officeDocument/2006/relationships" xmlns:p="http://schemas.openxmlformats.org/presentationml/2006/main">
   <p:cSld>
     <p:spTree>
@@ -26576,29 +27507,13 @@
           <a:p>
             <a:r>
               <a:rPr lang="en-US" dirty="0"/>
-              <a:t>First law: The sum of currents entering </a:t>
-            </a:r>
-            <a:r>
-              <a:rPr lang="en-US" dirty="0" smtClean="0"/>
-              <a:t>a </a:t>
-            </a:r>
-            <a:r>
-              <a:rPr lang="en-US" dirty="0"/>
-              <a:t>junction must be zero</a:t>
+              <a:t>First law: The sum of currents entering a junction must be zero</a:t>
             </a:r>
           </a:p>
           <a:p>
             <a:r>
               <a:rPr lang="en-US" dirty="0"/>
-              <a:t>Second law: The sum of all voltage </a:t>
-            </a:r>
-            <a:r>
-              <a:rPr lang="en-US" dirty="0" smtClean="0"/>
-              <a:t>drops </a:t>
-            </a:r>
-            <a:r>
-              <a:rPr lang="en-US" dirty="0"/>
-              <a:t>around a loop must be zero</a:t>
+              <a:t>Second law: The sum of all voltage drops around a loop must be zero</a:t>
             </a:r>
           </a:p>
         </p:txBody>
@@ -26613,17 +27528,10 @@
   <p:clrMapOvr>
     <a:masterClrMapping/>
   </p:clrMapOvr>
-  <p:timing>
-    <p:tnLst>
-      <p:par>
-        <p:cTn id="1" dur="indefinite" restart="never" nodeType="tmRoot"/>
-      </p:par>
-    </p:tnLst>
-  </p:timing>
 </p:sld>
 </file>
 
-<file path=ppt/slides/slide18.xml><?xml version="1.0" encoding="utf-8"?>
+<file path=ppt/slides/slide24.xml><?xml version="1.0" encoding="utf-8"?>
 <p:sld xmlns:a="http://schemas.openxmlformats.org/drawingml/2006/main" xmlns:r="http://schemas.openxmlformats.org/officeDocument/2006/relationships" xmlns:p="http://schemas.openxmlformats.org/presentationml/2006/main">
   <p:cSld>
     <p:spTree>
@@ -27029,17 +27937,10 @@
   <p:clrMapOvr>
     <a:masterClrMapping/>
   </p:clrMapOvr>
-  <p:timing>
-    <p:tnLst>
-      <p:par>
-        <p:cTn id="1" dur="indefinite" restart="never" nodeType="tmRoot"/>
-      </p:par>
-    </p:tnLst>
-  </p:timing>
 </p:sld>
 </file>
 
-<file path=ppt/slides/slide19.xml><?xml version="1.0" encoding="utf-8"?>
+<file path=ppt/slides/slide25.xml><?xml version="1.0" encoding="utf-8"?>
 <p:sld xmlns:a="http://schemas.openxmlformats.org/drawingml/2006/main" xmlns:r="http://schemas.openxmlformats.org/officeDocument/2006/relationships" xmlns:p="http://schemas.openxmlformats.org/presentationml/2006/main">
   <p:cSld>
     <p:spTree>
@@ -27987,174 +28888,7 @@
 </p:sld>
 </file>
 
-<file path=ppt/slides/slide2.xml><?xml version="1.0" encoding="utf-8"?>
-<p:sld xmlns:a="http://schemas.openxmlformats.org/drawingml/2006/main" xmlns:r="http://schemas.openxmlformats.org/officeDocument/2006/relationships" xmlns:p="http://schemas.openxmlformats.org/presentationml/2006/main">
-  <p:cSld>
-    <p:spTree>
-      <p:nvGrpSpPr>
-        <p:cNvPr id="1" name=""/>
-        <p:cNvGrpSpPr/>
-        <p:nvPr/>
-      </p:nvGrpSpPr>
-      <p:grpSpPr>
-        <a:xfrm>
-          <a:off x="0" y="0"/>
-          <a:ext cx="0" cy="0"/>
-          <a:chOff x="0" y="0"/>
-          <a:chExt cx="0" cy="0"/>
-        </a:xfrm>
-      </p:grpSpPr>
-      <p:sp>
-        <p:nvSpPr>
-          <p:cNvPr id="2" name="Title 1">
-            <a:extLst>
-              <a:ext uri="{FF2B5EF4-FFF2-40B4-BE49-F238E27FC236}">
-                <a16:creationId xmlns:a16="http://schemas.microsoft.com/office/drawing/2014/main" id="{4A4E1BC3-7067-42A7-86F2-0FAAE43314A6}"/>
-              </a:ext>
-            </a:extLst>
-          </p:cNvPr>
-          <p:cNvSpPr>
-            <a:spLocks noGrp="1"/>
-          </p:cNvSpPr>
-          <p:nvPr>
-            <p:ph type="title"/>
-          </p:nvPr>
-        </p:nvSpPr>
-        <p:spPr/>
-        <p:txBody>
-          <a:bodyPr/>
-          <a:lstStyle/>
-          <a:p>
-            <a:pPr algn="ctr"/>
-            <a:r>
-              <a:rPr lang="en-US" dirty="0"/>
-              <a:t>DISCLAIMER</a:t>
-            </a:r>
-          </a:p>
-        </p:txBody>
-      </p:sp>
-      <p:sp>
-        <p:nvSpPr>
-          <p:cNvPr id="3" name="Content Placeholder 2">
-            <a:extLst>
-              <a:ext uri="{FF2B5EF4-FFF2-40B4-BE49-F238E27FC236}">
-                <a16:creationId xmlns:a16="http://schemas.microsoft.com/office/drawing/2014/main" id="{2B349B59-1AEB-4309-B463-65F55B9BFD84}"/>
-              </a:ext>
-            </a:extLst>
-          </p:cNvPr>
-          <p:cNvSpPr>
-            <a:spLocks noGrp="1"/>
-          </p:cNvSpPr>
-          <p:nvPr>
-            <p:ph idx="1"/>
-          </p:nvPr>
-        </p:nvSpPr>
-        <p:spPr/>
-        <p:txBody>
-          <a:bodyPr>
-            <a:normAutofit fontScale="70000" lnSpcReduction="20000"/>
-          </a:bodyPr>
-          <a:lstStyle/>
-          <a:p>
-            <a:r>
-              <a:rPr lang="en-US" dirty="0"/>
-              <a:t>At first, we will look at a very small subset of electrical engineering</a:t>
-            </a:r>
-          </a:p>
-          <a:p>
-            <a:r>
-              <a:rPr lang="en-US" dirty="0"/>
-              <a:t>Specifically, for the time being, we’re focusing on steady-state circuits</a:t>
-            </a:r>
-          </a:p>
-          <a:p>
-            <a:pPr lvl="1"/>
-            <a:r>
-              <a:rPr lang="en-US" dirty="0"/>
-              <a:t>That is, everything stays the same over time; there are no pulses, for example, or sine waves, or signals</a:t>
-            </a:r>
-          </a:p>
-          <a:p>
-            <a:r>
-              <a:rPr lang="en-US" dirty="0"/>
-              <a:t>A lot of the things that I will say are </a:t>
-            </a:r>
-            <a:r>
-              <a:rPr lang="en-US" i="1" dirty="0"/>
-              <a:t>wrong</a:t>
-            </a:r>
-            <a:r>
-              <a:rPr lang="en-US" dirty="0"/>
-              <a:t> in the general sense</a:t>
-            </a:r>
-          </a:p>
-          <a:p>
-            <a:pPr lvl="1"/>
-            <a:r>
-              <a:rPr lang="en-US" dirty="0"/>
-              <a:t>For example, “electricity can’t pass through an insulator”</a:t>
-            </a:r>
-          </a:p>
-          <a:p>
-            <a:r>
-              <a:rPr lang="en-US" dirty="0"/>
-              <a:t>Understand that these things are </a:t>
-            </a:r>
-            <a:r>
-              <a:rPr lang="en-US" i="1" dirty="0"/>
-              <a:t>simplifications</a:t>
-            </a:r>
-            <a:r>
-              <a:rPr lang="en-US" dirty="0"/>
-              <a:t> that make electronics easier to understand under specific circumstances, but are not always true</a:t>
-            </a:r>
-          </a:p>
-          <a:p>
-            <a:r>
-              <a:rPr lang="en-US" dirty="0"/>
-              <a:t>I’ll make it clear when I’m saying something that is a real, no-shit physical </a:t>
-            </a:r>
-            <a:r>
-              <a:rPr lang="en-US" dirty="0" smtClean="0"/>
-              <a:t>law (it’ll be in </a:t>
-            </a:r>
-            <a:r>
-              <a:rPr lang="en-US" dirty="0" smtClean="0">
-                <a:solidFill>
-                  <a:srgbClr val="FF0000"/>
-                </a:solidFill>
-              </a:rPr>
-              <a:t>red</a:t>
-            </a:r>
-            <a:r>
-              <a:rPr lang="en-US" dirty="0" smtClean="0"/>
-              <a:t>)</a:t>
-            </a:r>
-            <a:endParaRPr lang="en-US" dirty="0"/>
-          </a:p>
-        </p:txBody>
-      </p:sp>
-    </p:spTree>
-    <p:extLst>
-      <p:ext uri="{BB962C8B-B14F-4D97-AF65-F5344CB8AC3E}">
-        <p14:creationId xmlns:p14="http://schemas.microsoft.com/office/powerpoint/2010/main" val="2732836668"/>
-      </p:ext>
-    </p:extLst>
-  </p:cSld>
-  <p:clrMapOvr>
-    <a:masterClrMapping/>
-  </p:clrMapOvr>
-  <p:timing>
-    <p:tnLst>
-      <p:par>
-        <p:cTn id="1" dur="indefinite" restart="never" nodeType="tmRoot"/>
-      </p:par>
-    </p:tnLst>
-  </p:timing>
-</p:sld>
-</file>
-
-<file path=ppt/slides/slide20.xml><?xml version="1.0" encoding="utf-8"?>
+<file path=ppt/slides/slide26.xml><?xml version="1.0" encoding="utf-8"?>
 <p:sld xmlns:a="http://schemas.openxmlformats.org/drawingml/2006/main" xmlns:r="http://schemas.openxmlformats.org/officeDocument/2006/relationships" xmlns:p="http://schemas.openxmlformats.org/presentationml/2006/main">
   <p:cSld>
     <p:spTree>
@@ -28187,14 +28921,13 @@
           <a:lstStyle/>
           <a:p>
             <a:r>
-              <a:rPr lang="en-US" dirty="0" err="1" smtClean="0"/>
+              <a:rPr lang="en-US" dirty="0" err="1"/>
               <a:t>Kirchoff’s</a:t>
             </a:r>
             <a:r>
-              <a:rPr lang="en-US" dirty="0" smtClean="0"/>
+              <a:rPr lang="en-US" dirty="0"/>
               <a:t> Laws</a:t>
             </a:r>
-            <a:endParaRPr lang="en-US" dirty="0"/>
           </a:p>
         </p:txBody>
       </p:sp>
@@ -28214,10 +28947,9 @@
           <a:lstStyle/>
           <a:p>
             <a:r>
-              <a:rPr lang="en-US" dirty="0" smtClean="0"/>
+              <a:rPr lang="en-US" dirty="0"/>
               <a:t>Slightly more complex example:</a:t>
             </a:r>
-            <a:endParaRPr lang="en-US" dirty="0"/>
           </a:p>
         </p:txBody>
       </p:sp>
@@ -28251,8 +28983,8 @@
           </a:prstGeom>
         </p:spPr>
       </p:pic>
-      <mc:AlternateContent xmlns:mc="http://schemas.openxmlformats.org/markup-compatibility/2006">
-        <mc:Choice xmlns:a14="http://schemas.microsoft.com/office/drawing/2010/main" Requires="a14">
+      <mc:AlternateContent xmlns:mc="http://schemas.openxmlformats.org/markup-compatibility/2006" xmlns:a14="http://schemas.microsoft.com/office/drawing/2010/main">
+        <mc:Choice Requires="a14">
           <p:sp>
             <p:nvSpPr>
               <p:cNvPr id="5" name="TextBox 4"/>
@@ -28276,7 +29008,7 @@
               <a:lstStyle/>
               <a:p>
                 <a:r>
-                  <a:rPr lang="en-US" dirty="0" smtClean="0">
+                  <a:rPr lang="en-US" dirty="0">
                     <a:solidFill>
                       <a:schemeClr val="bg1"/>
                     </a:solidFill>
@@ -28347,7 +29079,7 @@
                   </m:oMath>
                 </a14:m>
                 <a:r>
-                  <a:rPr lang="en-US" dirty="0" smtClean="0">
+                  <a:rPr lang="en-US" dirty="0">
                     <a:solidFill>
                       <a:schemeClr val="bg1"/>
                     </a:solidFill>
@@ -28426,7 +29158,7 @@
             </p:txBody>
           </p:sp>
         </mc:Choice>
-        <mc:Fallback>
+        <mc:Fallback xmlns="">
           <p:sp>
             <p:nvSpPr>
               <p:cNvPr id="5" name="TextBox 4"/>
@@ -28475,17 +29207,10 @@
   <p:clrMapOvr>
     <a:masterClrMapping/>
   </p:clrMapOvr>
-  <p:timing>
-    <p:tnLst>
-      <p:par>
-        <p:cTn id="1" dur="indefinite" restart="never" nodeType="tmRoot"/>
-      </p:par>
-    </p:tnLst>
-  </p:timing>
 </p:sld>
 </file>
 
-<file path=ppt/slides/slide21.xml><?xml version="1.0" encoding="utf-8"?>
+<file path=ppt/slides/slide27.xml><?xml version="1.0" encoding="utf-8"?>
 <p:sld xmlns:a="http://schemas.openxmlformats.org/drawingml/2006/main" xmlns:r="http://schemas.openxmlformats.org/officeDocument/2006/relationships" xmlns:p="http://schemas.openxmlformats.org/presentationml/2006/main">
   <p:cSld>
     <p:spTree>
@@ -28518,14 +29243,13 @@
           <a:lstStyle/>
           <a:p>
             <a:r>
-              <a:rPr lang="en-US" dirty="0" err="1" smtClean="0"/>
+              <a:rPr lang="en-US" dirty="0" err="1"/>
               <a:t>Kirchoff’s</a:t>
             </a:r>
             <a:r>
-              <a:rPr lang="en-US" dirty="0" smtClean="0"/>
+              <a:rPr lang="en-US" dirty="0"/>
               <a:t> Laws</a:t>
             </a:r>
-            <a:endParaRPr lang="en-US" dirty="0"/>
           </a:p>
         </p:txBody>
       </p:sp>
@@ -28558,8 +29282,8 @@
           </a:xfrm>
         </p:spPr>
       </p:pic>
-      <mc:AlternateContent xmlns:mc="http://schemas.openxmlformats.org/markup-compatibility/2006">
-        <mc:Choice xmlns:a14="http://schemas.microsoft.com/office/drawing/2010/main" Requires="a14">
+      <mc:AlternateContent xmlns:mc="http://schemas.openxmlformats.org/markup-compatibility/2006" xmlns:a14="http://schemas.microsoft.com/office/drawing/2010/main">
+        <mc:Choice Requires="a14">
           <p:sp>
             <p:nvSpPr>
               <p:cNvPr id="5" name="TextBox 4"/>
@@ -28587,7 +29311,7 @@
                   <a:buChar char="•"/>
                 </a:pPr>
                 <a:r>
-                  <a:rPr lang="en-US" dirty="0" smtClean="0">
+                  <a:rPr lang="en-US" dirty="0">
                     <a:solidFill>
                       <a:schemeClr val="bg1"/>
                     </a:solidFill>
@@ -28595,7 +29319,7 @@
                   <a:t>From </a:t>
                 </a:r>
                 <a:r>
-                  <a:rPr lang="en-US" dirty="0" err="1" smtClean="0">
+                  <a:rPr lang="en-US" dirty="0" err="1">
                     <a:solidFill>
                       <a:schemeClr val="bg1"/>
                     </a:solidFill>
@@ -28603,7 +29327,7 @@
                   <a:t>Kirchoff’s</a:t>
                 </a:r>
                 <a:r>
-                  <a:rPr lang="en-US" dirty="0" smtClean="0">
+                  <a:rPr lang="en-US" dirty="0">
                     <a:solidFill>
                       <a:schemeClr val="bg1"/>
                     </a:solidFill>
@@ -28611,7 +29335,7 @@
                   <a:t> 2</a:t>
                 </a:r>
                 <a:r>
-                  <a:rPr lang="en-US" baseline="30000" dirty="0" smtClean="0">
+                  <a:rPr lang="en-US" baseline="30000" dirty="0">
                     <a:solidFill>
                       <a:schemeClr val="bg1"/>
                     </a:solidFill>
@@ -28619,7 +29343,7 @@
                   <a:t>nd</a:t>
                 </a:r>
                 <a:r>
-                  <a:rPr lang="en-US" dirty="0" smtClean="0">
+                  <a:rPr lang="en-US" dirty="0">
                     <a:solidFill>
                       <a:schemeClr val="bg1"/>
                     </a:solidFill>
@@ -28984,7 +29708,7 @@
                     </m:r>
                   </m:oMath>
                 </a14:m>
-                <a:endParaRPr lang="en-US" dirty="0" smtClean="0">
+                <a:endParaRPr lang="en-US" dirty="0">
                   <a:solidFill>
                     <a:schemeClr val="bg1"/>
                   </a:solidFill>
@@ -29438,7 +30162,7 @@
                     </m:r>
                   </m:oMath>
                 </a14:m>
-                <a:endParaRPr lang="en-US" b="0" dirty="0" smtClean="0">
+                <a:endParaRPr lang="en-US" b="0" dirty="0">
                   <a:solidFill>
                     <a:schemeClr val="bg1"/>
                   </a:solidFill>
@@ -29450,7 +30174,7 @@
                   <a:buChar char="•"/>
                 </a:pPr>
                 <a:r>
-                  <a:rPr lang="en-US" dirty="0" smtClean="0">
+                  <a:rPr lang="en-US" dirty="0">
                     <a:solidFill>
                       <a:schemeClr val="bg1"/>
                     </a:solidFill>
@@ -29539,7 +30263,7 @@
                   </m:oMath>
                 </a14:m>
                 <a:r>
-                  <a:rPr lang="en-US" dirty="0" smtClean="0">
+                  <a:rPr lang="en-US" dirty="0">
                     <a:solidFill>
                       <a:schemeClr val="bg1"/>
                     </a:solidFill>
@@ -29553,7 +30277,7 @@
                   <a:buChar char="•"/>
                 </a:pPr>
                 <a:r>
-                  <a:rPr lang="en-US" dirty="0" smtClean="0">
+                  <a:rPr lang="en-US" dirty="0">
                     <a:solidFill>
                       <a:schemeClr val="bg1"/>
                     </a:solidFill>
@@ -29985,7 +30709,7 @@
                   <a:buChar char="•"/>
                 </a:pPr>
                 <a:r>
-                  <a:rPr lang="en-US" dirty="0" smtClean="0">
+                  <a:rPr lang="en-US" dirty="0">
                     <a:solidFill>
                       <a:schemeClr val="bg1"/>
                     </a:solidFill>
@@ -30412,7 +31136,7 @@
                     </m:d>
                   </m:oMath>
                 </a14:m>
-                <a:endParaRPr lang="en-US" dirty="0" smtClean="0">
+                <a:endParaRPr lang="en-US" dirty="0">
                   <a:solidFill>
                     <a:schemeClr val="bg1"/>
                   </a:solidFill>
@@ -30424,7 +31148,7 @@
                   <a:buChar char="•"/>
                 </a:pPr>
                 <a:r>
-                  <a:rPr lang="en-US" dirty="0" smtClean="0">
+                  <a:rPr lang="en-US" dirty="0">
                     <a:solidFill>
                       <a:schemeClr val="bg1"/>
                     </a:solidFill>
@@ -30902,7 +31626,7 @@
                     </m:d>
                   </m:oMath>
                 </a14:m>
-                <a:endParaRPr lang="en-US" dirty="0" smtClean="0">
+                <a:endParaRPr lang="en-US" dirty="0">
                   <a:solidFill>
                     <a:schemeClr val="bg1"/>
                   </a:solidFill>
@@ -30914,7 +31638,7 @@
                   <a:buChar char="•"/>
                 </a:pPr>
                 <a:r>
-                  <a:rPr lang="en-US" dirty="0" smtClean="0">
+                  <a:rPr lang="en-US" dirty="0">
                     <a:solidFill>
                       <a:schemeClr val="bg1"/>
                     </a:solidFill>
@@ -31607,7 +32331,7 @@
                     </m:d>
                   </m:oMath>
                 </a14:m>
-                <a:endParaRPr lang="en-US" dirty="0" smtClean="0">
+                <a:endParaRPr lang="en-US" dirty="0">
                   <a:solidFill>
                     <a:schemeClr val="bg1"/>
                   </a:solidFill>
@@ -31619,7 +32343,7 @@
                   <a:buChar char="•"/>
                 </a:pPr>
                 <a:r>
-                  <a:rPr lang="en-US" b="0" dirty="0" smtClean="0">
+                  <a:rPr lang="en-US" b="0" dirty="0">
                     <a:solidFill>
                       <a:schemeClr val="bg1"/>
                     </a:solidFill>
@@ -31885,7 +32609,7 @@
                     </m:sSub>
                   </m:oMath>
                 </a14:m>
-                <a:endParaRPr lang="en-US" dirty="0" smtClean="0">
+                <a:endParaRPr lang="en-US" dirty="0">
                   <a:solidFill>
                     <a:schemeClr val="bg1"/>
                   </a:solidFill>
@@ -32001,7 +32725,7 @@
                     </m:r>
                   </m:oMath>
                 </a14:m>
-                <a:endParaRPr lang="en-US" dirty="0" smtClean="0">
+                <a:endParaRPr lang="en-US" dirty="0">
                   <a:solidFill>
                     <a:schemeClr val="bg1"/>
                   </a:solidFill>
@@ -32297,7 +33021,7 @@
                   </m:oMath>
                 </a14:m>
                 <a:r>
-                  <a:rPr lang="en-US" dirty="0" smtClean="0">
+                  <a:rPr lang="en-US" dirty="0">
                     <a:solidFill>
                       <a:schemeClr val="bg1"/>
                     </a:solidFill>
@@ -32343,7 +33067,7 @@
                   </m:oMath>
                 </a14:m>
                 <a:r>
-                  <a:rPr lang="en-US" dirty="0" smtClean="0">
+                  <a:rPr lang="en-US" dirty="0">
                     <a:solidFill>
                       <a:schemeClr val="bg1"/>
                     </a:solidFill>
@@ -32389,25 +33113,20 @@
                   </m:oMath>
                 </a14:m>
                 <a:r>
-                  <a:rPr lang="en-US" dirty="0" smtClean="0">
+                  <a:rPr lang="en-US" dirty="0">
                     <a:solidFill>
                       <a:schemeClr val="bg1"/>
                     </a:solidFill>
                   </a:rPr>
                   <a:t> direction)</a:t>
                 </a:r>
-                <a:endParaRPr lang="en-US" dirty="0">
-                  <a:solidFill>
-                    <a:schemeClr val="bg1"/>
-                  </a:solidFill>
-                </a:endParaRPr>
               </a:p>
               <a:p>
                 <a:pPr marL="285750" indent="-285750">
                   <a:buFont typeface="Arial" panose="020B0604020202020204" pitchFamily="34" charset="0"/>
                   <a:buChar char="•"/>
                 </a:pPr>
-                <a:endParaRPr lang="en-US" dirty="0" smtClean="0">
+                <a:endParaRPr lang="en-US" dirty="0">
                   <a:solidFill>
                     <a:schemeClr val="bg1"/>
                   </a:solidFill>
@@ -32416,7 +33135,7 @@
             </p:txBody>
           </p:sp>
         </mc:Choice>
-        <mc:Fallback>
+        <mc:Fallback xmlns="">
           <p:sp>
             <p:nvSpPr>
               <p:cNvPr id="5" name="TextBox 4"/>
@@ -33040,7 +33759,7 @@
 </p:sld>
 </file>
 
-<file path=ppt/slides/slide22.xml><?xml version="1.0" encoding="utf-8"?>
+<file path=ppt/slides/slide28.xml><?xml version="1.0" encoding="utf-8"?>
 <p:sld xmlns:a="http://schemas.openxmlformats.org/drawingml/2006/main" xmlns:r="http://schemas.openxmlformats.org/officeDocument/2006/relationships" xmlns:p="http://schemas.openxmlformats.org/presentationml/2006/main">
   <p:cSld>
     <p:spTree>
@@ -33073,14 +33792,13 @@
           <a:lstStyle/>
           <a:p>
             <a:r>
-              <a:rPr lang="en-US" dirty="0" err="1" smtClean="0"/>
+              <a:rPr lang="en-US" dirty="0" err="1"/>
               <a:t>Kirchoff’s</a:t>
             </a:r>
             <a:r>
-              <a:rPr lang="en-US" dirty="0" smtClean="0"/>
+              <a:rPr lang="en-US" dirty="0"/>
               <a:t> Laws</a:t>
             </a:r>
-            <a:endParaRPr lang="en-US" dirty="0"/>
           </a:p>
         </p:txBody>
       </p:sp>
@@ -33107,24 +33825,23 @@
           <a:lstStyle/>
           <a:p>
             <a:r>
-              <a:rPr lang="en-US" dirty="0" smtClean="0"/>
+              <a:rPr lang="en-US" dirty="0"/>
               <a:t>The specific loops you choose don’t matter!</a:t>
             </a:r>
           </a:p>
           <a:p>
             <a:r>
-              <a:rPr lang="en-US" dirty="0" smtClean="0"/>
+              <a:rPr lang="en-US" dirty="0"/>
               <a:t>Basically, </a:t>
             </a:r>
             <a:r>
-              <a:rPr lang="en-US" i="1" dirty="0" smtClean="0"/>
+              <a:rPr lang="en-US" i="1" dirty="0"/>
               <a:t>as long as each component and wire has at least one loop passing through it</a:t>
             </a:r>
             <a:r>
-              <a:rPr lang="en-US" dirty="0" smtClean="0"/>
+              <a:rPr lang="en-US" dirty="0"/>
               <a:t>, you can solve the circuit</a:t>
             </a:r>
-            <a:endParaRPr lang="en-US" dirty="0"/>
           </a:p>
         </p:txBody>
       </p:sp>
@@ -33347,7 +34064,7 @@
 </p:sld>
 </file>
 
-<file path=ppt/slides/slide23.xml><?xml version="1.0" encoding="utf-8"?>
+<file path=ppt/slides/slide29.xml><?xml version="1.0" encoding="utf-8"?>
 <p:sld xmlns:a="http://schemas.openxmlformats.org/drawingml/2006/main" xmlns:r="http://schemas.openxmlformats.org/officeDocument/2006/relationships" xmlns:p="http://schemas.openxmlformats.org/presentationml/2006/main">
   <p:cSld>
     <p:spTree>
@@ -33380,19 +34097,18 @@
           <a:lstStyle/>
           <a:p>
             <a:r>
-              <a:rPr lang="en-US" dirty="0" err="1" smtClean="0"/>
+              <a:rPr lang="en-US" dirty="0" err="1"/>
               <a:t>Kirchoff’s</a:t>
             </a:r>
             <a:r>
-              <a:rPr lang="en-US" dirty="0" smtClean="0"/>
+              <a:rPr lang="en-US" dirty="0"/>
               <a:t> Laws</a:t>
             </a:r>
-            <a:endParaRPr lang="en-US" dirty="0"/>
           </a:p>
         </p:txBody>
       </p:sp>
-      <mc:AlternateContent xmlns:mc="http://schemas.openxmlformats.org/markup-compatibility/2006">
-        <mc:Choice xmlns:a14="http://schemas.microsoft.com/office/drawing/2010/main" Requires="a14">
+      <mc:AlternateContent xmlns:mc="http://schemas.openxmlformats.org/markup-compatibility/2006" xmlns:a14="http://schemas.microsoft.com/office/drawing/2010/main">
+        <mc:Choice Requires="a14">
           <p:sp>
             <p:nvSpPr>
               <p:cNvPr id="5" name="TextBox 4"/>
@@ -33420,7 +34136,7 @@
                   <a:buChar char="•"/>
                 </a:pPr>
                 <a:r>
-                  <a:rPr lang="en-US" dirty="0" smtClean="0">
+                  <a:rPr lang="en-US" dirty="0">
                     <a:solidFill>
                       <a:schemeClr val="bg1"/>
                     </a:solidFill>
@@ -33428,7 +34144,7 @@
                   <a:t>From </a:t>
                 </a:r>
                 <a:r>
-                  <a:rPr lang="en-US" dirty="0" err="1" smtClean="0">
+                  <a:rPr lang="en-US" dirty="0" err="1">
                     <a:solidFill>
                       <a:schemeClr val="bg1"/>
                     </a:solidFill>
@@ -33436,7 +34152,7 @@
                   <a:t>Kirchoff’s</a:t>
                 </a:r>
                 <a:r>
-                  <a:rPr lang="en-US" dirty="0" smtClean="0">
+                  <a:rPr lang="en-US" dirty="0">
                     <a:solidFill>
                       <a:schemeClr val="bg1"/>
                     </a:solidFill>
@@ -33444,7 +34160,7 @@
                   <a:t> 2</a:t>
                 </a:r>
                 <a:r>
-                  <a:rPr lang="en-US" baseline="30000" dirty="0" smtClean="0">
+                  <a:rPr lang="en-US" baseline="30000" dirty="0">
                     <a:solidFill>
                       <a:schemeClr val="bg1"/>
                     </a:solidFill>
@@ -33452,7 +34168,7 @@
                   <a:t>nd</a:t>
                 </a:r>
                 <a:r>
-                  <a:rPr lang="en-US" dirty="0" smtClean="0">
+                  <a:rPr lang="en-US" dirty="0">
                     <a:solidFill>
                       <a:schemeClr val="bg1"/>
                     </a:solidFill>
@@ -33855,7 +34571,7 @@
                     </m:r>
                   </m:oMath>
                 </a14:m>
-                <a:endParaRPr lang="en-US" dirty="0" smtClean="0">
+                <a:endParaRPr lang="en-US" dirty="0">
                   <a:solidFill>
                     <a:schemeClr val="bg1"/>
                   </a:solidFill>
@@ -34196,16 +34912,7 @@
                                 </a:solidFill>
                                 <a:latin typeface="Cambria Math" panose="02040503050406030204" pitchFamily="18" charset="0"/>
                               </a:rPr>
-                              <m:t>ℓ</m:t>
-                            </m:r>
-                            <m:r>
-                              <a:rPr lang="en-US" i="1">
-                                <a:solidFill>
-                                  <a:schemeClr val="bg1"/>
-                                </a:solidFill>
-                                <a:latin typeface="Cambria Math" panose="02040503050406030204" pitchFamily="18" charset="0"/>
-                              </a:rPr>
-                              <m:t>2</m:t>
+                              <m:t>ℓ2</m:t>
                             </m:r>
                           </m:sub>
                         </m:sSub>
@@ -34296,16 +35003,7 @@
                                 </a:solidFill>
                                 <a:latin typeface="Cambria Math" panose="02040503050406030204" pitchFamily="18" charset="0"/>
                               </a:rPr>
-                              <m:t>ℓ</m:t>
-                            </m:r>
-                            <m:r>
-                              <a:rPr lang="en-US" i="1">
-                                <a:solidFill>
-                                  <a:schemeClr val="bg1"/>
-                                </a:solidFill>
-                                <a:latin typeface="Cambria Math" panose="02040503050406030204" pitchFamily="18" charset="0"/>
-                              </a:rPr>
-                              <m:t>2</m:t>
+                              <m:t>ℓ2</m:t>
                             </m:r>
                           </m:sub>
                         </m:sSub>
@@ -34465,7 +35163,7 @@
                     </m:r>
                   </m:oMath>
                 </a14:m>
-                <a:endParaRPr lang="en-US" dirty="0" smtClean="0">
+                <a:endParaRPr lang="en-US" dirty="0">
                   <a:solidFill>
                     <a:schemeClr val="bg1"/>
                   </a:solidFill>
@@ -34477,7 +35175,7 @@
                   <a:buChar char="•"/>
                 </a:pPr>
                 <a:r>
-                  <a:rPr lang="en-US" dirty="0" smtClean="0">
+                  <a:rPr lang="en-US" dirty="0">
                     <a:solidFill>
                       <a:schemeClr val="bg1"/>
                     </a:solidFill>
@@ -34566,7 +35264,7 @@
                   </m:oMath>
                 </a14:m>
                 <a:r>
-                  <a:rPr lang="en-US" dirty="0" smtClean="0">
+                  <a:rPr lang="en-US" dirty="0">
                     <a:solidFill>
                       <a:schemeClr val="bg1"/>
                     </a:solidFill>
@@ -34580,7 +35278,7 @@
                   <a:buChar char="•"/>
                 </a:pPr>
                 <a:r>
-                  <a:rPr lang="en-US" dirty="0" smtClean="0">
+                  <a:rPr lang="en-US" dirty="0">
                     <a:solidFill>
                       <a:schemeClr val="bg1"/>
                     </a:solidFill>
@@ -35034,7 +35732,7 @@
                   </m:oMath>
                 </a14:m>
                 <a:r>
-                  <a:rPr lang="en-US" dirty="0" smtClean="0">
+                  <a:rPr lang="en-US" dirty="0">
                     <a:solidFill>
                       <a:schemeClr val="accent2">
                         <a:lumMod val="60000"/>
@@ -35044,14 +35742,6 @@
                   </a:rPr>
                   <a:t>)</a:t>
                 </a:r>
-                <a:endParaRPr lang="en-US" dirty="0">
-                  <a:solidFill>
-                    <a:schemeClr val="accent2">
-                      <a:lumMod val="60000"/>
-                      <a:lumOff val="40000"/>
-                    </a:schemeClr>
-                  </a:solidFill>
-                </a:endParaRPr>
               </a:p>
               <a:p>
                 <a:pPr marL="285750" indent="-285750">
@@ -35059,7 +35749,7 @@
                   <a:buChar char="•"/>
                 </a:pPr>
                 <a:r>
-                  <a:rPr lang="en-US" dirty="0" smtClean="0">
+                  <a:rPr lang="en-US" dirty="0">
                     <a:solidFill>
                       <a:schemeClr val="bg1"/>
                     </a:solidFill>
@@ -35153,16 +35843,7 @@
                                 </a:solidFill>
                                 <a:latin typeface="Cambria Math" panose="02040503050406030204" pitchFamily="18" charset="0"/>
                               </a:rPr>
-                              <m:t>ℓ</m:t>
-                            </m:r>
-                            <m:r>
-                              <a:rPr lang="en-US" i="1">
-                                <a:solidFill>
-                                  <a:srgbClr val="D8DD09"/>
-                                </a:solidFill>
-                                <a:latin typeface="Cambria Math" panose="02040503050406030204" pitchFamily="18" charset="0"/>
-                              </a:rPr>
-                              <m:t>2</m:t>
+                              <m:t>ℓ2</m:t>
                             </m:r>
                           </m:sub>
                         </m:sSub>
@@ -35708,7 +36389,7 @@
                     </m:r>
                   </m:oMath>
                 </a14:m>
-                <a:endParaRPr lang="en-US" dirty="0" smtClean="0">
+                <a:endParaRPr lang="en-US" dirty="0">
                   <a:solidFill>
                     <a:schemeClr val="accent2">
                       <a:lumMod val="60000"/>
@@ -35723,7 +36404,7 @@
                   <a:buChar char="•"/>
                 </a:pPr>
                 <a:r>
-                  <a:rPr lang="en-US" dirty="0" smtClean="0">
+                  <a:rPr lang="en-US" dirty="0">
                     <a:solidFill>
                       <a:schemeClr val="bg1"/>
                     </a:solidFill>
@@ -36495,7 +37176,7 @@
                     </m:d>
                   </m:oMath>
                 </a14:m>
-                <a:endParaRPr lang="en-US" dirty="0" smtClean="0">
+                <a:endParaRPr lang="en-US" dirty="0">
                   <a:solidFill>
                     <a:schemeClr val="bg1"/>
                   </a:solidFill>
@@ -36507,7 +37188,7 @@
                   <a:buChar char="•"/>
                 </a:pPr>
                 <a:r>
-                  <a:rPr lang="en-US" b="0" dirty="0" smtClean="0">
+                  <a:rPr lang="en-US" b="0" dirty="0">
                     <a:solidFill>
                       <a:schemeClr val="bg1"/>
                     </a:solidFill>
@@ -36825,7 +37506,7 @@
                     </m:d>
                   </m:oMath>
                 </a14:m>
-                <a:endParaRPr lang="en-US" dirty="0" smtClean="0">
+                <a:endParaRPr lang="en-US" dirty="0">
                   <a:solidFill>
                     <a:schemeClr val="bg1"/>
                   </a:solidFill>
@@ -36941,7 +37622,7 @@
                     </m:r>
                   </m:oMath>
                 </a14:m>
-                <a:endParaRPr lang="en-US" dirty="0" smtClean="0">
+                <a:endParaRPr lang="en-US" dirty="0">
                   <a:solidFill>
                     <a:schemeClr val="bg1"/>
                   </a:solidFill>
@@ -37243,7 +37924,7 @@
                   <a:buFont typeface="Arial" panose="020B0604020202020204" pitchFamily="34" charset="0"/>
                   <a:buChar char="•"/>
                 </a:pPr>
-                <a:endParaRPr lang="en-US" dirty="0" smtClean="0">
+                <a:endParaRPr lang="en-US" dirty="0">
                   <a:solidFill>
                     <a:schemeClr val="bg1"/>
                   </a:solidFill>
@@ -37252,7 +37933,7 @@
             </p:txBody>
           </p:sp>
         </mc:Choice>
-        <mc:Fallback>
+        <mc:Fallback xmlns="">
           <p:sp>
             <p:nvSpPr>
               <p:cNvPr id="5" name="TextBox 4"/>
@@ -37857,7 +38538,99 @@
 </p:sld>
 </file>
 
-<file path=ppt/slides/slide24.xml><?xml version="1.0" encoding="utf-8"?>
+<file path=ppt/slides/slide3.xml><?xml version="1.0" encoding="utf-8"?>
+<p:sld xmlns:a="http://schemas.openxmlformats.org/drawingml/2006/main" xmlns:r="http://schemas.openxmlformats.org/officeDocument/2006/relationships" xmlns:p="http://schemas.openxmlformats.org/presentationml/2006/main">
+  <p:cSld>
+    <p:spTree>
+      <p:nvGrpSpPr>
+        <p:cNvPr id="1" name=""/>
+        <p:cNvGrpSpPr/>
+        <p:nvPr/>
+      </p:nvGrpSpPr>
+      <p:grpSpPr>
+        <a:xfrm>
+          <a:off x="0" y="0"/>
+          <a:ext cx="0" cy="0"/>
+          <a:chOff x="0" y="0"/>
+          <a:chExt cx="0" cy="0"/>
+        </a:xfrm>
+      </p:grpSpPr>
+      <p:sp>
+        <p:nvSpPr>
+          <p:cNvPr id="2" name="Title 1">
+            <a:extLst>
+              <a:ext uri="{FF2B5EF4-FFF2-40B4-BE49-F238E27FC236}">
+                <a16:creationId xmlns:a16="http://schemas.microsoft.com/office/drawing/2014/main" id="{EA115F0C-0A02-4800-8D42-A54270204A2F}"/>
+              </a:ext>
+            </a:extLst>
+          </p:cNvPr>
+          <p:cNvSpPr>
+            <a:spLocks noGrp="1"/>
+          </p:cNvSpPr>
+          <p:nvPr>
+            <p:ph type="title"/>
+          </p:nvPr>
+        </p:nvSpPr>
+        <p:spPr/>
+        <p:txBody>
+          <a:bodyPr/>
+          <a:lstStyle/>
+          <a:p>
+            <a:r>
+              <a:rPr lang="en-US" dirty="0"/>
+              <a:t>The “Water Analogy”</a:t>
+            </a:r>
+          </a:p>
+        </p:txBody>
+      </p:sp>
+      <p:sp>
+        <p:nvSpPr>
+          <p:cNvPr id="3" name="Content Placeholder 2">
+            <a:extLst>
+              <a:ext uri="{FF2B5EF4-FFF2-40B4-BE49-F238E27FC236}">
+                <a16:creationId xmlns:a16="http://schemas.microsoft.com/office/drawing/2014/main" id="{F78E9F47-ABB9-47F0-AB08-8BD5D5D596FF}"/>
+              </a:ext>
+            </a:extLst>
+          </p:cNvPr>
+          <p:cNvSpPr>
+            <a:spLocks noGrp="1"/>
+          </p:cNvSpPr>
+          <p:nvPr>
+            <p:ph idx="1"/>
+          </p:nvPr>
+        </p:nvSpPr>
+        <p:spPr/>
+        <p:txBody>
+          <a:bodyPr/>
+          <a:lstStyle/>
+          <a:p>
+            <a:r>
+              <a:rPr lang="en-US" dirty="0"/>
+              <a:t>Often, I’ll compare electrical processes and components to flowing water, pipes, etc.</a:t>
+            </a:r>
+          </a:p>
+          <a:p>
+            <a:r>
+              <a:rPr lang="en-US" dirty="0"/>
+              <a:t>Again, these are approximations that are intended to help give an intuitive understanding of electricity, but that shouldn’t be taken too far</a:t>
+            </a:r>
+          </a:p>
+        </p:txBody>
+      </p:sp>
+    </p:spTree>
+    <p:extLst>
+      <p:ext uri="{BB962C8B-B14F-4D97-AF65-F5344CB8AC3E}">
+        <p14:creationId xmlns:p14="http://schemas.microsoft.com/office/powerpoint/2010/main" val="2663411272"/>
+      </p:ext>
+    </p:extLst>
+  </p:cSld>
+  <p:clrMapOvr>
+    <a:masterClrMapping/>
+  </p:clrMapOvr>
+</p:sld>
+</file>
+
+<file path=ppt/slides/slide30.xml><?xml version="1.0" encoding="utf-8"?>
 <p:sld xmlns:a="http://schemas.openxmlformats.org/drawingml/2006/main" xmlns:r="http://schemas.openxmlformats.org/officeDocument/2006/relationships" xmlns:p="http://schemas.openxmlformats.org/presentationml/2006/main">
   <p:cSld>
     <p:spTree>
@@ -37890,10 +38663,9 @@
           <a:lstStyle/>
           <a:p>
             <a:r>
-              <a:rPr lang="en-US" dirty="0" smtClean="0"/>
+              <a:rPr lang="en-US" dirty="0"/>
               <a:t>Power</a:t>
             </a:r>
-            <a:endParaRPr lang="en-US" dirty="0"/>
           </a:p>
         </p:txBody>
       </p:sp>
@@ -37915,68 +38687,67 @@
           <a:lstStyle/>
           <a:p>
             <a:r>
-              <a:rPr lang="en-US" dirty="0" smtClean="0"/>
+              <a:rPr lang="en-US" dirty="0"/>
               <a:t>“Energy per time”</a:t>
             </a:r>
           </a:p>
           <a:p>
             <a:r>
-              <a:rPr lang="en-US" dirty="0" smtClean="0"/>
+              <a:rPr lang="en-US" dirty="0"/>
               <a:t>For example, water has a specific heat of ~1055 J lbm</a:t>
             </a:r>
             <a:r>
-              <a:rPr lang="en-US" baseline="30000" dirty="0" smtClean="0"/>
+              <a:rPr lang="en-US" baseline="30000" dirty="0"/>
               <a:t>-1 </a:t>
             </a:r>
             <a:r>
-              <a:rPr lang="en-US" dirty="0" smtClean="0"/>
+              <a:rPr lang="en-US" dirty="0"/>
               <a:t>°F</a:t>
             </a:r>
             <a:r>
-              <a:rPr lang="en-US" baseline="30000" dirty="0" smtClean="0"/>
+              <a:rPr lang="en-US" baseline="30000" dirty="0"/>
               <a:t>-1</a:t>
             </a:r>
           </a:p>
           <a:p>
             <a:pPr lvl="1"/>
             <a:r>
-              <a:rPr lang="en-US" dirty="0" smtClean="0"/>
+              <a:rPr lang="en-US" dirty="0"/>
               <a:t>In other words, you need 1055 joules of energy to heat up a pound of water by 1 degree Fahrenheit</a:t>
             </a:r>
           </a:p>
           <a:p>
             <a:r>
-              <a:rPr lang="en-US" dirty="0" smtClean="0"/>
+              <a:rPr lang="en-US" dirty="0"/>
               <a:t>Power is measured in </a:t>
             </a:r>
             <a:r>
-              <a:rPr lang="en-US" i="1" dirty="0" smtClean="0"/>
+              <a:rPr lang="en-US" i="1" dirty="0"/>
               <a:t>watts</a:t>
             </a:r>
             <a:r>
-              <a:rPr lang="en-US" dirty="0" smtClean="0"/>
+              <a:rPr lang="en-US" dirty="0"/>
               <a:t> (1 joule per second)</a:t>
             </a:r>
           </a:p>
           <a:p>
             <a:pPr lvl="1"/>
             <a:r>
-              <a:rPr lang="en-US" dirty="0" smtClean="0"/>
+              <a:rPr lang="en-US" dirty="0"/>
               <a:t>Less commonly, horsepower or BTU per hour</a:t>
             </a:r>
           </a:p>
           <a:p>
             <a:r>
-              <a:rPr lang="en-US" dirty="0" smtClean="0"/>
+              <a:rPr lang="en-US" dirty="0"/>
               <a:t>If you have a heater that can put out 1 W, it will take you 1055 seconds to heat up a pound of water by 1 °F</a:t>
             </a:r>
           </a:p>
           <a:p>
             <a:r>
-              <a:rPr lang="en-US" dirty="0" smtClean="0"/>
+              <a:rPr lang="en-US" dirty="0"/>
               <a:t>Likewise, a 100 W heater will do it in ~10.5 seconds</a:t>
             </a:r>
-            <a:endParaRPr lang="en-US" dirty="0"/>
           </a:p>
         </p:txBody>
       </p:sp>
@@ -37990,17 +38761,10 @@
   <p:clrMapOvr>
     <a:masterClrMapping/>
   </p:clrMapOvr>
-  <p:timing>
-    <p:tnLst>
-      <p:par>
-        <p:cTn id="1" dur="indefinite" restart="never" nodeType="tmRoot"/>
-      </p:par>
-    </p:tnLst>
-  </p:timing>
 </p:sld>
 </file>
 
-<file path=ppt/slides/slide25.xml><?xml version="1.0" encoding="utf-8"?>
+<file path=ppt/slides/slide31.xml><?xml version="1.0" encoding="utf-8"?>
 <p:sld xmlns:a="http://schemas.openxmlformats.org/drawingml/2006/main" xmlns:r="http://schemas.openxmlformats.org/officeDocument/2006/relationships" xmlns:p="http://schemas.openxmlformats.org/presentationml/2006/main">
   <p:cSld>
     <p:spTree>
@@ -38033,10 +38797,9 @@
           <a:lstStyle/>
           <a:p>
             <a:r>
-              <a:rPr lang="en-US" dirty="0" smtClean="0"/>
+              <a:rPr lang="en-US" dirty="0"/>
               <a:t>Power</a:t>
             </a:r>
-            <a:endParaRPr lang="en-US" dirty="0"/>
           </a:p>
         </p:txBody>
       </p:sp>
@@ -38058,7 +38821,7 @@
               <a:lstStyle/>
               <a:p>
                 <a:r>
-                  <a:rPr lang="en-US" dirty="0" smtClean="0"/>
+                  <a:rPr lang="en-US" dirty="0"/>
                   <a:t>In electrical terms, power is the product of voltage and current</a:t>
                 </a:r>
               </a:p>
@@ -38099,13 +38862,13 @@
                     </m:r>
                   </m:oMath>
                 </a14:m>
-                <a:endParaRPr lang="en-US" b="0" dirty="0" smtClean="0">
+                <a:endParaRPr lang="en-US" b="0" dirty="0">
                   <a:ea typeface="Cambria Math" panose="02040503050406030204" pitchFamily="18" charset="0"/>
                 </a:endParaRPr>
               </a:p>
               <a:p>
                 <a:r>
-                  <a:rPr lang="en-US" dirty="0" smtClean="0"/>
+                  <a:rPr lang="en-US" dirty="0"/>
                   <a:t>Commonly formulated as </a:t>
                 </a:r>
                 <a14:m>
@@ -38162,12 +38925,12 @@
                     </m:r>
                   </m:oMath>
                 </a14:m>
-                <a:endParaRPr lang="en-US" b="0" dirty="0" smtClean="0"/>
+                <a:endParaRPr lang="en-US" b="0" dirty="0"/>
               </a:p>
               <a:p>
                 <a:pPr lvl="1"/>
                 <a:r>
-                  <a:rPr lang="en-US" dirty="0" smtClean="0"/>
+                  <a:rPr lang="en-US" dirty="0"/>
                   <a:t>Easily found by combining </a:t>
                 </a:r>
                 <a14:m>
@@ -38207,14 +38970,11 @@
                   </m:oMath>
                 </a14:m>
                 <a:r>
-                  <a:rPr lang="en-US" dirty="0" smtClean="0">
+                  <a:rPr lang="en-US" dirty="0">
                     <a:ea typeface="Cambria Math" panose="02040503050406030204" pitchFamily="18" charset="0"/>
                   </a:rPr>
                   <a:t> with Ohm’s Law</a:t>
                 </a:r>
-                <a:endParaRPr lang="en-US" dirty="0">
-                  <a:ea typeface="Cambria Math" panose="02040503050406030204" pitchFamily="18" charset="0"/>
-                </a:endParaRPr>
               </a:p>
             </p:txBody>
           </p:sp>
@@ -38263,17 +39023,10 @@
   <p:clrMapOvr>
     <a:masterClrMapping/>
   </p:clrMapOvr>
-  <p:timing>
-    <p:tnLst>
-      <p:par>
-        <p:cTn id="1" dur="indefinite" restart="never" nodeType="tmRoot"/>
-      </p:par>
-    </p:tnLst>
-  </p:timing>
 </p:sld>
 </file>
 
-<file path=ppt/slides/slide26.xml><?xml version="1.0" encoding="utf-8"?>
+<file path=ppt/slides/slide32.xml><?xml version="1.0" encoding="utf-8"?>
 <p:sld xmlns:a="http://schemas.openxmlformats.org/drawingml/2006/main" xmlns:r="http://schemas.openxmlformats.org/officeDocument/2006/relationships" xmlns:p="http://schemas.openxmlformats.org/presentationml/2006/main">
   <p:cSld>
     <p:spTree>
@@ -38306,10 +39059,9 @@
           <a:lstStyle/>
           <a:p>
             <a:r>
-              <a:rPr lang="en-US" dirty="0" smtClean="0"/>
+              <a:rPr lang="en-US" dirty="0"/>
               <a:t>Power</a:t>
             </a:r>
-            <a:endParaRPr lang="en-US" dirty="0"/>
           </a:p>
         </p:txBody>
       </p:sp>
@@ -38329,62 +39081,61 @@
           <a:lstStyle/>
           <a:p>
             <a:r>
-              <a:rPr lang="en-US" dirty="0" smtClean="0"/>
+              <a:rPr lang="en-US" dirty="0"/>
               <a:t>Power is a </a:t>
             </a:r>
             <a:r>
-              <a:rPr lang="en-US" i="1" dirty="0" smtClean="0"/>
+              <a:rPr lang="en-US" i="1" dirty="0"/>
               <a:t>signed </a:t>
             </a:r>
             <a:r>
-              <a:rPr lang="en-US" dirty="0" smtClean="0"/>
+              <a:rPr lang="en-US" dirty="0"/>
               <a:t>quantity; it can be positive or negative</a:t>
             </a:r>
           </a:p>
           <a:p>
             <a:r>
-              <a:rPr lang="en-US" dirty="0" smtClean="0"/>
+              <a:rPr lang="en-US" dirty="0"/>
               <a:t>By convention, things which </a:t>
             </a:r>
             <a:r>
-              <a:rPr lang="en-US" i="1" dirty="0" smtClean="0"/>
+              <a:rPr lang="en-US" i="1" dirty="0"/>
               <a:t>dissipate</a:t>
             </a:r>
             <a:r>
-              <a:rPr lang="en-US" dirty="0" smtClean="0"/>
+              <a:rPr lang="en-US" dirty="0"/>
               <a:t> power (heaters, motors, etc.) have </a:t>
             </a:r>
             <a:r>
-              <a:rPr lang="en-US" i="1" dirty="0" smtClean="0"/>
+              <a:rPr lang="en-US" i="1" dirty="0"/>
               <a:t>positive </a:t>
             </a:r>
             <a:r>
-              <a:rPr lang="en-US" dirty="0" smtClean="0"/>
+              <a:rPr lang="en-US" dirty="0"/>
               <a:t>power</a:t>
             </a:r>
           </a:p>
           <a:p>
             <a:r>
-              <a:rPr lang="en-US" dirty="0" smtClean="0"/>
+              <a:rPr lang="en-US" dirty="0"/>
               <a:t>Things which </a:t>
             </a:r>
             <a:r>
-              <a:rPr lang="en-US" i="1" dirty="0" smtClean="0"/>
+              <a:rPr lang="en-US" i="1" dirty="0"/>
               <a:t>supply</a:t>
             </a:r>
             <a:r>
-              <a:rPr lang="en-US" dirty="0" smtClean="0"/>
+              <a:rPr lang="en-US" dirty="0"/>
               <a:t> power (batteries, generators) have </a:t>
             </a:r>
             <a:r>
-              <a:rPr lang="en-US" i="1" dirty="0" smtClean="0"/>
+              <a:rPr lang="en-US" i="1" dirty="0"/>
               <a:t>negative </a:t>
             </a:r>
             <a:r>
-              <a:rPr lang="en-US" dirty="0" smtClean="0"/>
+              <a:rPr lang="en-US" dirty="0"/>
               <a:t>power</a:t>
             </a:r>
-            <a:endParaRPr lang="en-US" dirty="0"/>
           </a:p>
         </p:txBody>
       </p:sp>
@@ -38398,17 +39149,10 @@
   <p:clrMapOvr>
     <a:masterClrMapping/>
   </p:clrMapOvr>
-  <p:timing>
-    <p:tnLst>
-      <p:par>
-        <p:cTn id="1" dur="indefinite" restart="never" nodeType="tmRoot"/>
-      </p:par>
-    </p:tnLst>
-  </p:timing>
 </p:sld>
 </file>
 
-<file path=ppt/slides/slide27.xml><?xml version="1.0" encoding="utf-8"?>
+<file path=ppt/slides/slide33.xml><?xml version="1.0" encoding="utf-8"?>
 <p:sld xmlns:a="http://schemas.openxmlformats.org/drawingml/2006/main" xmlns:r="http://schemas.openxmlformats.org/officeDocument/2006/relationships" xmlns:p="http://schemas.openxmlformats.org/presentationml/2006/main">
   <p:cSld>
     <p:spTree>
@@ -38441,10 +39185,9 @@
           <a:lstStyle/>
           <a:p>
             <a:r>
-              <a:rPr lang="en-US" dirty="0" smtClean="0"/>
+              <a:rPr lang="en-US" dirty="0"/>
               <a:t>Power</a:t>
             </a:r>
-            <a:endParaRPr lang="en-US" dirty="0"/>
           </a:p>
         </p:txBody>
       </p:sp>
@@ -38462,61 +39205,61 @@
             </p:nvSpPr>
             <p:spPr>
               <a:xfrm>
-                <a:off x="124691" y="1600203"/>
-                <a:ext cx="8944494" cy="3728256"/>
+                <a:off x="124691" y="1600202"/>
+                <a:ext cx="8944494" cy="3964575"/>
               </a:xfrm>
             </p:spPr>
             <p:txBody>
               <a:bodyPr>
-                <a:normAutofit fontScale="70000" lnSpcReduction="20000"/>
+                <a:normAutofit fontScale="77500" lnSpcReduction="20000"/>
               </a:bodyPr>
               <a:lstStyle/>
               <a:p>
                 <a:r>
-                  <a:rPr lang="en-US" dirty="0" smtClean="0"/>
+                  <a:rPr lang="en-US" dirty="0"/>
                   <a:t>Power is important for two reasons</a:t>
                 </a:r>
               </a:p>
               <a:p>
                 <a:pPr lvl="1"/>
                 <a:r>
-                  <a:rPr lang="en-US" dirty="0" smtClean="0"/>
+                  <a:rPr lang="en-US" dirty="0"/>
                   <a:t>Conservation of energy</a:t>
                 </a:r>
               </a:p>
               <a:p>
                 <a:pPr lvl="2"/>
                 <a:r>
-                  <a:rPr lang="en-US" dirty="0" smtClean="0"/>
+                  <a:rPr lang="en-US" dirty="0"/>
                   <a:t>DC/DC converters are used to convert electricity at one voltage to another voltage</a:t>
                 </a:r>
               </a:p>
               <a:p>
                 <a:pPr lvl="2"/>
                 <a:r>
-                  <a:rPr lang="en-US" dirty="0" smtClean="0"/>
+                  <a:rPr lang="en-US" dirty="0"/>
                   <a:t>If you have 1 A at 12 V (12 W) going into a 12-&gt;5 DC/DC converter, you can get no more than 2.4 A at 5 V (12 W) out of it</a:t>
                 </a:r>
               </a:p>
               <a:p>
                 <a:pPr lvl="1"/>
                 <a:r>
-                  <a:rPr lang="en-US" dirty="0" smtClean="0"/>
+                  <a:rPr lang="en-US" dirty="0"/>
                   <a:t>Most components have power limits</a:t>
                 </a:r>
               </a:p>
               <a:p>
                 <a:pPr lvl="2"/>
                 <a:r>
-                  <a:rPr lang="en-US" dirty="0" smtClean="0"/>
+                  <a:rPr lang="en-US" dirty="0"/>
                   <a:t>A 10 </a:t>
                 </a:r>
                 <a:r>
-                  <a:rPr lang="el-GR" dirty="0" smtClean="0"/>
+                  <a:rPr lang="el-GR" dirty="0"/>
                   <a:t>Ω</a:t>
                 </a:r>
                 <a:r>
-                  <a:rPr lang="en-US" dirty="0" smtClean="0"/>
+                  <a:rPr lang="en-US" dirty="0"/>
                   <a:t> resistor rated at 0.25 W could handle ~160 mA </a:t>
                 </a:r>
                 <a14:m>
@@ -38623,12 +39366,12 @@
                     </m:d>
                   </m:oMath>
                 </a14:m>
-                <a:endParaRPr lang="en-US" dirty="0" smtClean="0"/>
+                <a:endParaRPr lang="en-US" dirty="0"/>
               </a:p>
               <a:p>
                 <a:pPr lvl="2"/>
                 <a:r>
-                  <a:rPr lang="en-US" dirty="0" smtClean="0"/>
+                  <a:rPr lang="en-US" dirty="0"/>
                   <a:t>If you try to run an amp through it, it will burn up </a:t>
                 </a:r>
                 <a14:m>
@@ -38715,15 +39458,14 @@
                     </m:d>
                   </m:oMath>
                 </a14:m>
-                <a:endParaRPr lang="en-US" dirty="0" smtClean="0"/>
+                <a:endParaRPr lang="en-US" dirty="0"/>
               </a:p>
               <a:p>
                 <a:pPr lvl="2"/>
                 <a:r>
-                  <a:rPr lang="en-US" dirty="0" smtClean="0"/>
+                  <a:rPr lang="en-US" dirty="0"/>
                   <a:t>In most cases, this is a thermal constraint; dissipating more heat requires a higher temperature, and components have maximum temperatures</a:t>
                 </a:r>
-                <a:endParaRPr lang="en-US" dirty="0"/>
               </a:p>
             </p:txBody>
           </p:sp>
@@ -38741,13 +39483,13 @@
             </p:nvSpPr>
             <p:spPr>
               <a:xfrm>
-                <a:off x="124691" y="1600203"/>
-                <a:ext cx="8944494" cy="3728256"/>
+                <a:off x="124691" y="1600202"/>
+                <a:ext cx="8944494" cy="3964575"/>
               </a:xfrm>
               <a:blipFill>
                 <a:blip r:embed="rId2"/>
                 <a:stretch>
-                  <a:fillRect l="-749" t="-2782"/>
+                  <a:fillRect l="-954" t="-2923" b="-1385"/>
                 </a:stretch>
               </a:blipFill>
             </p:spPr>
@@ -38776,17 +39518,10 @@
   <p:clrMapOvr>
     <a:masterClrMapping/>
   </p:clrMapOvr>
-  <p:timing>
-    <p:tnLst>
-      <p:par>
-        <p:cTn id="1" dur="indefinite" restart="never" nodeType="tmRoot"/>
-      </p:par>
-    </p:tnLst>
-  </p:timing>
 </p:sld>
 </file>
 
-<file path=ppt/slides/slide28.xml><?xml version="1.0" encoding="utf-8"?>
+<file path=ppt/slides/slide34.xml><?xml version="1.0" encoding="utf-8"?>
 <p:sld xmlns:a="http://schemas.openxmlformats.org/drawingml/2006/main" xmlns:r="http://schemas.openxmlformats.org/officeDocument/2006/relationships" xmlns:p="http://schemas.openxmlformats.org/presentationml/2006/main">
   <p:cSld>
     <p:spTree>
@@ -38819,10 +39554,9 @@
           <a:lstStyle/>
           <a:p>
             <a:r>
-              <a:rPr lang="en-US" dirty="0" smtClean="0"/>
+              <a:rPr lang="en-US" dirty="0"/>
               <a:t>I-V Plots</a:t>
             </a:r>
-            <a:endParaRPr lang="en-US" dirty="0"/>
           </a:p>
         </p:txBody>
       </p:sp>
@@ -38849,62 +39583,61 @@
           <a:lstStyle/>
           <a:p>
             <a:r>
-              <a:rPr lang="en-US" dirty="0" smtClean="0"/>
+              <a:rPr lang="en-US" dirty="0"/>
               <a:t>Plots of current vs. voltage</a:t>
             </a:r>
           </a:p>
           <a:p>
             <a:r>
-              <a:rPr lang="en-US" dirty="0" smtClean="0"/>
+              <a:rPr lang="en-US" dirty="0"/>
               <a:t>Current is considered </a:t>
             </a:r>
             <a:r>
-              <a:rPr lang="en-US" i="1" dirty="0" smtClean="0"/>
+              <a:rPr lang="en-US" i="1" dirty="0"/>
               <a:t>positive </a:t>
             </a:r>
             <a:r>
-              <a:rPr lang="en-US" dirty="0" smtClean="0"/>
+              <a:rPr lang="en-US" dirty="0"/>
               <a:t>if it flows </a:t>
             </a:r>
             <a:r>
-              <a:rPr lang="en-US" i="1" dirty="0" smtClean="0"/>
+              <a:rPr lang="en-US" i="1" dirty="0"/>
               <a:t>from</a:t>
             </a:r>
             <a:r>
-              <a:rPr lang="en-US" dirty="0" smtClean="0"/>
+              <a:rPr lang="en-US" dirty="0"/>
               <a:t> the positive pole of a component </a:t>
             </a:r>
             <a:r>
-              <a:rPr lang="en-US" i="1" dirty="0" smtClean="0"/>
+              <a:rPr lang="en-US" i="1" dirty="0"/>
               <a:t>to </a:t>
             </a:r>
             <a:r>
-              <a:rPr lang="en-US" dirty="0" smtClean="0"/>
+              <a:rPr lang="en-US" dirty="0"/>
               <a:t>the negative pole</a:t>
             </a:r>
           </a:p>
           <a:p>
             <a:r>
-              <a:rPr lang="en-US" dirty="0" smtClean="0"/>
+              <a:rPr lang="en-US" dirty="0"/>
               <a:t>In this circuit, the battery is seeing </a:t>
             </a:r>
             <a:r>
-              <a:rPr lang="en-US" i="1" dirty="0" smtClean="0"/>
+              <a:rPr lang="en-US" i="1" dirty="0"/>
               <a:t>negative </a:t>
             </a:r>
             <a:r>
-              <a:rPr lang="en-US" dirty="0" smtClean="0"/>
+              <a:rPr lang="en-US" dirty="0"/>
               <a:t>current, and the resistor is seeing </a:t>
             </a:r>
             <a:r>
-              <a:rPr lang="en-US" i="1" dirty="0" smtClean="0"/>
+              <a:rPr lang="en-US" i="1" dirty="0"/>
               <a:t>positive</a:t>
             </a:r>
             <a:r>
-              <a:rPr lang="en-US" dirty="0" smtClean="0"/>
+              <a:rPr lang="en-US" dirty="0"/>
               <a:t> current</a:t>
             </a:r>
-            <a:endParaRPr lang="en-US" dirty="0"/>
           </a:p>
         </p:txBody>
       </p:sp>
@@ -39016,10 +39749,9 @@
             <a:lstStyle/>
             <a:p>
               <a:r>
-                <a:rPr lang="en-US" dirty="0" smtClean="0"/>
+                <a:rPr lang="en-US" dirty="0"/>
                 <a:t>-</a:t>
               </a:r>
-              <a:endParaRPr lang="en-US" dirty="0"/>
             </a:p>
           </p:txBody>
         </p:sp>
@@ -39034,17 +39766,10 @@
   <p:clrMapOvr>
     <a:masterClrMapping/>
   </p:clrMapOvr>
-  <p:timing>
-    <p:tnLst>
-      <p:par>
-        <p:cTn id="1" dur="indefinite" restart="never" nodeType="tmRoot"/>
-      </p:par>
-    </p:tnLst>
-  </p:timing>
 </p:sld>
 </file>
 
-<file path=ppt/slides/slide29.xml><?xml version="1.0" encoding="utf-8"?>
+<file path=ppt/slides/slide35.xml><?xml version="1.0" encoding="utf-8"?>
 <p:sld xmlns:a="http://schemas.openxmlformats.org/drawingml/2006/main" xmlns:r="http://schemas.openxmlformats.org/officeDocument/2006/relationships" xmlns:p="http://schemas.openxmlformats.org/presentationml/2006/main">
   <p:cSld>
     <p:spTree>
@@ -39077,10 +39802,9 @@
           <a:lstStyle/>
           <a:p>
             <a:r>
-              <a:rPr lang="en-US" dirty="0" smtClean="0"/>
+              <a:rPr lang="en-US" dirty="0"/>
               <a:t>I-V Plots</a:t>
             </a:r>
-            <a:endParaRPr lang="en-US" dirty="0"/>
           </a:p>
         </p:txBody>
       </p:sp>
@@ -39119,116 +39843,10 @@
   <p:clrMapOvr>
     <a:masterClrMapping/>
   </p:clrMapOvr>
-  <p:timing>
-    <p:tnLst>
-      <p:par>
-        <p:cTn id="1" dur="indefinite" restart="never" nodeType="tmRoot"/>
-      </p:par>
-    </p:tnLst>
-  </p:timing>
 </p:sld>
 </file>
 
-<file path=ppt/slides/slide3.xml><?xml version="1.0" encoding="utf-8"?>
-<p:sld xmlns:a="http://schemas.openxmlformats.org/drawingml/2006/main" xmlns:r="http://schemas.openxmlformats.org/officeDocument/2006/relationships" xmlns:p="http://schemas.openxmlformats.org/presentationml/2006/main">
-  <p:cSld>
-    <p:spTree>
-      <p:nvGrpSpPr>
-        <p:cNvPr id="1" name=""/>
-        <p:cNvGrpSpPr/>
-        <p:nvPr/>
-      </p:nvGrpSpPr>
-      <p:grpSpPr>
-        <a:xfrm>
-          <a:off x="0" y="0"/>
-          <a:ext cx="0" cy="0"/>
-          <a:chOff x="0" y="0"/>
-          <a:chExt cx="0" cy="0"/>
-        </a:xfrm>
-      </p:grpSpPr>
-      <p:sp>
-        <p:nvSpPr>
-          <p:cNvPr id="2" name="Title 1">
-            <a:extLst>
-              <a:ext uri="{FF2B5EF4-FFF2-40B4-BE49-F238E27FC236}">
-                <a16:creationId xmlns:a16="http://schemas.microsoft.com/office/drawing/2014/main" id="{EA115F0C-0A02-4800-8D42-A54270204A2F}"/>
-              </a:ext>
-            </a:extLst>
-          </p:cNvPr>
-          <p:cNvSpPr>
-            <a:spLocks noGrp="1"/>
-          </p:cNvSpPr>
-          <p:nvPr>
-            <p:ph type="title"/>
-          </p:nvPr>
-        </p:nvSpPr>
-        <p:spPr/>
-        <p:txBody>
-          <a:bodyPr/>
-          <a:lstStyle/>
-          <a:p>
-            <a:r>
-              <a:rPr lang="en-US" dirty="0"/>
-              <a:t>The “Water Analogy”</a:t>
-            </a:r>
-          </a:p>
-        </p:txBody>
-      </p:sp>
-      <p:sp>
-        <p:nvSpPr>
-          <p:cNvPr id="3" name="Content Placeholder 2">
-            <a:extLst>
-              <a:ext uri="{FF2B5EF4-FFF2-40B4-BE49-F238E27FC236}">
-                <a16:creationId xmlns:a16="http://schemas.microsoft.com/office/drawing/2014/main" id="{F78E9F47-ABB9-47F0-AB08-8BD5D5D596FF}"/>
-              </a:ext>
-            </a:extLst>
-          </p:cNvPr>
-          <p:cNvSpPr>
-            <a:spLocks noGrp="1"/>
-          </p:cNvSpPr>
-          <p:nvPr>
-            <p:ph idx="1"/>
-          </p:nvPr>
-        </p:nvSpPr>
-        <p:spPr/>
-        <p:txBody>
-          <a:bodyPr/>
-          <a:lstStyle/>
-          <a:p>
-            <a:r>
-              <a:rPr lang="en-US" dirty="0"/>
-              <a:t>Often, I’ll compare electrical processes and components to flowing water, pipes, etc.</a:t>
-            </a:r>
-          </a:p>
-          <a:p>
-            <a:r>
-              <a:rPr lang="en-US" dirty="0"/>
-              <a:t>Again, these are approximations that are intended to help give an intuitive understanding of electricity, but that shouldn’t be taken too far</a:t>
-            </a:r>
-          </a:p>
-        </p:txBody>
-      </p:sp>
-    </p:spTree>
-    <p:extLst>
-      <p:ext uri="{BB962C8B-B14F-4D97-AF65-F5344CB8AC3E}">
-        <p14:creationId xmlns:p14="http://schemas.microsoft.com/office/powerpoint/2010/main" val="2663411272"/>
-      </p:ext>
-    </p:extLst>
-  </p:cSld>
-  <p:clrMapOvr>
-    <a:masterClrMapping/>
-  </p:clrMapOvr>
-  <p:timing>
-    <p:tnLst>
-      <p:par>
-        <p:cTn id="1" dur="indefinite" restart="never" nodeType="tmRoot"/>
-      </p:par>
-    </p:tnLst>
-  </p:timing>
-</p:sld>
-</file>
-
-<file path=ppt/slides/slide30.xml><?xml version="1.0" encoding="utf-8"?>
+<file path=ppt/slides/slide36.xml><?xml version="1.0" encoding="utf-8"?>
 <p:sld xmlns:a="http://schemas.openxmlformats.org/drawingml/2006/main" xmlns:r="http://schemas.openxmlformats.org/officeDocument/2006/relationships" xmlns:p="http://schemas.openxmlformats.org/presentationml/2006/main">
   <p:cSld>
     <p:spTree>
@@ -39261,10 +39879,9 @@
           <a:lstStyle/>
           <a:p>
             <a:r>
-              <a:rPr lang="en-US" dirty="0" smtClean="0"/>
+              <a:rPr lang="en-US" dirty="0"/>
               <a:t>I-V Plots</a:t>
             </a:r>
-            <a:endParaRPr lang="en-US" dirty="0"/>
           </a:p>
         </p:txBody>
       </p:sp>
@@ -39316,18 +39933,13 @@
           <a:lstStyle/>
           <a:p>
             <a:r>
-              <a:rPr lang="en-US" dirty="0" smtClean="0">
+              <a:rPr lang="en-US" dirty="0">
                 <a:solidFill>
                   <a:schemeClr val="bg1"/>
                 </a:solidFill>
               </a:rPr>
               <a:t>Remember: P=IV</a:t>
             </a:r>
-            <a:endParaRPr lang="en-US" dirty="0">
-              <a:solidFill>
-                <a:schemeClr val="bg1"/>
-              </a:solidFill>
-            </a:endParaRPr>
           </a:p>
         </p:txBody>
       </p:sp>
@@ -39341,17 +39953,10 @@
   <p:clrMapOvr>
     <a:masterClrMapping/>
   </p:clrMapOvr>
-  <p:timing>
-    <p:tnLst>
-      <p:par>
-        <p:cTn id="1" dur="indefinite" restart="never" nodeType="tmRoot"/>
-      </p:par>
-    </p:tnLst>
-  </p:timing>
 </p:sld>
 </file>
 
-<file path=ppt/slides/slide31.xml><?xml version="1.0" encoding="utf-8"?>
+<file path=ppt/slides/slide37.xml><?xml version="1.0" encoding="utf-8"?>
 <p:sld xmlns:a="http://schemas.openxmlformats.org/drawingml/2006/main" xmlns:r="http://schemas.openxmlformats.org/officeDocument/2006/relationships" xmlns:p="http://schemas.openxmlformats.org/presentationml/2006/main">
   <p:cSld>
     <p:spTree>
@@ -39384,10 +39989,9 @@
           <a:lstStyle/>
           <a:p>
             <a:r>
-              <a:rPr lang="en-US" dirty="0" smtClean="0"/>
+              <a:rPr lang="en-US" dirty="0"/>
               <a:t>LED</a:t>
             </a:r>
-            <a:endParaRPr lang="en-US" dirty="0"/>
           </a:p>
         </p:txBody>
       </p:sp>
@@ -39414,18 +40018,13 @@
           <a:lstStyle/>
           <a:p>
             <a:r>
-              <a:rPr lang="en-US" dirty="0" smtClean="0">
+              <a:rPr lang="en-US" dirty="0">
                 <a:solidFill>
                   <a:schemeClr val="bg1"/>
                 </a:solidFill>
               </a:rPr>
               <a:t>Typical I-V plot for a high-power LED</a:t>
             </a:r>
-            <a:endParaRPr lang="en-US" dirty="0">
-              <a:solidFill>
-                <a:schemeClr val="bg1"/>
-              </a:solidFill>
-            </a:endParaRPr>
           </a:p>
         </p:txBody>
       </p:sp>
@@ -39454,6 +40053,91 @@
           </a:graphicData>
         </a:graphic>
       </p:graphicFrame>
+      <p:sp>
+        <p:nvSpPr>
+          <p:cNvPr id="3" name="TextBox 2">
+            <a:extLst>
+              <a:ext uri="{FF2B5EF4-FFF2-40B4-BE49-F238E27FC236}">
+                <a16:creationId xmlns:a16="http://schemas.microsoft.com/office/drawing/2014/main" id="{CE2BC0E3-8063-42FE-A502-0D8E3A274348}"/>
+              </a:ext>
+            </a:extLst>
+          </p:cNvPr>
+          <p:cNvSpPr txBox="1"/>
+          <p:nvPr/>
+        </p:nvSpPr>
+        <p:spPr>
+          <a:xfrm>
+            <a:off x="0" y="2322567"/>
+            <a:ext cx="1454331" cy="738664"/>
+          </a:xfrm>
+          <a:prstGeom prst="rect">
+            <a:avLst/>
+          </a:prstGeom>
+          <a:noFill/>
+        </p:spPr>
+        <p:txBody>
+          <a:bodyPr wrap="square" rtlCol="0">
+            <a:spAutoFit/>
+          </a:bodyPr>
+          <a:lstStyle/>
+          <a:p>
+            <a:r>
+              <a:rPr lang="en-US" sz="1400" dirty="0">
+                <a:solidFill>
+                  <a:schemeClr val="bg1"/>
+                </a:solidFill>
+              </a:rPr>
+              <a:t>Maximum current specified by datasheet</a:t>
+            </a:r>
+          </a:p>
+        </p:txBody>
+      </p:sp>
+      <p:cxnSp>
+        <p:nvCxnSpPr>
+          <p:cNvPr id="6" name="Connector: Curved 5">
+            <a:extLst>
+              <a:ext uri="{FF2B5EF4-FFF2-40B4-BE49-F238E27FC236}">
+                <a16:creationId xmlns:a16="http://schemas.microsoft.com/office/drawing/2014/main" id="{6F838431-A8A8-4E03-BC2B-459B2B3403DF}"/>
+              </a:ext>
+            </a:extLst>
+          </p:cNvPr>
+          <p:cNvCxnSpPr>
+            <a:cxnSpLocks/>
+          </p:cNvCxnSpPr>
+          <p:nvPr/>
+        </p:nvCxnSpPr>
+        <p:spPr>
+          <a:xfrm flipV="1">
+            <a:off x="449680" y="1715589"/>
+            <a:ext cx="1004651" cy="606978"/>
+          </a:xfrm>
+          <a:prstGeom prst="curvedConnector3">
+            <a:avLst>
+              <a:gd name="adj1" fmla="val 50000"/>
+            </a:avLst>
+          </a:prstGeom>
+          <a:ln>
+            <a:solidFill>
+              <a:schemeClr val="bg1"/>
+            </a:solidFill>
+            <a:tailEnd type="triangle"/>
+          </a:ln>
+        </p:spPr>
+        <p:style>
+          <a:lnRef idx="1">
+            <a:schemeClr val="accent1"/>
+          </a:lnRef>
+          <a:fillRef idx="0">
+            <a:schemeClr val="accent1"/>
+          </a:fillRef>
+          <a:effectRef idx="0">
+            <a:schemeClr val="accent1"/>
+          </a:effectRef>
+          <a:fontRef idx="minor">
+            <a:schemeClr val="tx1"/>
+          </a:fontRef>
+        </p:style>
+      </p:cxnSp>
     </p:spTree>
     <p:extLst>
       <p:ext uri="{BB962C8B-B14F-4D97-AF65-F5344CB8AC3E}">
@@ -39464,17 +40148,10 @@
   <p:clrMapOvr>
     <a:masterClrMapping/>
   </p:clrMapOvr>
-  <p:timing>
-    <p:tnLst>
-      <p:par>
-        <p:cTn id="1" dur="indefinite" restart="never" nodeType="tmRoot"/>
-      </p:par>
-    </p:tnLst>
-  </p:timing>
 </p:sld>
 </file>
 
-<file path=ppt/slides/slide32.xml><?xml version="1.0" encoding="utf-8"?>
+<file path=ppt/slides/slide38.xml><?xml version="1.0" encoding="utf-8"?>
 <p:sld xmlns:a="http://schemas.openxmlformats.org/drawingml/2006/main" xmlns:r="http://schemas.openxmlformats.org/officeDocument/2006/relationships" xmlns:p="http://schemas.openxmlformats.org/presentationml/2006/main">
   <p:cSld>
     <p:spTree>
@@ -39507,10 +40184,9 @@
           <a:lstStyle/>
           <a:p>
             <a:r>
-              <a:rPr lang="en-US" dirty="0" smtClean="0"/>
+              <a:rPr lang="en-US" dirty="0"/>
               <a:t>LED</a:t>
             </a:r>
-            <a:endParaRPr lang="en-US" dirty="0"/>
           </a:p>
         </p:txBody>
       </p:sp>
@@ -39524,44 +40200,75 @@
             <p:ph idx="1"/>
           </p:nvPr>
         </p:nvSpPr>
-        <p:spPr/>
+        <p:spPr>
+          <a:xfrm>
+            <a:off x="457200" y="1600202"/>
+            <a:ext cx="8229600" cy="5114107"/>
+          </a:xfrm>
+        </p:spPr>
         <p:txBody>
           <a:bodyPr>
-            <a:normAutofit lnSpcReduction="10000"/>
+            <a:normAutofit fontScale="85000" lnSpcReduction="20000"/>
           </a:bodyPr>
           <a:lstStyle/>
           <a:p>
             <a:r>
-              <a:rPr lang="en-US" dirty="0" smtClean="0"/>
+              <a:rPr lang="en-US" dirty="0"/>
               <a:t>Generally, we want to squeeze as much light as we can out of an LED, without burning it up</a:t>
             </a:r>
           </a:p>
           <a:p>
             <a:r>
-              <a:rPr lang="en-US" dirty="0" smtClean="0"/>
-              <a:t>Therefore, we want to keep the operating point close to the current limit, but not over it</a:t>
+              <a:rPr lang="en-US" dirty="0"/>
+              <a:t>The power supplied to the LED must be dissipated</a:t>
+            </a:r>
+          </a:p>
+          <a:p>
+            <a:pPr lvl="1"/>
+            <a:r>
+              <a:rPr lang="en-US" dirty="0"/>
+              <a:t>More power requires higher temperature to dissipate</a:t>
+            </a:r>
+          </a:p>
+          <a:p>
+            <a:pPr lvl="1"/>
+            <a:r>
+              <a:rPr lang="en-US" dirty="0"/>
+              <a:t>Excess power increases the thermal equilibrium of the diode past the maximum temperature</a:t>
+            </a:r>
+          </a:p>
+          <a:p>
+            <a:pPr lvl="1"/>
+            <a:r>
+              <a:rPr lang="en-US" dirty="0"/>
+              <a:t>This kills the diode</a:t>
             </a:r>
           </a:p>
           <a:p>
             <a:r>
-              <a:rPr lang="en-US" dirty="0" smtClean="0"/>
+              <a:rPr lang="en-US" dirty="0"/>
+              <a:t>Therefore, we want to keep the operating point close to the power limit, but not over it</a:t>
+            </a:r>
+          </a:p>
+          <a:p>
+            <a:r>
+              <a:rPr lang="en-US" dirty="0"/>
               <a:t>To achieve this, we can:</a:t>
             </a:r>
           </a:p>
           <a:p>
             <a:pPr lvl="1"/>
             <a:r>
-              <a:rPr lang="en-US" dirty="0" smtClean="0"/>
+              <a:rPr lang="en-US" dirty="0"/>
               <a:t>Use a power supply that tries to maintain a specified voltage (voltage source)</a:t>
             </a:r>
           </a:p>
           <a:p>
             <a:pPr lvl="1"/>
             <a:r>
-              <a:rPr lang="en-US" dirty="0" smtClean="0"/>
+              <a:rPr lang="en-US" dirty="0"/>
               <a:t>Use a power supply that tries to maintain a specified current (current source)</a:t>
             </a:r>
-            <a:endParaRPr lang="en-US" dirty="0"/>
           </a:p>
         </p:txBody>
       </p:sp>
@@ -39575,17 +40282,10 @@
   <p:clrMapOvr>
     <a:masterClrMapping/>
   </p:clrMapOvr>
-  <p:timing>
-    <p:tnLst>
-      <p:par>
-        <p:cTn id="1" dur="indefinite" restart="never" nodeType="tmRoot"/>
-      </p:par>
-    </p:tnLst>
-  </p:timing>
 </p:sld>
 </file>
 
-<file path=ppt/slides/slide33.xml><?xml version="1.0" encoding="utf-8"?>
+<file path=ppt/slides/slide39.xml><?xml version="1.0" encoding="utf-8"?>
 <p:sld xmlns:a="http://schemas.openxmlformats.org/drawingml/2006/main" xmlns:r="http://schemas.openxmlformats.org/officeDocument/2006/relationships" xmlns:p="http://schemas.openxmlformats.org/presentationml/2006/main">
   <p:cSld>
     <p:spTree>
@@ -39618,10 +40318,9 @@
           <a:lstStyle/>
           <a:p>
             <a:r>
-              <a:rPr lang="en-US" dirty="0" smtClean="0"/>
+              <a:rPr lang="en-US" dirty="0"/>
               <a:t>LED</a:t>
             </a:r>
-            <a:endParaRPr lang="en-US" dirty="0"/>
           </a:p>
         </p:txBody>
       </p:sp>
@@ -39673,21 +40372,21 @@
           <a:lstStyle/>
           <a:p>
             <a:r>
-              <a:rPr lang="en-US" dirty="0" smtClean="0"/>
+              <a:rPr lang="en-US" dirty="0"/>
               <a:t>To stay in this section of the curve, we can either:</a:t>
             </a:r>
           </a:p>
           <a:p>
             <a:pPr lvl="1"/>
             <a:r>
-              <a:rPr lang="en-US" dirty="0" smtClean="0"/>
+              <a:rPr lang="en-US" dirty="0"/>
               <a:t>Maintain voltage between 3.177 V and 3.200 V, OR</a:t>
             </a:r>
           </a:p>
           <a:p>
             <a:pPr lvl="1"/>
             <a:r>
-              <a:rPr lang="en-US" dirty="0" smtClean="0"/>
+              <a:rPr lang="en-US" dirty="0"/>
               <a:t>Maintain current between 0.944 A and 1.000 A</a:t>
             </a:r>
           </a:p>
@@ -39853,51 +40552,27 @@
           </a:lstStyle>
           <a:p>
             <a:r>
-              <a:rPr lang="en-US" dirty="0" smtClean="0"/>
-              <a:t>Voltage control requires PS accuracy </a:t>
-            </a:r>
-            <a:r>
               <a:rPr lang="en-US" dirty="0"/>
-              <a:t>of </a:t>
-            </a:r>
-            <a:r>
-              <a:rPr lang="en-US" dirty="0" smtClean="0"/>
-              <a:t>0.7%</a:t>
-            </a:r>
-          </a:p>
-          <a:p>
-            <a:r>
-              <a:rPr lang="en-US" dirty="0" smtClean="0"/>
-              <a:t>Current control requires PS accuracy </a:t>
-            </a:r>
-            <a:r>
-              <a:rPr lang="en-US" dirty="0"/>
-              <a:t>of </a:t>
-            </a:r>
-            <a:r>
-              <a:rPr lang="en-US" dirty="0" smtClean="0"/>
-              <a:t>5.6%</a:t>
+              <a:t>Voltage control requires PS accuracy of 0.7%</a:t>
             </a:r>
           </a:p>
           <a:p>
             <a:r>
               <a:rPr lang="en-US" dirty="0"/>
-              <a:t>This is why constant-current power supplies are usually used to drive large </a:t>
+              <a:t>Current control requires PS accuracy of 5.6%</a:t>
             </a:r>
+          </a:p>
+          <a:p>
             <a:r>
-              <a:rPr lang="en-US" dirty="0" smtClean="0"/>
-              <a:t>LEDs</a:t>
+              <a:rPr lang="en-US" dirty="0"/>
+              <a:t>This is why constant-current power supplies are usually used to drive large LEDs</a:t>
             </a:r>
           </a:p>
           <a:p>
             <a:pPr lvl="1"/>
             <a:r>
               <a:rPr lang="en-US" dirty="0"/>
-              <a:t>Current control requires less accuracy than voltage </a:t>
-            </a:r>
-            <a:r>
-              <a:rPr lang="en-US" dirty="0" smtClean="0"/>
-              <a:t>control</a:t>
+              <a:t>Current control requires less accuracy than voltage control</a:t>
             </a:r>
           </a:p>
         </p:txBody>
@@ -39912,13 +40587,6 @@
   <p:clrMapOvr>
     <a:masterClrMapping/>
   </p:clrMapOvr>
-  <p:timing>
-    <p:tnLst>
-      <p:par>
-        <p:cTn id="1" dur="indefinite" restart="never" nodeType="tmRoot"/>
-      </p:par>
-    </p:tnLst>
-  </p:timing>
 </p:sld>
 </file>
 
@@ -40056,13 +40724,169 @@
   <p:clrMapOvr>
     <a:masterClrMapping/>
   </p:clrMapOvr>
-  <p:timing>
-    <p:tnLst>
-      <p:par>
-        <p:cTn id="1" dur="indefinite" restart="never" nodeType="tmRoot"/>
-      </p:par>
-    </p:tnLst>
-  </p:timing>
+</p:sld>
+</file>
+
+<file path=ppt/slides/slide40.xml><?xml version="1.0" encoding="utf-8"?>
+<p:sld xmlns:a="http://schemas.openxmlformats.org/drawingml/2006/main" xmlns:r="http://schemas.openxmlformats.org/officeDocument/2006/relationships" xmlns:p="http://schemas.openxmlformats.org/presentationml/2006/main">
+  <p:cSld>
+    <p:spTree>
+      <p:nvGrpSpPr>
+        <p:cNvPr id="1" name=""/>
+        <p:cNvGrpSpPr/>
+        <p:nvPr/>
+      </p:nvGrpSpPr>
+      <p:grpSpPr>
+        <a:xfrm>
+          <a:off x="0" y="0"/>
+          <a:ext cx="0" cy="0"/>
+          <a:chOff x="0" y="0"/>
+          <a:chExt cx="0" cy="0"/>
+        </a:xfrm>
+      </p:grpSpPr>
+      <p:sp>
+        <p:nvSpPr>
+          <p:cNvPr id="5" name="Title 4">
+            <a:extLst>
+              <a:ext uri="{FF2B5EF4-FFF2-40B4-BE49-F238E27FC236}">
+                <a16:creationId xmlns:a16="http://schemas.microsoft.com/office/drawing/2014/main" id="{233FDCB3-5A2D-4E14-AC29-0DB3F4F9CD58}"/>
+              </a:ext>
+            </a:extLst>
+          </p:cNvPr>
+          <p:cNvSpPr>
+            <a:spLocks noGrp="1"/>
+          </p:cNvSpPr>
+          <p:nvPr>
+            <p:ph type="title"/>
+          </p:nvPr>
+        </p:nvSpPr>
+        <p:spPr/>
+        <p:txBody>
+          <a:bodyPr/>
+          <a:lstStyle/>
+          <a:p>
+            <a:r>
+              <a:rPr lang="en-US" dirty="0"/>
+              <a:t>The Trouble With Sources</a:t>
+            </a:r>
+          </a:p>
+        </p:txBody>
+      </p:sp>
+      <p:sp>
+        <p:nvSpPr>
+          <p:cNvPr id="6" name="Content Placeholder 5">
+            <a:extLst>
+              <a:ext uri="{FF2B5EF4-FFF2-40B4-BE49-F238E27FC236}">
+                <a16:creationId xmlns:a16="http://schemas.microsoft.com/office/drawing/2014/main" id="{46F5CB7B-D530-4788-A689-72E9D52E71AD}"/>
+              </a:ext>
+            </a:extLst>
+          </p:cNvPr>
+          <p:cNvSpPr>
+            <a:spLocks noGrp="1"/>
+          </p:cNvSpPr>
+          <p:nvPr>
+            <p:ph idx="1"/>
+          </p:nvPr>
+        </p:nvSpPr>
+        <p:spPr/>
+        <p:txBody>
+          <a:bodyPr/>
+          <a:lstStyle/>
+          <a:p>
+            <a:endParaRPr lang="en-US"/>
+          </a:p>
+        </p:txBody>
+      </p:sp>
+    </p:spTree>
+    <p:extLst>
+      <p:ext uri="{BB962C8B-B14F-4D97-AF65-F5344CB8AC3E}">
+        <p14:creationId xmlns:p14="http://schemas.microsoft.com/office/powerpoint/2010/main" val="2299049736"/>
+      </p:ext>
+    </p:extLst>
+  </p:cSld>
+  <p:clrMapOvr>
+    <a:masterClrMapping/>
+  </p:clrMapOvr>
+</p:sld>
+</file>
+
+<file path=ppt/slides/slide41.xml><?xml version="1.0" encoding="utf-8"?>
+<p:sld xmlns:a="http://schemas.openxmlformats.org/drawingml/2006/main" xmlns:r="http://schemas.openxmlformats.org/officeDocument/2006/relationships" xmlns:p="http://schemas.openxmlformats.org/presentationml/2006/main">
+  <p:cSld>
+    <p:spTree>
+      <p:nvGrpSpPr>
+        <p:cNvPr id="1" name=""/>
+        <p:cNvGrpSpPr/>
+        <p:nvPr/>
+      </p:nvGrpSpPr>
+      <p:grpSpPr>
+        <a:xfrm>
+          <a:off x="0" y="0"/>
+          <a:ext cx="0" cy="0"/>
+          <a:chOff x="0" y="0"/>
+          <a:chExt cx="0" cy="0"/>
+        </a:xfrm>
+      </p:grpSpPr>
+      <p:sp>
+        <p:nvSpPr>
+          <p:cNvPr id="2" name="Title 1">
+            <a:extLst>
+              <a:ext uri="{FF2B5EF4-FFF2-40B4-BE49-F238E27FC236}">
+                <a16:creationId xmlns:a16="http://schemas.microsoft.com/office/drawing/2014/main" id="{E9C110BE-3739-4D82-BCC4-5D15A4E7D52D}"/>
+              </a:ext>
+            </a:extLst>
+          </p:cNvPr>
+          <p:cNvSpPr>
+            <a:spLocks noGrp="1"/>
+          </p:cNvSpPr>
+          <p:nvPr>
+            <p:ph type="title"/>
+          </p:nvPr>
+        </p:nvSpPr>
+        <p:spPr/>
+        <p:txBody>
+          <a:bodyPr/>
+          <a:lstStyle/>
+          <a:p>
+            <a:endParaRPr lang="en-US" dirty="0"/>
+          </a:p>
+        </p:txBody>
+      </p:sp>
+      <p:sp>
+        <p:nvSpPr>
+          <p:cNvPr id="3" name="Content Placeholder 2">
+            <a:extLst>
+              <a:ext uri="{FF2B5EF4-FFF2-40B4-BE49-F238E27FC236}">
+                <a16:creationId xmlns:a16="http://schemas.microsoft.com/office/drawing/2014/main" id="{162B254E-736E-4FD9-B355-657FDD8BC765}"/>
+              </a:ext>
+            </a:extLst>
+          </p:cNvPr>
+          <p:cNvSpPr>
+            <a:spLocks noGrp="1"/>
+          </p:cNvSpPr>
+          <p:nvPr>
+            <p:ph idx="1"/>
+          </p:nvPr>
+        </p:nvSpPr>
+        <p:spPr/>
+        <p:txBody>
+          <a:bodyPr/>
+          <a:lstStyle/>
+          <a:p>
+            <a:endParaRPr lang="en-US"/>
+          </a:p>
+        </p:txBody>
+      </p:sp>
+    </p:spTree>
+    <p:extLst>
+      <p:ext uri="{BB962C8B-B14F-4D97-AF65-F5344CB8AC3E}">
+        <p14:creationId xmlns:p14="http://schemas.microsoft.com/office/powerpoint/2010/main" val="2990996252"/>
+      </p:ext>
+    </p:extLst>
+  </p:cSld>
+  <p:clrMapOvr>
+    <a:masterClrMapping/>
+  </p:clrMapOvr>
 </p:sld>
 </file>
 
@@ -40111,8 +40935,8 @@
           </a:p>
         </p:txBody>
       </p:sp>
-      <mc:AlternateContent xmlns:mc="http://schemas.openxmlformats.org/markup-compatibility/2006">
-        <mc:Choice xmlns:a14="http://schemas.microsoft.com/office/drawing/2010/main" Requires="a14">
+      <mc:AlternateContent xmlns:mc="http://schemas.openxmlformats.org/markup-compatibility/2006" xmlns:a14="http://schemas.microsoft.com/office/drawing/2010/main">
+        <mc:Choice Requires="a14">
           <p:sp>
             <p:nvSpPr>
               <p:cNvPr id="3" name="Content Placeholder 2">
@@ -40142,7 +40966,7 @@
               <a:lstStyle/>
               <a:p>
                 <a:r>
-                  <a:rPr lang="en-US" dirty="0" smtClean="0"/>
+                  <a:rPr lang="en-US" dirty="0"/>
                   <a:t>“Opposite charges attract; like charges repel”</a:t>
                 </a:r>
               </a:p>
@@ -40462,14 +41286,9 @@
                   </m:oMath>
                 </a14:m>
                 <a:r>
-                  <a:rPr lang="en-US" dirty="0" smtClean="0"/>
-                  <a:t> </a:t>
+                  <a:rPr lang="en-US" dirty="0"/>
+                  <a:t> is “Coulomb’s constant”, </a:t>
                 </a:r>
-                <a:r>
-                  <a:rPr lang="en-US" dirty="0"/>
-                  <a:t>is “Coulomb’s constant”, </a:t>
-                </a:r>
-                <a:endParaRPr lang="en-US" dirty="0" smtClean="0"/>
               </a:p>
               <a:p>
                 <a:pPr marL="0" indent="0">
@@ -40598,7 +41417,7 @@
             </p:txBody>
           </p:sp>
         </mc:Choice>
-        <mc:Fallback>
+        <mc:Fallback xmlns="">
           <p:sp>
             <p:nvSpPr>
               <p:cNvPr id="3" name="Content Placeholder 2">
@@ -40676,13 +41495,6 @@
   <p:clrMapOvr>
     <a:masterClrMapping/>
   </p:clrMapOvr>
-  <p:timing>
-    <p:tnLst>
-      <p:par>
-        <p:cTn id="1" dur="indefinite" restart="never" nodeType="tmRoot"/>
-      </p:par>
-    </p:tnLst>
-  </p:timing>
 </p:sld>
 </file>
 
@@ -40747,14 +41559,54 @@
             <p:ph idx="1"/>
           </p:nvPr>
         </p:nvSpPr>
-        <p:spPr/>
+        <p:spPr>
+          <a:xfrm>
+            <a:off x="216527" y="1600202"/>
+            <a:ext cx="6305775" cy="4983160"/>
+          </a:xfrm>
+        </p:spPr>
         <p:txBody>
-          <a:bodyPr/>
+          <a:bodyPr>
+            <a:normAutofit fontScale="85000" lnSpcReduction="10000"/>
+          </a:bodyPr>
           <a:lstStyle/>
           <a:p>
             <a:r>
               <a:rPr lang="en-US" dirty="0"/>
               <a:t>This leads directly to the concept of the “electrometer”</a:t>
+            </a:r>
+          </a:p>
+          <a:p>
+            <a:r>
+              <a:rPr lang="en-US" dirty="0"/>
+              <a:t>One of the first electrical instruments</a:t>
+            </a:r>
+          </a:p>
+          <a:p>
+            <a:r>
+              <a:rPr lang="en-US" dirty="0"/>
+              <a:t>When electric charge is applied to the plate at the top of the electrometer, it’s conducted to the two leaves</a:t>
+            </a:r>
+          </a:p>
+          <a:p>
+            <a:pPr lvl="1"/>
+            <a:r>
+              <a:rPr lang="en-US" dirty="0"/>
+              <a:t>Since they’re charged the same, they repel</a:t>
+            </a:r>
+          </a:p>
+          <a:p>
+            <a:pPr lvl="1"/>
+            <a:r>
+              <a:rPr lang="en-US" dirty="0"/>
+              <a:t>Note that this is independent of the polarity of the charge applied to the plate</a:t>
+            </a:r>
+          </a:p>
+          <a:p>
+            <a:pPr lvl="1"/>
+            <a:r>
+              <a:rPr lang="en-US" dirty="0"/>
+              <a:t>Therefore, it can’t determine the polarity of a charge, just its magnitude</a:t>
             </a:r>
           </a:p>
           <a:p>
@@ -40794,7 +41646,7 @@
         </p:blipFill>
         <p:spPr bwMode="auto">
           <a:xfrm>
-            <a:off x="4014234" y="2380319"/>
+            <a:off x="6522302" y="2476114"/>
             <a:ext cx="2483548" cy="4249081"/>
           </a:xfrm>
           <a:prstGeom prst="rect">
@@ -40822,13 +41674,6 @@
   <p:clrMapOvr>
     <a:masterClrMapping/>
   </p:clrMapOvr>
-  <p:timing>
-    <p:tnLst>
-      <p:par>
-        <p:cTn id="1" dur="indefinite" restart="never" nodeType="tmRoot"/>
-      </p:par>
-    </p:tnLst>
-  </p:timing>
 </p:sld>
 </file>
 
@@ -40996,13 +41841,6 @@
   <p:clrMapOvr>
     <a:masterClrMapping/>
   </p:clrMapOvr>
-  <p:timing>
-    <p:tnLst>
-      <p:par>
-        <p:cTn id="1" dur="indefinite" restart="never" nodeType="tmRoot"/>
-      </p:par>
-    </p:tnLst>
-  </p:timing>
 </p:sld>
 </file>
 
@@ -41137,13 +41975,6 @@
   <p:clrMapOvr>
     <a:masterClrMapping/>
   </p:clrMapOvr>
-  <p:timing>
-    <p:tnLst>
-      <p:par>
-        <p:cTn id="1" dur="indefinite" restart="never" nodeType="tmRoot"/>
-      </p:par>
-    </p:tnLst>
-  </p:timing>
 </p:sld>
 </file>
 
@@ -41407,13 +42238,6 @@
   <p:clrMapOvr>
     <a:masterClrMapping/>
   </p:clrMapOvr>
-  <p:timing>
-    <p:tnLst>
-      <p:par>
-        <p:cTn id="1" dur="indefinite" restart="never" nodeType="tmRoot"/>
-      </p:par>
-    </p:tnLst>
-  </p:timing>
 </p:sld>
 </file>
 

</xml_diff>

<commit_message>
Added source and battery stuff
</commit_message>
<xml_diff>
--- a/Electronics 101.pptx
+++ b/Electronics 101.pptx
@@ -5,7 +5,7 @@
     <p:sldMasterId id="2147483660" r:id="rId1"/>
   </p:sldMasterIdLst>
   <p:notesMasterIdLst>
-    <p:notesMasterId r:id="rId43"/>
+    <p:notesMasterId r:id="rId48"/>
   </p:notesMasterIdLst>
   <p:sldIdLst>
     <p:sldId id="256" r:id="rId2"/>
@@ -49,6 +49,11 @@
     <p:sldId id="287" r:id="rId40"/>
     <p:sldId id="289" r:id="rId41"/>
     <p:sldId id="290" r:id="rId42"/>
+    <p:sldId id="297" r:id="rId43"/>
+    <p:sldId id="298" r:id="rId44"/>
+    <p:sldId id="299" r:id="rId45"/>
+    <p:sldId id="300" r:id="rId46"/>
+    <p:sldId id="301" r:id="rId47"/>
   </p:sldIdLst>
   <p:sldSz cx="9144000" cy="6858000" type="screen4x3"/>
   <p:notesSz cx="6858000" cy="9144000"/>
@@ -148,6 +153,80 @@
     </a:lvl9pPr>
   </p:defaultTextStyle>
   <p:extLst>
+    <p:ext uri="{521415D9-36F7-43E2-AB2F-B90AF26B5E84}">
+      <p14:sectionLst xmlns:p14="http://schemas.microsoft.com/office/powerpoint/2010/main">
+        <p14:section name="Default Section" id="{C39538D5-5273-411D-9E9D-5787E22B10F8}">
+          <p14:sldIdLst>
+            <p14:sldId id="256"/>
+            <p14:sldId id="257"/>
+            <p14:sldId id="258"/>
+          </p14:sldIdLst>
+        </p14:section>
+        <p14:section name="C, V, I, R" id="{E3AE6CD7-D0DC-45DC-AA1D-F90C7F027D30}">
+          <p14:sldIdLst>
+            <p14:sldId id="259"/>
+            <p14:sldId id="260"/>
+            <p14:sldId id="261"/>
+            <p14:sldId id="263"/>
+            <p14:sldId id="262"/>
+            <p14:sldId id="269"/>
+            <p14:sldId id="264"/>
+            <p14:sldId id="265"/>
+            <p14:sldId id="266"/>
+            <p14:sldId id="268"/>
+            <p14:sldId id="267"/>
+            <p14:sldId id="270"/>
+            <p14:sldId id="271"/>
+          </p14:sldIdLst>
+        </p14:section>
+        <p14:section name="Schematics" id="{44D0808D-B728-4D3E-A100-6D4CE2ED2A8C}">
+          <p14:sldIdLst>
+            <p14:sldId id="291"/>
+            <p14:sldId id="292"/>
+            <p14:sldId id="293"/>
+            <p14:sldId id="294"/>
+            <p14:sldId id="295"/>
+            <p14:sldId id="296"/>
+          </p14:sldIdLst>
+        </p14:section>
+        <p14:section name="Kirchoff's Laws" id="{AC7E1139-1846-4A87-9E66-B56D9A677790}">
+          <p14:sldIdLst>
+            <p14:sldId id="272"/>
+            <p14:sldId id="274"/>
+            <p14:sldId id="273"/>
+            <p14:sldId id="275"/>
+            <p14:sldId id="283"/>
+            <p14:sldId id="284"/>
+            <p14:sldId id="285"/>
+          </p14:sldIdLst>
+        </p14:section>
+        <p14:section name="Power" id="{2F3ECD20-A228-4BE4-A73F-D613321219AB}">
+          <p14:sldIdLst>
+            <p14:sldId id="276"/>
+            <p14:sldId id="277"/>
+            <p14:sldId id="278"/>
+            <p14:sldId id="279"/>
+            <p14:sldId id="280"/>
+            <p14:sldId id="281"/>
+            <p14:sldId id="282"/>
+            <p14:sldId id="286"/>
+            <p14:sldId id="288"/>
+            <p14:sldId id="287"/>
+          </p14:sldIdLst>
+        </p14:section>
+        <p14:section name="Sources" id="{6C6B8968-F43D-42F3-B7EB-BE5DE69AB83F}">
+          <p14:sldIdLst>
+            <p14:sldId id="289"/>
+            <p14:sldId id="290"/>
+            <p14:sldId id="297"/>
+            <p14:sldId id="298"/>
+            <p14:sldId id="299"/>
+            <p14:sldId id="300"/>
+            <p14:sldId id="301"/>
+          </p14:sldIdLst>
+        </p14:section>
+      </p14:sectionLst>
+    </p:ext>
     <p:ext uri="{EFAFB233-063F-42B5-8137-9DF3F51BA10A}">
       <p15:sldGuideLst xmlns:p15="http://schemas.microsoft.com/office/powerpoint/2012/main"/>
     </p:ext>
@@ -9953,6 +10032,7 @@
               </a:p>
             </c:rich>
           </c:tx>
+          <c:layout/>
           <c:overlay val="0"/>
           <c:spPr>
             <a:noFill/>
@@ -10067,6 +10147,7 @@
               </a:p>
             </c:rich>
           </c:tx>
+          <c:layout/>
           <c:overlay val="0"/>
           <c:spPr>
             <a:noFill/>
@@ -21441,7 +21522,7 @@
           <a:p>
             <a:fld id="{60E188FA-EECA-4DFD-91D1-D4BBF2A86176}" type="datetimeFigureOut">
               <a:rPr lang="en-US" smtClean="0"/>
-              <a:t>8/25/2018</a:t>
+              <a:t>9/13/2018</a:t>
             </a:fld>
             <a:endParaRPr lang="en-US"/>
           </a:p>
@@ -21887,7 +21968,7 @@
           <a:p>
             <a:fld id="{23A0FAE5-E8A8-4C94-B105-9978F51B0953}" type="datetimeFigureOut">
               <a:rPr lang="en-US" smtClean="0"/>
-              <a:t>8/25/2018</a:t>
+              <a:t>9/13/2018</a:t>
             </a:fld>
             <a:endParaRPr lang="en-US"/>
           </a:p>
@@ -22055,7 +22136,7 @@
           <a:p>
             <a:fld id="{23A0FAE5-E8A8-4C94-B105-9978F51B0953}" type="datetimeFigureOut">
               <a:rPr lang="en-US" smtClean="0"/>
-              <a:t>8/25/2018</a:t>
+              <a:t>9/13/2018</a:t>
             </a:fld>
             <a:endParaRPr lang="en-US"/>
           </a:p>
@@ -22233,7 +22314,7 @@
           <a:p>
             <a:fld id="{23A0FAE5-E8A8-4C94-B105-9978F51B0953}" type="datetimeFigureOut">
               <a:rPr lang="en-US" smtClean="0"/>
-              <a:t>8/25/2018</a:t>
+              <a:t>9/13/2018</a:t>
             </a:fld>
             <a:endParaRPr lang="en-US"/>
           </a:p>
@@ -22401,7 +22482,7 @@
           <a:p>
             <a:fld id="{23A0FAE5-E8A8-4C94-B105-9978F51B0953}" type="datetimeFigureOut">
               <a:rPr lang="en-US" smtClean="0"/>
-              <a:t>8/25/2018</a:t>
+              <a:t>9/13/2018</a:t>
             </a:fld>
             <a:endParaRPr lang="en-US"/>
           </a:p>
@@ -22646,7 +22727,7 @@
           <a:p>
             <a:fld id="{23A0FAE5-E8A8-4C94-B105-9978F51B0953}" type="datetimeFigureOut">
               <a:rPr lang="en-US" smtClean="0"/>
-              <a:t>8/25/2018</a:t>
+              <a:t>9/13/2018</a:t>
             </a:fld>
             <a:endParaRPr lang="en-US"/>
           </a:p>
@@ -22931,7 +23012,7 @@
           <a:p>
             <a:fld id="{23A0FAE5-E8A8-4C94-B105-9978F51B0953}" type="datetimeFigureOut">
               <a:rPr lang="en-US" smtClean="0"/>
-              <a:t>8/25/2018</a:t>
+              <a:t>9/13/2018</a:t>
             </a:fld>
             <a:endParaRPr lang="en-US"/>
           </a:p>
@@ -23350,7 +23431,7 @@
           <a:p>
             <a:fld id="{23A0FAE5-E8A8-4C94-B105-9978F51B0953}" type="datetimeFigureOut">
               <a:rPr lang="en-US" smtClean="0"/>
-              <a:t>8/25/2018</a:t>
+              <a:t>9/13/2018</a:t>
             </a:fld>
             <a:endParaRPr lang="en-US"/>
           </a:p>
@@ -23467,7 +23548,7 @@
           <a:p>
             <a:fld id="{23A0FAE5-E8A8-4C94-B105-9978F51B0953}" type="datetimeFigureOut">
               <a:rPr lang="en-US" smtClean="0"/>
-              <a:t>8/25/2018</a:t>
+              <a:t>9/13/2018</a:t>
             </a:fld>
             <a:endParaRPr lang="en-US"/>
           </a:p>
@@ -23562,7 +23643,7 @@
           <a:p>
             <a:fld id="{23A0FAE5-E8A8-4C94-B105-9978F51B0953}" type="datetimeFigureOut">
               <a:rPr lang="en-US" smtClean="0"/>
-              <a:t>8/25/2018</a:t>
+              <a:t>9/13/2018</a:t>
             </a:fld>
             <a:endParaRPr lang="en-US"/>
           </a:p>
@@ -23837,7 +23918,7 @@
           <a:p>
             <a:fld id="{23A0FAE5-E8A8-4C94-B105-9978F51B0953}" type="datetimeFigureOut">
               <a:rPr lang="en-US" smtClean="0"/>
-              <a:t>8/25/2018</a:t>
+              <a:t>9/13/2018</a:t>
             </a:fld>
             <a:endParaRPr lang="en-US"/>
           </a:p>
@@ -24092,7 +24173,7 @@
           <a:p>
             <a:fld id="{23A0FAE5-E8A8-4C94-B105-9978F51B0953}" type="datetimeFigureOut">
               <a:rPr lang="en-US" smtClean="0"/>
-              <a:t>8/25/2018</a:t>
+              <a:t>9/13/2018</a:t>
             </a:fld>
             <a:endParaRPr lang="en-US"/>
           </a:p>
@@ -24306,7 +24387,7 @@
           <a:p>
             <a:fld id="{23A0FAE5-E8A8-4C94-B105-9978F51B0953}" type="datetimeFigureOut">
               <a:rPr lang="en-US" smtClean="0"/>
-              <a:t>8/25/2018</a:t>
+              <a:t>9/13/2018</a:t>
             </a:fld>
             <a:endParaRPr lang="en-US"/>
           </a:p>
@@ -24772,6 +24853,13 @@
   <p:clrMapOvr>
     <a:masterClrMapping/>
   </p:clrMapOvr>
+  <p:timing>
+    <p:tnLst>
+      <p:par>
+        <p:cTn id="1" dur="indefinite" restart="never" nodeType="tmRoot"/>
+      </p:par>
+    </p:tnLst>
+  </p:timing>
 </p:sld>
 </file>
 
@@ -24979,6 +25067,13 @@
   <p:clrMapOvr>
     <a:masterClrMapping/>
   </p:clrMapOvr>
+  <p:timing>
+    <p:tnLst>
+      <p:par>
+        <p:cTn id="1" dur="indefinite" restart="never" nodeType="tmRoot"/>
+      </p:par>
+    </p:tnLst>
+  </p:timing>
 </p:sld>
 </file>
 
@@ -25304,6 +25399,13 @@
   <p:clrMapOvr>
     <a:masterClrMapping/>
   </p:clrMapOvr>
+  <p:timing>
+    <p:tnLst>
+      <p:par>
+        <p:cTn id="1" dur="indefinite" restart="never" nodeType="tmRoot"/>
+      </p:par>
+    </p:tnLst>
+  </p:timing>
 </p:sld>
 </file>
 
@@ -25408,6 +25510,13 @@
   <p:clrMapOvr>
     <a:masterClrMapping/>
   </p:clrMapOvr>
+  <p:timing>
+    <p:tnLst>
+      <p:par>
+        <p:cTn id="1" dur="indefinite" restart="never" nodeType="tmRoot"/>
+      </p:par>
+    </p:tnLst>
+  </p:timing>
 </p:sld>
 </file>
 
@@ -25527,6 +25636,13 @@
   <p:clrMapOvr>
     <a:masterClrMapping/>
   </p:clrMapOvr>
+  <p:timing>
+    <p:tnLst>
+      <p:par>
+        <p:cTn id="1" dur="indefinite" restart="never" nodeType="tmRoot"/>
+      </p:par>
+    </p:tnLst>
+  </p:timing>
 </p:sld>
 </file>
 
@@ -25983,6 +26099,13 @@
   <p:clrMapOvr>
     <a:masterClrMapping/>
   </p:clrMapOvr>
+  <p:timing>
+    <p:tnLst>
+      <p:par>
+        <p:cTn id="1" dur="indefinite" restart="never" nodeType="tmRoot"/>
+      </p:par>
+    </p:tnLst>
+  </p:timing>
 </p:sld>
 </file>
 
@@ -26112,6 +26235,13 @@
   <p:clrMapOvr>
     <a:masterClrMapping/>
   </p:clrMapOvr>
+  <p:timing>
+    <p:tnLst>
+      <p:par>
+        <p:cTn id="1" dur="indefinite" restart="never" nodeType="tmRoot"/>
+      </p:par>
+    </p:tnLst>
+  </p:timing>
 </p:sld>
 </file>
 
@@ -26431,6 +26561,13 @@
   <p:clrMapOvr>
     <a:masterClrMapping/>
   </p:clrMapOvr>
+  <p:timing>
+    <p:tnLst>
+      <p:par>
+        <p:cTn id="1" dur="indefinite" restart="never" nodeType="tmRoot"/>
+      </p:par>
+    </p:tnLst>
+  </p:timing>
 </p:sld>
 </file>
 
@@ -26554,6 +26691,13 @@
   <p:clrMapOvr>
     <a:masterClrMapping/>
   </p:clrMapOvr>
+  <p:timing>
+    <p:tnLst>
+      <p:par>
+        <p:cTn id="1" dur="indefinite" restart="never" nodeType="tmRoot"/>
+      </p:par>
+    </p:tnLst>
+  </p:timing>
 </p:sld>
 </file>
 
@@ -26655,6 +26799,13 @@
   <p:clrMapOvr>
     <a:masterClrMapping/>
   </p:clrMapOvr>
+  <p:timing>
+    <p:tnLst>
+      <p:par>
+        <p:cTn id="1" dur="indefinite" restart="never" nodeType="tmRoot"/>
+      </p:par>
+    </p:tnLst>
+  </p:timing>
 </p:sld>
 </file>
 
@@ -26816,6 +26967,13 @@
   <p:clrMapOvr>
     <a:masterClrMapping/>
   </p:clrMapOvr>
+  <p:timing>
+    <p:tnLst>
+      <p:par>
+        <p:cTn id="1" dur="indefinite" restart="never" nodeType="tmRoot"/>
+      </p:par>
+    </p:tnLst>
+  </p:timing>
 </p:sld>
 </file>
 
@@ -26971,6 +27129,13 @@
   <p:clrMapOvr>
     <a:masterClrMapping/>
   </p:clrMapOvr>
+  <p:timing>
+    <p:tnLst>
+      <p:par>
+        <p:cTn id="1" dur="indefinite" restart="never" nodeType="tmRoot"/>
+      </p:par>
+    </p:tnLst>
+  </p:timing>
 </p:sld>
 </file>
 
@@ -27078,6 +27243,13 @@
   <p:clrMapOvr>
     <a:masterClrMapping/>
   </p:clrMapOvr>
+  <p:timing>
+    <p:tnLst>
+      <p:par>
+        <p:cTn id="1" dur="indefinite" restart="never" nodeType="tmRoot"/>
+      </p:par>
+    </p:tnLst>
+  </p:timing>
 </p:sld>
 </file>
 
@@ -27183,6 +27355,13 @@
   <p:clrMapOvr>
     <a:masterClrMapping/>
   </p:clrMapOvr>
+  <p:timing>
+    <p:tnLst>
+      <p:par>
+        <p:cTn id="1" dur="indefinite" restart="never" nodeType="tmRoot"/>
+      </p:par>
+    </p:tnLst>
+  </p:timing>
 </p:sld>
 </file>
 
@@ -27325,7 +27504,7 @@
         </p:blipFill>
         <p:spPr>
           <a:xfrm>
-            <a:off x="3196045" y="5257797"/>
+            <a:off x="3383278" y="3501071"/>
             <a:ext cx="2751909" cy="1484982"/>
           </a:xfrm>
           <a:prstGeom prst="rect">
@@ -27355,7 +27534,7 @@
         </p:blipFill>
         <p:spPr>
           <a:xfrm>
-            <a:off x="153625" y="3545208"/>
+            <a:off x="340860" y="5058124"/>
             <a:ext cx="2380570" cy="1596382"/>
           </a:xfrm>
           <a:prstGeom prst="rect">
@@ -27385,7 +27564,7 @@
         </p:blipFill>
         <p:spPr>
           <a:xfrm>
-            <a:off x="3414583" y="3611566"/>
+            <a:off x="3601818" y="5124482"/>
             <a:ext cx="2314831" cy="1340301"/>
           </a:xfrm>
           <a:prstGeom prst="rect">
@@ -27415,7 +27594,7 @@
         </p:blipFill>
         <p:spPr>
           <a:xfrm>
-            <a:off x="6368278" y="3545234"/>
+            <a:off x="6555513" y="5058150"/>
             <a:ext cx="2131287" cy="1472963"/>
           </a:xfrm>
           <a:prstGeom prst="rect">
@@ -27433,6 +27612,13 @@
   <p:clrMapOvr>
     <a:masterClrMapping/>
   </p:clrMapOvr>
+  <p:timing>
+    <p:tnLst>
+      <p:par>
+        <p:cTn id="1" dur="indefinite" restart="never" nodeType="tmRoot"/>
+      </p:par>
+    </p:tnLst>
+  </p:timing>
 </p:sld>
 </file>
 
@@ -27528,6 +27714,13 @@
   <p:clrMapOvr>
     <a:masterClrMapping/>
   </p:clrMapOvr>
+  <p:timing>
+    <p:tnLst>
+      <p:par>
+        <p:cTn id="1" dur="indefinite" restart="never" nodeType="tmRoot"/>
+      </p:par>
+    </p:tnLst>
+  </p:timing>
 </p:sld>
 </file>
 
@@ -27937,6 +28130,13 @@
   <p:clrMapOvr>
     <a:masterClrMapping/>
   </p:clrMapOvr>
+  <p:timing>
+    <p:tnLst>
+      <p:par>
+        <p:cTn id="1" dur="indefinite" restart="never" nodeType="tmRoot"/>
+      </p:par>
+    </p:tnLst>
+  </p:timing>
 </p:sld>
 </file>
 
@@ -29207,6 +29407,13 @@
   <p:clrMapOvr>
     <a:masterClrMapping/>
   </p:clrMapOvr>
+  <p:timing>
+    <p:tnLst>
+      <p:par>
+        <p:cTn id="1" dur="indefinite" restart="never" nodeType="tmRoot"/>
+      </p:par>
+    </p:tnLst>
+  </p:timing>
 </p:sld>
 </file>
 
@@ -38627,6 +38834,13 @@
   <p:clrMapOvr>
     <a:masterClrMapping/>
   </p:clrMapOvr>
+  <p:timing>
+    <p:tnLst>
+      <p:par>
+        <p:cTn id="1" dur="indefinite" restart="never" nodeType="tmRoot"/>
+      </p:par>
+    </p:tnLst>
+  </p:timing>
 </p:sld>
 </file>
 
@@ -38761,6 +38975,13 @@
   <p:clrMapOvr>
     <a:masterClrMapping/>
   </p:clrMapOvr>
+  <p:timing>
+    <p:tnLst>
+      <p:par>
+        <p:cTn id="1" dur="indefinite" restart="never" nodeType="tmRoot"/>
+      </p:par>
+    </p:tnLst>
+  </p:timing>
 </p:sld>
 </file>
 
@@ -38830,24 +39051,36 @@
                   <m:oMath xmlns:m="http://schemas.openxmlformats.org/officeDocument/2006/math">
                     <m:r>
                       <a:rPr lang="en-US" b="0" i="1" smtClean="0">
+                        <a:solidFill>
+                          <a:srgbClr val="FF0000"/>
+                        </a:solidFill>
                         <a:latin typeface="Cambria Math" panose="02040503050406030204" pitchFamily="18" charset="0"/>
                       </a:rPr>
                       <m:t>𝑃</m:t>
                     </m:r>
                     <m:r>
                       <a:rPr lang="en-US" b="0" i="1" smtClean="0">
+                        <a:solidFill>
+                          <a:srgbClr val="FF0000"/>
+                        </a:solidFill>
                         <a:latin typeface="Cambria Math" panose="02040503050406030204" pitchFamily="18" charset="0"/>
                       </a:rPr>
                       <m:t>=</m:t>
                     </m:r>
                     <m:r>
                       <a:rPr lang="en-US" b="0" i="1" smtClean="0">
+                        <a:solidFill>
+                          <a:srgbClr val="FF0000"/>
+                        </a:solidFill>
                         <a:latin typeface="Cambria Math" panose="02040503050406030204" pitchFamily="18" charset="0"/>
                       </a:rPr>
                       <m:t>𝐼</m:t>
                     </m:r>
                     <m:r>
                       <a:rPr lang="en-US" b="0" i="1" smtClean="0">
+                        <a:solidFill>
+                          <a:srgbClr val="FF0000"/>
+                        </a:solidFill>
                         <a:latin typeface="Cambria Math" panose="02040503050406030204" pitchFamily="18" charset="0"/>
                         <a:ea typeface="Cambria Math" panose="02040503050406030204" pitchFamily="18" charset="0"/>
                       </a:rPr>
@@ -38855,6 +39088,9 @@
                     </m:r>
                     <m:r>
                       <a:rPr lang="en-US" b="0" i="1" smtClean="0">
+                        <a:solidFill>
+                          <a:srgbClr val="FF0000"/>
+                        </a:solidFill>
                         <a:latin typeface="Cambria Math" panose="02040503050406030204" pitchFamily="18" charset="0"/>
                         <a:ea typeface="Cambria Math" panose="02040503050406030204" pitchFamily="18" charset="0"/>
                       </a:rPr>
@@ -38863,6 +39099,9 @@
                   </m:oMath>
                 </a14:m>
                 <a:endParaRPr lang="en-US" b="0" dirty="0">
+                  <a:solidFill>
+                    <a:srgbClr val="FF0000"/>
+                  </a:solidFill>
                   <a:ea typeface="Cambria Math" panose="02040503050406030204" pitchFamily="18" charset="0"/>
                 </a:endParaRPr>
               </a:p>
@@ -38994,7 +39233,7 @@
               <a:blipFill>
                 <a:blip r:embed="rId2"/>
                 <a:stretch>
-                  <a:fillRect l="-1278" t="-1752" r="-278"/>
+                  <a:fillRect l="-1704" t="-1752"/>
                 </a:stretch>
               </a:blipFill>
             </p:spPr>
@@ -39023,6 +39262,13 @@
   <p:clrMapOvr>
     <a:masterClrMapping/>
   </p:clrMapOvr>
+  <p:timing>
+    <p:tnLst>
+      <p:par>
+        <p:cTn id="1" dur="indefinite" restart="never" nodeType="tmRoot"/>
+      </p:par>
+    </p:tnLst>
+  </p:timing>
 </p:sld>
 </file>
 
@@ -39149,6 +39395,13 @@
   <p:clrMapOvr>
     <a:masterClrMapping/>
   </p:clrMapOvr>
+  <p:timing>
+    <p:tnLst>
+      <p:par>
+        <p:cTn id="1" dur="indefinite" restart="never" nodeType="tmRoot"/>
+      </p:par>
+    </p:tnLst>
+  </p:timing>
 </p:sld>
 </file>
 
@@ -39191,8 +39444,8 @@
           </a:p>
         </p:txBody>
       </p:sp>
-      <mc:AlternateContent xmlns:mc="http://schemas.openxmlformats.org/markup-compatibility/2006">
-        <mc:Choice xmlns:a14="http://schemas.microsoft.com/office/drawing/2010/main" Requires="a14">
+      <mc:AlternateContent xmlns:mc="http://schemas.openxmlformats.org/markup-compatibility/2006" xmlns:a14="http://schemas.microsoft.com/office/drawing/2010/main">
+        <mc:Choice Requires="a14">
           <p:sp>
             <p:nvSpPr>
               <p:cNvPr id="3" name="Content Placeholder 2"/>
@@ -39470,7 +39723,7 @@
             </p:txBody>
           </p:sp>
         </mc:Choice>
-        <mc:Fallback>
+        <mc:Fallback xmlns="">
           <p:sp>
             <p:nvSpPr>
               <p:cNvPr id="3" name="Content Placeholder 2"/>
@@ -39518,6 +39771,13 @@
   <p:clrMapOvr>
     <a:masterClrMapping/>
   </p:clrMapOvr>
+  <p:timing>
+    <p:tnLst>
+      <p:par>
+        <p:cTn id="1" dur="indefinite" restart="never" nodeType="tmRoot"/>
+      </p:par>
+    </p:tnLst>
+  </p:timing>
 </p:sld>
 </file>
 
@@ -39766,6 +40026,13 @@
   <p:clrMapOvr>
     <a:masterClrMapping/>
   </p:clrMapOvr>
+  <p:timing>
+    <p:tnLst>
+      <p:par>
+        <p:cTn id="1" dur="indefinite" restart="never" nodeType="tmRoot"/>
+      </p:par>
+    </p:tnLst>
+  </p:timing>
 </p:sld>
 </file>
 
@@ -39843,6 +40110,13 @@
   <p:clrMapOvr>
     <a:masterClrMapping/>
   </p:clrMapOvr>
+  <p:timing>
+    <p:tnLst>
+      <p:par>
+        <p:cTn id="1" dur="indefinite" restart="never" nodeType="tmRoot"/>
+      </p:par>
+    </p:tnLst>
+  </p:timing>
 </p:sld>
 </file>
 
@@ -39953,6 +40227,13 @@
   <p:clrMapOvr>
     <a:masterClrMapping/>
   </p:clrMapOvr>
+  <p:timing>
+    <p:tnLst>
+      <p:par>
+        <p:cTn id="1" dur="indefinite" restart="never" nodeType="tmRoot"/>
+      </p:par>
+    </p:tnLst>
+  </p:timing>
 </p:sld>
 </file>
 
@@ -40148,6 +40429,13 @@
   <p:clrMapOvr>
     <a:masterClrMapping/>
   </p:clrMapOvr>
+  <p:timing>
+    <p:tnLst>
+      <p:par>
+        <p:cTn id="1" dur="indefinite" restart="never" nodeType="tmRoot"/>
+      </p:par>
+    </p:tnLst>
+  </p:timing>
 </p:sld>
 </file>
 
@@ -40282,6 +40570,13 @@
   <p:clrMapOvr>
     <a:masterClrMapping/>
   </p:clrMapOvr>
+  <p:timing>
+    <p:tnLst>
+      <p:par>
+        <p:cTn id="1" dur="indefinite" restart="never" nodeType="tmRoot"/>
+      </p:par>
+    </p:tnLst>
+  </p:timing>
 </p:sld>
 </file>
 
@@ -40587,6 +40882,13 @@
   <p:clrMapOvr>
     <a:masterClrMapping/>
   </p:clrMapOvr>
+  <p:timing>
+    <p:tnLst>
+      <p:par>
+        <p:cTn id="1" dur="indefinite" restart="never" nodeType="tmRoot"/>
+      </p:par>
+    </p:tnLst>
+  </p:timing>
 </p:sld>
 </file>
 
@@ -40724,6 +41026,13 @@
   <p:clrMapOvr>
     <a:masterClrMapping/>
   </p:clrMapOvr>
+  <p:timing>
+    <p:tnLst>
+      <p:par>
+        <p:cTn id="1" dur="indefinite" restart="never" nodeType="tmRoot"/>
+      </p:par>
+    </p:tnLst>
+  </p:timing>
 </p:sld>
 </file>
 
@@ -40788,15 +41097,400 @@
             <p:ph idx="1"/>
           </p:nvPr>
         </p:nvSpPr>
-        <p:spPr/>
+        <p:spPr>
+          <a:xfrm>
+            <a:off x="457200" y="1600203"/>
+            <a:ext cx="8229600" cy="3295994"/>
+          </a:xfrm>
+        </p:spPr>
         <p:txBody>
           <a:bodyPr/>
           <a:lstStyle/>
           <a:p>
-            <a:endParaRPr lang="en-US"/>
+            <a:r>
+              <a:rPr lang="en-US" dirty="0" smtClean="0"/>
+              <a:t>We’ve previously discussed constant-voltage and constant-current sources</a:t>
+            </a:r>
+          </a:p>
+          <a:p>
+            <a:r>
+              <a:rPr lang="en-US" dirty="0" smtClean="0"/>
+              <a:t>Unfortunately, under certain circumstances, these sources are not well-behaved</a:t>
+            </a:r>
+            <a:endParaRPr lang="en-US" dirty="0"/>
           </a:p>
         </p:txBody>
       </p:sp>
+      <p:grpSp>
+        <p:nvGrpSpPr>
+          <p:cNvPr id="17" name="Group 16"/>
+          <p:cNvGrpSpPr/>
+          <p:nvPr/>
+        </p:nvGrpSpPr>
+        <p:grpSpPr>
+          <a:xfrm>
+            <a:off x="4794309" y="5336552"/>
+            <a:ext cx="1119032" cy="1132533"/>
+            <a:chOff x="4794309" y="5336552"/>
+            <a:chExt cx="1119032" cy="1132533"/>
+          </a:xfrm>
+        </p:grpSpPr>
+        <p:sp>
+          <p:nvSpPr>
+            <p:cNvPr id="9" name="Rectangle 8"/>
+            <p:cNvSpPr/>
+            <p:nvPr/>
+          </p:nvSpPr>
+          <p:spPr>
+            <a:xfrm>
+              <a:off x="4794310" y="5336552"/>
+              <a:ext cx="1119031" cy="1132533"/>
+            </a:xfrm>
+            <a:prstGeom prst="rect">
+              <a:avLst/>
+            </a:prstGeom>
+            <a:solidFill>
+              <a:schemeClr val="bg1"/>
+            </a:solidFill>
+            <a:ln>
+              <a:noFill/>
+            </a:ln>
+          </p:spPr>
+          <p:style>
+            <a:lnRef idx="2">
+              <a:schemeClr val="accent1">
+                <a:shade val="50000"/>
+              </a:schemeClr>
+            </a:lnRef>
+            <a:fillRef idx="1">
+              <a:schemeClr val="accent1"/>
+            </a:fillRef>
+            <a:effectRef idx="0">
+              <a:schemeClr val="accent1"/>
+            </a:effectRef>
+            <a:fontRef idx="minor">
+              <a:schemeClr val="lt1"/>
+            </a:fontRef>
+          </p:style>
+          <p:txBody>
+            <a:bodyPr rtlCol="0" anchor="ctr"/>
+            <a:lstStyle/>
+            <a:p>
+              <a:pPr algn="ctr"/>
+              <a:endParaRPr lang="en-US"/>
+            </a:p>
+          </p:txBody>
+        </p:sp>
+        <p:sp>
+          <p:nvSpPr>
+            <p:cNvPr id="10" name="TextBox 9"/>
+            <p:cNvSpPr txBox="1"/>
+            <p:nvPr/>
+          </p:nvSpPr>
+          <p:spPr>
+            <a:xfrm>
+              <a:off x="5425707" y="5732292"/>
+              <a:ext cx="487634" cy="369332"/>
+            </a:xfrm>
+            <a:prstGeom prst="rect">
+              <a:avLst/>
+            </a:prstGeom>
+            <a:noFill/>
+          </p:spPr>
+          <p:txBody>
+            <a:bodyPr wrap="none" rtlCol="0">
+              <a:spAutoFit/>
+            </a:bodyPr>
+            <a:lstStyle/>
+            <a:p>
+              <a:r>
+                <a:rPr lang="en-US" dirty="0"/>
+                <a:t>1 A</a:t>
+              </a:r>
+            </a:p>
+          </p:txBody>
+        </p:sp>
+        <p:pic>
+          <p:nvPicPr>
+            <p:cNvPr id="11" name="Picture 10"/>
+            <p:cNvPicPr>
+              <a:picLocks noChangeAspect="1"/>
+            </p:cNvPicPr>
+            <p:nvPr/>
+          </p:nvPicPr>
+          <p:blipFill>
+            <a:blip r:embed="rId2"/>
+            <a:stretch>
+              <a:fillRect/>
+            </a:stretch>
+          </p:blipFill>
+          <p:spPr>
+            <a:xfrm>
+              <a:off x="4794309" y="5606352"/>
+              <a:ext cx="631399" cy="621215"/>
+            </a:xfrm>
+            <a:prstGeom prst="rect">
+              <a:avLst/>
+            </a:prstGeom>
+          </p:spPr>
+        </p:pic>
+        <p:cxnSp>
+          <p:nvCxnSpPr>
+            <p:cNvPr id="12" name="Straight Connector 11"/>
+            <p:cNvCxnSpPr/>
+            <p:nvPr/>
+          </p:nvCxnSpPr>
+          <p:spPr>
+            <a:xfrm>
+              <a:off x="5110007" y="5336553"/>
+              <a:ext cx="0" cy="269799"/>
+            </a:xfrm>
+            <a:prstGeom prst="line">
+              <a:avLst/>
+            </a:prstGeom>
+            <a:ln w="38100">
+              <a:solidFill>
+                <a:schemeClr val="tx1"/>
+              </a:solidFill>
+            </a:ln>
+          </p:spPr>
+          <p:style>
+            <a:lnRef idx="1">
+              <a:schemeClr val="accent1"/>
+            </a:lnRef>
+            <a:fillRef idx="0">
+              <a:schemeClr val="accent1"/>
+            </a:fillRef>
+            <a:effectRef idx="0">
+              <a:schemeClr val="accent1"/>
+            </a:effectRef>
+            <a:fontRef idx="minor">
+              <a:schemeClr val="tx1"/>
+            </a:fontRef>
+          </p:style>
+        </p:cxnSp>
+        <p:cxnSp>
+          <p:nvCxnSpPr>
+            <p:cNvPr id="13" name="Straight Connector 12"/>
+            <p:cNvCxnSpPr/>
+            <p:nvPr/>
+          </p:nvCxnSpPr>
+          <p:spPr>
+            <a:xfrm>
+              <a:off x="5110007" y="6199286"/>
+              <a:ext cx="0" cy="269799"/>
+            </a:xfrm>
+            <a:prstGeom prst="line">
+              <a:avLst/>
+            </a:prstGeom>
+            <a:ln w="38100">
+              <a:solidFill>
+                <a:schemeClr val="tx1"/>
+              </a:solidFill>
+            </a:ln>
+          </p:spPr>
+          <p:style>
+            <a:lnRef idx="1">
+              <a:schemeClr val="accent1"/>
+            </a:lnRef>
+            <a:fillRef idx="0">
+              <a:schemeClr val="accent1"/>
+            </a:fillRef>
+            <a:effectRef idx="0">
+              <a:schemeClr val="accent1"/>
+            </a:effectRef>
+            <a:fontRef idx="minor">
+              <a:schemeClr val="tx1"/>
+            </a:fontRef>
+          </p:style>
+        </p:cxnSp>
+      </p:grpSp>
+      <p:grpSp>
+        <p:nvGrpSpPr>
+          <p:cNvPr id="3" name="Group 2"/>
+          <p:cNvGrpSpPr/>
+          <p:nvPr/>
+        </p:nvGrpSpPr>
+        <p:grpSpPr>
+          <a:xfrm>
+            <a:off x="2282693" y="5312947"/>
+            <a:ext cx="1256598" cy="1156137"/>
+            <a:chOff x="2282693" y="5312947"/>
+            <a:chExt cx="1256598" cy="1156137"/>
+          </a:xfrm>
+        </p:grpSpPr>
+        <p:sp>
+          <p:nvSpPr>
+            <p:cNvPr id="14" name="Rectangle 13"/>
+            <p:cNvSpPr/>
+            <p:nvPr/>
+          </p:nvSpPr>
+          <p:spPr>
+            <a:xfrm>
+              <a:off x="2282693" y="5336551"/>
+              <a:ext cx="1256598" cy="1132533"/>
+            </a:xfrm>
+            <a:prstGeom prst="rect">
+              <a:avLst/>
+            </a:prstGeom>
+            <a:solidFill>
+              <a:schemeClr val="bg1"/>
+            </a:solidFill>
+            <a:ln>
+              <a:noFill/>
+            </a:ln>
+          </p:spPr>
+          <p:style>
+            <a:lnRef idx="2">
+              <a:schemeClr val="accent1">
+                <a:shade val="50000"/>
+              </a:schemeClr>
+            </a:lnRef>
+            <a:fillRef idx="1">
+              <a:schemeClr val="accent1"/>
+            </a:fillRef>
+            <a:effectRef idx="0">
+              <a:schemeClr val="accent1"/>
+            </a:effectRef>
+            <a:fontRef idx="minor">
+              <a:schemeClr val="lt1"/>
+            </a:fontRef>
+          </p:style>
+          <p:txBody>
+            <a:bodyPr rtlCol="0" anchor="ctr"/>
+            <a:lstStyle/>
+            <a:p>
+              <a:pPr algn="ctr"/>
+              <a:endParaRPr lang="en-US"/>
+            </a:p>
+          </p:txBody>
+        </p:sp>
+        <p:pic>
+          <p:nvPicPr>
+            <p:cNvPr id="4" name="Picture 3"/>
+            <p:cNvPicPr>
+              <a:picLocks noChangeAspect="1"/>
+            </p:cNvPicPr>
+            <p:nvPr/>
+          </p:nvPicPr>
+          <p:blipFill>
+            <a:blip r:embed="rId3"/>
+            <a:stretch>
+              <a:fillRect/>
+            </a:stretch>
+          </p:blipFill>
+          <p:spPr>
+            <a:xfrm>
+              <a:off x="2282694" y="5582747"/>
+              <a:ext cx="659044" cy="643227"/>
+            </a:xfrm>
+            <a:prstGeom prst="rect">
+              <a:avLst/>
+            </a:prstGeom>
+          </p:spPr>
+        </p:pic>
+        <p:sp>
+          <p:nvSpPr>
+            <p:cNvPr id="7" name="TextBox 6"/>
+            <p:cNvSpPr txBox="1"/>
+            <p:nvPr/>
+          </p:nvSpPr>
+          <p:spPr>
+            <a:xfrm>
+              <a:off x="2933493" y="5711593"/>
+              <a:ext cx="603050" cy="410730"/>
+            </a:xfrm>
+            <a:prstGeom prst="rect">
+              <a:avLst/>
+            </a:prstGeom>
+            <a:solidFill>
+              <a:schemeClr val="bg1"/>
+            </a:solidFill>
+          </p:spPr>
+          <p:txBody>
+            <a:bodyPr wrap="none" rtlCol="0">
+              <a:noAutofit/>
+            </a:bodyPr>
+            <a:lstStyle/>
+            <a:p>
+              <a:r>
+                <a:rPr lang="en-US" dirty="0"/>
+                <a:t>12 V</a:t>
+              </a:r>
+            </a:p>
+          </p:txBody>
+        </p:sp>
+        <p:cxnSp>
+          <p:nvCxnSpPr>
+            <p:cNvPr id="15" name="Straight Connector 14"/>
+            <p:cNvCxnSpPr/>
+            <p:nvPr/>
+          </p:nvCxnSpPr>
+          <p:spPr>
+            <a:xfrm>
+              <a:off x="2613868" y="5312947"/>
+              <a:ext cx="0" cy="269799"/>
+            </a:xfrm>
+            <a:prstGeom prst="line">
+              <a:avLst/>
+            </a:prstGeom>
+            <a:ln w="38100">
+              <a:solidFill>
+                <a:schemeClr val="tx1"/>
+              </a:solidFill>
+            </a:ln>
+          </p:spPr>
+          <p:style>
+            <a:lnRef idx="1">
+              <a:schemeClr val="accent1"/>
+            </a:lnRef>
+            <a:fillRef idx="0">
+              <a:schemeClr val="accent1"/>
+            </a:fillRef>
+            <a:effectRef idx="0">
+              <a:schemeClr val="accent1"/>
+            </a:effectRef>
+            <a:fontRef idx="minor">
+              <a:schemeClr val="tx1"/>
+            </a:fontRef>
+          </p:style>
+        </p:cxnSp>
+        <p:cxnSp>
+          <p:nvCxnSpPr>
+            <p:cNvPr id="16" name="Straight Connector 15"/>
+            <p:cNvCxnSpPr/>
+            <p:nvPr/>
+          </p:nvCxnSpPr>
+          <p:spPr>
+            <a:xfrm>
+              <a:off x="2605105" y="6199285"/>
+              <a:ext cx="0" cy="269799"/>
+            </a:xfrm>
+            <a:prstGeom prst="line">
+              <a:avLst/>
+            </a:prstGeom>
+            <a:ln w="38100">
+              <a:solidFill>
+                <a:schemeClr val="tx1"/>
+              </a:solidFill>
+            </a:ln>
+          </p:spPr>
+          <p:style>
+            <a:lnRef idx="1">
+              <a:schemeClr val="accent1"/>
+            </a:lnRef>
+            <a:fillRef idx="0">
+              <a:schemeClr val="accent1"/>
+            </a:fillRef>
+            <a:effectRef idx="0">
+              <a:schemeClr val="accent1"/>
+            </a:effectRef>
+            <a:fontRef idx="minor">
+              <a:schemeClr val="tx1"/>
+            </a:fontRef>
+          </p:style>
+        </p:cxnSp>
+      </p:grpSp>
     </p:spTree>
     <p:extLst>
       <p:ext uri="{BB962C8B-B14F-4D97-AF65-F5344CB8AC3E}">
@@ -40807,6 +41501,13 @@
   <p:clrMapOvr>
     <a:masterClrMapping/>
   </p:clrMapOvr>
+  <p:timing>
+    <p:tnLst>
+      <p:par>
+        <p:cTn id="1" dur="indefinite" restart="never" nodeType="tmRoot"/>
+      </p:par>
+    </p:tnLst>
+  </p:timing>
 </p:sld>
 </file>
 
@@ -40848,16 +41549,514 @@
           <a:bodyPr/>
           <a:lstStyle/>
           <a:p>
+            <a:r>
+              <a:rPr lang="en-US" dirty="0" smtClean="0"/>
+              <a:t>CV Source – Pathological Case</a:t>
+            </a:r>
             <a:endParaRPr lang="en-US" dirty="0"/>
           </a:p>
         </p:txBody>
       </p:sp>
+      <mc:AlternateContent xmlns:mc="http://schemas.openxmlformats.org/markup-compatibility/2006">
+        <mc:Choice xmlns:a14="http://schemas.microsoft.com/office/drawing/2010/main" Requires="a14">
+          <p:sp>
+            <p:nvSpPr>
+              <p:cNvPr id="3" name="Content Placeholder 2">
+                <a:extLst>
+                  <a:ext uri="{FF2B5EF4-FFF2-40B4-BE49-F238E27FC236}">
+                    <a16:creationId xmlns:a16="http://schemas.microsoft.com/office/drawing/2014/main" id="{162B254E-736E-4FD9-B355-657FDD8BC765}"/>
+                  </a:ext>
+                </a:extLst>
+              </p:cNvPr>
+              <p:cNvSpPr>
+                <a:spLocks noGrp="1"/>
+              </p:cNvSpPr>
+              <p:nvPr>
+                <p:ph idx="1"/>
+              </p:nvPr>
+            </p:nvSpPr>
+            <p:spPr/>
+            <p:txBody>
+              <a:bodyPr/>
+              <a:lstStyle/>
+              <a:p>
+                <a:r>
+                  <a:rPr lang="en-US" dirty="0" smtClean="0"/>
+                  <a:t>In this case, we have a short-circuited voltage source</a:t>
+                </a:r>
+              </a:p>
+              <a:p>
+                <a:pPr lvl="1"/>
+                <a:r>
+                  <a:rPr lang="en-US" dirty="0" smtClean="0"/>
+                  <a:t>That is, 0 resistance between the terminals</a:t>
+                </a:r>
+              </a:p>
+              <a:p>
+                <a:r>
+                  <a:rPr lang="en-US" dirty="0" smtClean="0"/>
+                  <a:t>However, there is 12 V between the terminals by definition</a:t>
+                </a:r>
+              </a:p>
+              <a:p>
+                <a14:m>
+                  <m:oMath xmlns:m="http://schemas.openxmlformats.org/officeDocument/2006/math">
+                    <m:r>
+                      <a:rPr lang="en-US" b="0" i="1" smtClean="0">
+                        <a:latin typeface="Cambria Math" panose="02040503050406030204" pitchFamily="18" charset="0"/>
+                      </a:rPr>
+                      <m:t>𝐼</m:t>
+                    </m:r>
+                    <m:r>
+                      <a:rPr lang="en-US" b="0" i="1" smtClean="0">
+                        <a:latin typeface="Cambria Math" panose="02040503050406030204" pitchFamily="18" charset="0"/>
+                      </a:rPr>
+                      <m:t>=</m:t>
+                    </m:r>
+                    <m:f>
+                      <m:fPr>
+                        <m:ctrlPr>
+                          <a:rPr lang="en-US" b="0" i="1" smtClean="0">
+                            <a:latin typeface="Cambria Math" panose="02040503050406030204" pitchFamily="18" charset="0"/>
+                          </a:rPr>
+                        </m:ctrlPr>
+                      </m:fPr>
+                      <m:num>
+                        <m:r>
+                          <a:rPr lang="en-US" b="0" i="1" smtClean="0">
+                            <a:latin typeface="Cambria Math" panose="02040503050406030204" pitchFamily="18" charset="0"/>
+                          </a:rPr>
+                          <m:t>𝑉</m:t>
+                        </m:r>
+                      </m:num>
+                      <m:den>
+                        <m:r>
+                          <a:rPr lang="en-US" b="0" i="1" smtClean="0">
+                            <a:latin typeface="Cambria Math" panose="02040503050406030204" pitchFamily="18" charset="0"/>
+                          </a:rPr>
+                          <m:t>𝑅</m:t>
+                        </m:r>
+                      </m:den>
+                    </m:f>
+                    <m:r>
+                      <a:rPr lang="en-US" b="0" i="1" smtClean="0">
+                        <a:latin typeface="Cambria Math" panose="02040503050406030204" pitchFamily="18" charset="0"/>
+                      </a:rPr>
+                      <m:t>=</m:t>
+                    </m:r>
+                    <m:f>
+                      <m:fPr>
+                        <m:ctrlPr>
+                          <a:rPr lang="en-US" b="0" i="1" smtClean="0">
+                            <a:latin typeface="Cambria Math" panose="02040503050406030204" pitchFamily="18" charset="0"/>
+                          </a:rPr>
+                        </m:ctrlPr>
+                      </m:fPr>
+                      <m:num>
+                        <m:r>
+                          <a:rPr lang="en-US" b="0" i="1" smtClean="0">
+                            <a:latin typeface="Cambria Math" panose="02040503050406030204" pitchFamily="18" charset="0"/>
+                          </a:rPr>
+                          <m:t>12</m:t>
+                        </m:r>
+                      </m:num>
+                      <m:den>
+                        <m:r>
+                          <a:rPr lang="en-US" b="0" i="1" smtClean="0">
+                            <a:latin typeface="Cambria Math" panose="02040503050406030204" pitchFamily="18" charset="0"/>
+                          </a:rPr>
+                          <m:t>0</m:t>
+                        </m:r>
+                      </m:den>
+                    </m:f>
+                  </m:oMath>
+                </a14:m>
+                <a:endParaRPr lang="en-US" dirty="0" smtClean="0"/>
+              </a:p>
+              <a:p>
+                <a:r>
+                  <a:rPr lang="en-US" dirty="0" smtClean="0"/>
+                  <a:t>Infinite current is a bad sign</a:t>
+                </a:r>
+                <a:endParaRPr lang="en-US" dirty="0"/>
+              </a:p>
+            </p:txBody>
+          </p:sp>
+        </mc:Choice>
+        <mc:Fallback>
+          <p:sp>
+            <p:nvSpPr>
+              <p:cNvPr id="3" name="Content Placeholder 2">
+                <a:extLst>
+                  <a:ext uri="{FF2B5EF4-FFF2-40B4-BE49-F238E27FC236}">
+                    <a16:creationId xmlns:a16="http://schemas.microsoft.com/office/drawing/2014/main" id="{162B254E-736E-4FD9-B355-657FDD8BC765}"/>
+                  </a:ext>
+                </a:extLst>
+              </p:cNvPr>
+              <p:cNvSpPr>
+                <a:spLocks noGrp="1" noRot="1" noChangeAspect="1" noMove="1" noResize="1" noEditPoints="1" noAdjustHandles="1" noChangeArrowheads="1" noChangeShapeType="1" noTextEdit="1"/>
+              </p:cNvSpPr>
+              <p:nvPr>
+                <p:ph idx="1"/>
+              </p:nvPr>
+            </p:nvSpPr>
+            <p:spPr>
+              <a:blipFill>
+                <a:blip r:embed="rId2"/>
+                <a:stretch>
+                  <a:fillRect l="-1704" t="-1752" r="-889"/>
+                </a:stretch>
+              </a:blipFill>
+            </p:spPr>
+            <p:txBody>
+              <a:bodyPr/>
+              <a:lstStyle/>
+              <a:p>
+                <a:r>
+                  <a:rPr lang="en-US">
+                    <a:noFill/>
+                  </a:rPr>
+                  <a:t> </a:t>
+                </a:r>
+              </a:p>
+            </p:txBody>
+          </p:sp>
+        </mc:Fallback>
+      </mc:AlternateContent>
+      <p:grpSp>
+        <p:nvGrpSpPr>
+          <p:cNvPr id="19" name="Group 18"/>
+          <p:cNvGrpSpPr/>
+          <p:nvPr/>
+        </p:nvGrpSpPr>
+        <p:grpSpPr>
+          <a:xfrm>
+            <a:off x="6425738" y="4181302"/>
+            <a:ext cx="1745674" cy="1812175"/>
+            <a:chOff x="4073236" y="4164676"/>
+            <a:chExt cx="1745674" cy="1812175"/>
+          </a:xfrm>
+        </p:grpSpPr>
+        <p:sp>
+          <p:nvSpPr>
+            <p:cNvPr id="5" name="Rectangle 4"/>
+            <p:cNvSpPr/>
+            <p:nvPr/>
+          </p:nvSpPr>
+          <p:spPr>
+            <a:xfrm>
+              <a:off x="4073236" y="4164676"/>
+              <a:ext cx="1745674" cy="1812175"/>
+            </a:xfrm>
+            <a:prstGeom prst="rect">
+              <a:avLst/>
+            </a:prstGeom>
+            <a:solidFill>
+              <a:schemeClr val="bg1"/>
+            </a:solidFill>
+            <a:ln>
+              <a:noFill/>
+            </a:ln>
+          </p:spPr>
+          <p:style>
+            <a:lnRef idx="2">
+              <a:schemeClr val="accent1">
+                <a:shade val="50000"/>
+              </a:schemeClr>
+            </a:lnRef>
+            <a:fillRef idx="1">
+              <a:schemeClr val="accent1"/>
+            </a:fillRef>
+            <a:effectRef idx="0">
+              <a:schemeClr val="accent1"/>
+            </a:effectRef>
+            <a:fontRef idx="minor">
+              <a:schemeClr val="lt1"/>
+            </a:fontRef>
+          </p:style>
+          <p:txBody>
+            <a:bodyPr rtlCol="0" anchor="ctr"/>
+            <a:lstStyle/>
+            <a:p>
+              <a:pPr algn="ctr"/>
+              <a:endParaRPr lang="en-US"/>
+            </a:p>
+          </p:txBody>
+        </p:sp>
+        <p:pic>
+          <p:nvPicPr>
+            <p:cNvPr id="6" name="Picture 5"/>
+            <p:cNvPicPr>
+              <a:picLocks noChangeAspect="1"/>
+            </p:cNvPicPr>
+            <p:nvPr/>
+          </p:nvPicPr>
+          <p:blipFill>
+            <a:blip r:embed="rId3"/>
+            <a:stretch>
+              <a:fillRect/>
+            </a:stretch>
+          </p:blipFill>
+          <p:spPr>
+            <a:xfrm>
+              <a:off x="4153057" y="4751474"/>
+              <a:ext cx="659044" cy="643227"/>
+            </a:xfrm>
+            <a:prstGeom prst="rect">
+              <a:avLst/>
+            </a:prstGeom>
+          </p:spPr>
+        </p:pic>
+        <p:sp>
+          <p:nvSpPr>
+            <p:cNvPr id="7" name="TextBox 6"/>
+            <p:cNvSpPr txBox="1"/>
+            <p:nvPr/>
+          </p:nvSpPr>
+          <p:spPr>
+            <a:xfrm>
+              <a:off x="4803856" y="4880320"/>
+              <a:ext cx="603050" cy="410730"/>
+            </a:xfrm>
+            <a:prstGeom prst="rect">
+              <a:avLst/>
+            </a:prstGeom>
+            <a:solidFill>
+              <a:schemeClr val="bg1"/>
+            </a:solidFill>
+          </p:spPr>
+          <p:txBody>
+            <a:bodyPr wrap="none" rtlCol="0">
+              <a:noAutofit/>
+            </a:bodyPr>
+            <a:lstStyle/>
+            <a:p>
+              <a:r>
+                <a:rPr lang="en-US" dirty="0"/>
+                <a:t>12 V</a:t>
+              </a:r>
+            </a:p>
+          </p:txBody>
+        </p:sp>
+        <p:cxnSp>
+          <p:nvCxnSpPr>
+            <p:cNvPr id="8" name="Straight Connector 7"/>
+            <p:cNvCxnSpPr/>
+            <p:nvPr/>
+          </p:nvCxnSpPr>
+          <p:spPr>
+            <a:xfrm>
+              <a:off x="4484231" y="4481674"/>
+              <a:ext cx="0" cy="269799"/>
+            </a:xfrm>
+            <a:prstGeom prst="line">
+              <a:avLst/>
+            </a:prstGeom>
+            <a:ln w="38100">
+              <a:solidFill>
+                <a:schemeClr val="tx1"/>
+              </a:solidFill>
+            </a:ln>
+          </p:spPr>
+          <p:style>
+            <a:lnRef idx="1">
+              <a:schemeClr val="accent1"/>
+            </a:lnRef>
+            <a:fillRef idx="0">
+              <a:schemeClr val="accent1"/>
+            </a:fillRef>
+            <a:effectRef idx="0">
+              <a:schemeClr val="accent1"/>
+            </a:effectRef>
+            <a:fontRef idx="minor">
+              <a:schemeClr val="tx1"/>
+            </a:fontRef>
+          </p:style>
+        </p:cxnSp>
+        <p:cxnSp>
+          <p:nvCxnSpPr>
+            <p:cNvPr id="9" name="Straight Connector 8"/>
+            <p:cNvCxnSpPr/>
+            <p:nvPr/>
+          </p:nvCxnSpPr>
+          <p:spPr>
+            <a:xfrm>
+              <a:off x="4475468" y="5368012"/>
+              <a:ext cx="0" cy="269799"/>
+            </a:xfrm>
+            <a:prstGeom prst="line">
+              <a:avLst/>
+            </a:prstGeom>
+            <a:ln w="38100">
+              <a:solidFill>
+                <a:schemeClr val="tx1"/>
+              </a:solidFill>
+            </a:ln>
+          </p:spPr>
+          <p:style>
+            <a:lnRef idx="1">
+              <a:schemeClr val="accent1"/>
+            </a:lnRef>
+            <a:fillRef idx="0">
+              <a:schemeClr val="accent1"/>
+            </a:fillRef>
+            <a:effectRef idx="0">
+              <a:schemeClr val="accent1"/>
+            </a:effectRef>
+            <a:fontRef idx="minor">
+              <a:schemeClr val="tx1"/>
+            </a:fontRef>
+          </p:style>
+        </p:cxnSp>
+        <p:cxnSp>
+          <p:nvCxnSpPr>
+            <p:cNvPr id="10" name="Straight Connector 9"/>
+            <p:cNvCxnSpPr/>
+            <p:nvPr/>
+          </p:nvCxnSpPr>
+          <p:spPr>
+            <a:xfrm>
+              <a:off x="4475468" y="4481674"/>
+              <a:ext cx="1152248" cy="0"/>
+            </a:xfrm>
+            <a:prstGeom prst="line">
+              <a:avLst/>
+            </a:prstGeom>
+            <a:ln w="38100">
+              <a:solidFill>
+                <a:schemeClr val="tx1"/>
+              </a:solidFill>
+            </a:ln>
+          </p:spPr>
+          <p:style>
+            <a:lnRef idx="1">
+              <a:schemeClr val="accent1"/>
+            </a:lnRef>
+            <a:fillRef idx="0">
+              <a:schemeClr val="accent1"/>
+            </a:fillRef>
+            <a:effectRef idx="0">
+              <a:schemeClr val="accent1"/>
+            </a:effectRef>
+            <a:fontRef idx="minor">
+              <a:schemeClr val="tx1"/>
+            </a:fontRef>
+          </p:style>
+        </p:cxnSp>
+        <p:cxnSp>
+          <p:nvCxnSpPr>
+            <p:cNvPr id="13" name="Straight Connector 12"/>
+            <p:cNvCxnSpPr/>
+            <p:nvPr/>
+          </p:nvCxnSpPr>
+          <p:spPr>
+            <a:xfrm>
+              <a:off x="5619403" y="4473361"/>
+              <a:ext cx="8313" cy="1156137"/>
+            </a:xfrm>
+            <a:prstGeom prst="line">
+              <a:avLst/>
+            </a:prstGeom>
+            <a:ln w="38100">
+              <a:solidFill>
+                <a:schemeClr val="tx1"/>
+              </a:solidFill>
+            </a:ln>
+          </p:spPr>
+          <p:style>
+            <a:lnRef idx="1">
+              <a:schemeClr val="accent1"/>
+            </a:lnRef>
+            <a:fillRef idx="0">
+              <a:schemeClr val="accent1"/>
+            </a:fillRef>
+            <a:effectRef idx="0">
+              <a:schemeClr val="accent1"/>
+            </a:effectRef>
+            <a:fontRef idx="minor">
+              <a:schemeClr val="tx1"/>
+            </a:fontRef>
+          </p:style>
+        </p:cxnSp>
+        <p:cxnSp>
+          <p:nvCxnSpPr>
+            <p:cNvPr id="14" name="Straight Connector 13"/>
+            <p:cNvCxnSpPr/>
+            <p:nvPr/>
+          </p:nvCxnSpPr>
+          <p:spPr>
+            <a:xfrm>
+              <a:off x="4467155" y="5629498"/>
+              <a:ext cx="1160561" cy="8313"/>
+            </a:xfrm>
+            <a:prstGeom prst="line">
+              <a:avLst/>
+            </a:prstGeom>
+            <a:ln w="38100">
+              <a:solidFill>
+                <a:schemeClr val="tx1"/>
+              </a:solidFill>
+            </a:ln>
+          </p:spPr>
+          <p:style>
+            <a:lnRef idx="1">
+              <a:schemeClr val="accent1"/>
+            </a:lnRef>
+            <a:fillRef idx="0">
+              <a:schemeClr val="accent1"/>
+            </a:fillRef>
+            <a:effectRef idx="0">
+              <a:schemeClr val="accent1"/>
+            </a:effectRef>
+            <a:fontRef idx="minor">
+              <a:schemeClr val="tx1"/>
+            </a:fontRef>
+          </p:style>
+        </p:cxnSp>
+      </p:grpSp>
+    </p:spTree>
+    <p:extLst>
+      <p:ext uri="{BB962C8B-B14F-4D97-AF65-F5344CB8AC3E}">
+        <p14:creationId xmlns:p14="http://schemas.microsoft.com/office/powerpoint/2010/main" val="2990996252"/>
+      </p:ext>
+    </p:extLst>
+  </p:cSld>
+  <p:clrMapOvr>
+    <a:masterClrMapping/>
+  </p:clrMapOvr>
+  <p:timing>
+    <p:tnLst>
+      <p:par>
+        <p:cTn id="1" dur="indefinite" restart="never" nodeType="tmRoot"/>
+      </p:par>
+    </p:tnLst>
+  </p:timing>
+</p:sld>
+</file>
+
+<file path=ppt/slides/slide42.xml><?xml version="1.0" encoding="utf-8"?>
+<p:sld xmlns:a="http://schemas.openxmlformats.org/drawingml/2006/main" xmlns:r="http://schemas.openxmlformats.org/officeDocument/2006/relationships" xmlns:p="http://schemas.openxmlformats.org/presentationml/2006/main">
+  <p:cSld>
+    <p:spTree>
+      <p:nvGrpSpPr>
+        <p:cNvPr id="1" name=""/>
+        <p:cNvGrpSpPr/>
+        <p:nvPr/>
+      </p:nvGrpSpPr>
+      <p:grpSpPr>
+        <a:xfrm>
+          <a:off x="0" y="0"/>
+          <a:ext cx="0" cy="0"/>
+          <a:chOff x="0" y="0"/>
+          <a:chExt cx="0" cy="0"/>
+        </a:xfrm>
+      </p:grpSpPr>
       <p:sp>
         <p:nvSpPr>
-          <p:cNvPr id="3" name="Content Placeholder 2">
+          <p:cNvPr id="2" name="Title 1">
             <a:extLst>
               <a:ext uri="{FF2B5EF4-FFF2-40B4-BE49-F238E27FC236}">
-                <a16:creationId xmlns:a16="http://schemas.microsoft.com/office/drawing/2014/main" id="{162B254E-736E-4FD9-B355-657FDD8BC765}"/>
+                <a16:creationId xmlns:a16="http://schemas.microsoft.com/office/drawing/2014/main" id="{E9C110BE-3739-4D82-BCC4-5D15A4E7D52D}"/>
               </a:ext>
             </a:extLst>
           </p:cNvPr>
@@ -40865,7 +42064,7 @@
             <a:spLocks noGrp="1"/>
           </p:cNvSpPr>
           <p:nvPr>
-            <p:ph idx="1"/>
+            <p:ph type="title"/>
           </p:nvPr>
         </p:nvSpPr>
         <p:spPr/>
@@ -40873,14 +42072,1029 @@
           <a:bodyPr/>
           <a:lstStyle/>
           <a:p>
-            <a:endParaRPr lang="en-US"/>
+            <a:r>
+              <a:rPr lang="en-US" dirty="0" smtClean="0"/>
+              <a:t>CC Source – Pathological Case</a:t>
+            </a:r>
+            <a:endParaRPr lang="en-US" dirty="0"/>
+          </a:p>
+        </p:txBody>
+      </p:sp>
+      <mc:AlternateContent xmlns:mc="http://schemas.openxmlformats.org/markup-compatibility/2006">
+        <mc:Choice xmlns:a14="http://schemas.microsoft.com/office/drawing/2010/main" Requires="a14">
+          <p:sp>
+            <p:nvSpPr>
+              <p:cNvPr id="3" name="Content Placeholder 2">
+                <a:extLst>
+                  <a:ext uri="{FF2B5EF4-FFF2-40B4-BE49-F238E27FC236}">
+                    <a16:creationId xmlns:a16="http://schemas.microsoft.com/office/drawing/2014/main" id="{162B254E-736E-4FD9-B355-657FDD8BC765}"/>
+                  </a:ext>
+                </a:extLst>
+              </p:cNvPr>
+              <p:cNvSpPr>
+                <a:spLocks noGrp="1"/>
+              </p:cNvSpPr>
+              <p:nvPr>
+                <p:ph idx="1"/>
+              </p:nvPr>
+            </p:nvSpPr>
+            <p:spPr/>
+            <p:txBody>
+              <a:bodyPr/>
+              <a:lstStyle/>
+              <a:p>
+                <a:r>
+                  <a:rPr lang="en-US" dirty="0" smtClean="0"/>
+                  <a:t>In this case, we have an open current source</a:t>
+                </a:r>
+              </a:p>
+              <a:p>
+                <a:pPr lvl="1"/>
+                <a:r>
+                  <a:rPr lang="en-US" dirty="0" smtClean="0"/>
+                  <a:t>That is, no current can flow between the terminals</a:t>
+                </a:r>
+              </a:p>
+              <a:p>
+                <a:r>
+                  <a:rPr lang="en-US" dirty="0" smtClean="0"/>
+                  <a:t>However, there is 1 A flowing by definition</a:t>
+                </a:r>
+              </a:p>
+              <a:p>
+                <a14:m>
+                  <m:oMath xmlns:m="http://schemas.openxmlformats.org/officeDocument/2006/math">
+                    <m:r>
+                      <a:rPr lang="en-US" b="0" i="1" smtClean="0">
+                        <a:latin typeface="Cambria Math" panose="02040503050406030204" pitchFamily="18" charset="0"/>
+                      </a:rPr>
+                      <m:t>𝑉</m:t>
+                    </m:r>
+                    <m:r>
+                      <a:rPr lang="en-US" b="0" i="1" smtClean="0">
+                        <a:latin typeface="Cambria Math" panose="02040503050406030204" pitchFamily="18" charset="0"/>
+                      </a:rPr>
+                      <m:t>=</m:t>
+                    </m:r>
+                    <m:r>
+                      <a:rPr lang="en-US" b="0" i="1" smtClean="0">
+                        <a:latin typeface="Cambria Math" panose="02040503050406030204" pitchFamily="18" charset="0"/>
+                      </a:rPr>
+                      <m:t>𝐼𝑅</m:t>
+                    </m:r>
+                    <m:r>
+                      <a:rPr lang="en-US" b="0" i="1" smtClean="0">
+                        <a:latin typeface="Cambria Math" panose="02040503050406030204" pitchFamily="18" charset="0"/>
+                      </a:rPr>
+                      <m:t>=1∙∞</m:t>
+                    </m:r>
+                  </m:oMath>
+                </a14:m>
+                <a:endParaRPr lang="en-US" dirty="0" smtClean="0"/>
+              </a:p>
+              <a:p>
+                <a:r>
+                  <a:rPr lang="en-US" dirty="0" smtClean="0"/>
+                  <a:t>Infinite voltage is also a bad sign</a:t>
+                </a:r>
+                <a:endParaRPr lang="en-US" dirty="0"/>
+              </a:p>
+            </p:txBody>
+          </p:sp>
+        </mc:Choice>
+        <mc:Fallback>
+          <p:sp>
+            <p:nvSpPr>
+              <p:cNvPr id="3" name="Content Placeholder 2">
+                <a:extLst>
+                  <a:ext uri="{FF2B5EF4-FFF2-40B4-BE49-F238E27FC236}">
+                    <a16:creationId xmlns:a16="http://schemas.microsoft.com/office/drawing/2014/main" id="{162B254E-736E-4FD9-B355-657FDD8BC765}"/>
+                  </a:ext>
+                </a:extLst>
+              </p:cNvPr>
+              <p:cNvSpPr>
+                <a:spLocks noGrp="1" noRot="1" noChangeAspect="1" noMove="1" noResize="1" noEditPoints="1" noAdjustHandles="1" noChangeArrowheads="1" noChangeShapeType="1" noTextEdit="1"/>
+              </p:cNvSpPr>
+              <p:nvPr>
+                <p:ph idx="1"/>
+              </p:nvPr>
+            </p:nvSpPr>
+            <p:spPr>
+              <a:blipFill>
+                <a:blip r:embed="rId2"/>
+                <a:stretch>
+                  <a:fillRect l="-1704" t="-1752" r="-1037"/>
+                </a:stretch>
+              </a:blipFill>
+            </p:spPr>
+            <p:txBody>
+              <a:bodyPr/>
+              <a:lstStyle/>
+              <a:p>
+                <a:r>
+                  <a:rPr lang="en-US">
+                    <a:noFill/>
+                  </a:rPr>
+                  <a:t> </a:t>
+                </a:r>
+              </a:p>
+            </p:txBody>
+          </p:sp>
+        </mc:Fallback>
+      </mc:AlternateContent>
+      <p:grpSp>
+        <p:nvGrpSpPr>
+          <p:cNvPr id="4" name="Group 3"/>
+          <p:cNvGrpSpPr/>
+          <p:nvPr/>
+        </p:nvGrpSpPr>
+        <p:grpSpPr>
+          <a:xfrm>
+            <a:off x="6625243" y="4605251"/>
+            <a:ext cx="1745674" cy="1812175"/>
+            <a:chOff x="6425738" y="4181302"/>
+            <a:chExt cx="1745674" cy="1812175"/>
+          </a:xfrm>
+        </p:grpSpPr>
+        <p:sp>
+          <p:nvSpPr>
+            <p:cNvPr id="5" name="Rectangle 4"/>
+            <p:cNvSpPr/>
+            <p:nvPr/>
+          </p:nvSpPr>
+          <p:spPr>
+            <a:xfrm>
+              <a:off x="6425738" y="4181302"/>
+              <a:ext cx="1745674" cy="1812175"/>
+            </a:xfrm>
+            <a:prstGeom prst="rect">
+              <a:avLst/>
+            </a:prstGeom>
+            <a:solidFill>
+              <a:schemeClr val="bg1"/>
+            </a:solidFill>
+            <a:ln>
+              <a:noFill/>
+            </a:ln>
+          </p:spPr>
+          <p:style>
+            <a:lnRef idx="2">
+              <a:schemeClr val="accent1">
+                <a:shade val="50000"/>
+              </a:schemeClr>
+            </a:lnRef>
+            <a:fillRef idx="1">
+              <a:schemeClr val="accent1"/>
+            </a:fillRef>
+            <a:effectRef idx="0">
+              <a:schemeClr val="accent1"/>
+            </a:effectRef>
+            <a:fontRef idx="minor">
+              <a:schemeClr val="lt1"/>
+            </a:fontRef>
+          </p:style>
+          <p:txBody>
+            <a:bodyPr rtlCol="0" anchor="ctr"/>
+            <a:lstStyle/>
+            <a:p>
+              <a:pPr algn="ctr"/>
+              <a:endParaRPr lang="en-US"/>
+            </a:p>
+          </p:txBody>
+        </p:sp>
+        <p:grpSp>
+          <p:nvGrpSpPr>
+            <p:cNvPr id="15" name="Group 14"/>
+            <p:cNvGrpSpPr/>
+            <p:nvPr/>
+          </p:nvGrpSpPr>
+          <p:grpSpPr>
+            <a:xfrm>
+              <a:off x="6531669" y="4521122"/>
+              <a:ext cx="1119032" cy="1132533"/>
+              <a:chOff x="4794309" y="5336552"/>
+              <a:chExt cx="1119032" cy="1132533"/>
+            </a:xfrm>
+          </p:grpSpPr>
+          <p:sp>
+            <p:nvSpPr>
+              <p:cNvPr id="16" name="Rectangle 15"/>
+              <p:cNvSpPr/>
+              <p:nvPr/>
+            </p:nvSpPr>
+            <p:spPr>
+              <a:xfrm>
+                <a:off x="4794310" y="5336552"/>
+                <a:ext cx="1119031" cy="1132533"/>
+              </a:xfrm>
+              <a:prstGeom prst="rect">
+                <a:avLst/>
+              </a:prstGeom>
+              <a:solidFill>
+                <a:schemeClr val="bg1"/>
+              </a:solidFill>
+              <a:ln>
+                <a:noFill/>
+              </a:ln>
+            </p:spPr>
+            <p:style>
+              <a:lnRef idx="2">
+                <a:schemeClr val="accent1">
+                  <a:shade val="50000"/>
+                </a:schemeClr>
+              </a:lnRef>
+              <a:fillRef idx="1">
+                <a:schemeClr val="accent1"/>
+              </a:fillRef>
+              <a:effectRef idx="0">
+                <a:schemeClr val="accent1"/>
+              </a:effectRef>
+              <a:fontRef idx="minor">
+                <a:schemeClr val="lt1"/>
+              </a:fontRef>
+            </p:style>
+            <p:txBody>
+              <a:bodyPr rtlCol="0" anchor="ctr"/>
+              <a:lstStyle/>
+              <a:p>
+                <a:pPr algn="ctr"/>
+                <a:endParaRPr lang="en-US"/>
+              </a:p>
+            </p:txBody>
+          </p:sp>
+          <p:sp>
+            <p:nvSpPr>
+              <p:cNvPr id="17" name="TextBox 16"/>
+              <p:cNvSpPr txBox="1"/>
+              <p:nvPr/>
+            </p:nvSpPr>
+            <p:spPr>
+              <a:xfrm>
+                <a:off x="5425707" y="5732292"/>
+                <a:ext cx="487634" cy="369332"/>
+              </a:xfrm>
+              <a:prstGeom prst="rect">
+                <a:avLst/>
+              </a:prstGeom>
+              <a:noFill/>
+            </p:spPr>
+            <p:txBody>
+              <a:bodyPr wrap="none" rtlCol="0">
+                <a:spAutoFit/>
+              </a:bodyPr>
+              <a:lstStyle/>
+              <a:p>
+                <a:r>
+                  <a:rPr lang="en-US" dirty="0"/>
+                  <a:t>1 A</a:t>
+                </a:r>
+              </a:p>
+            </p:txBody>
+          </p:sp>
+          <p:pic>
+            <p:nvPicPr>
+              <p:cNvPr id="18" name="Picture 17"/>
+              <p:cNvPicPr>
+                <a:picLocks noChangeAspect="1"/>
+              </p:cNvPicPr>
+              <p:nvPr/>
+            </p:nvPicPr>
+            <p:blipFill>
+              <a:blip r:embed="rId3"/>
+              <a:stretch>
+                <a:fillRect/>
+              </a:stretch>
+            </p:blipFill>
+            <p:spPr>
+              <a:xfrm>
+                <a:off x="4794309" y="5606352"/>
+                <a:ext cx="631399" cy="621215"/>
+              </a:xfrm>
+              <a:prstGeom prst="rect">
+                <a:avLst/>
+              </a:prstGeom>
+            </p:spPr>
+          </p:pic>
+          <p:cxnSp>
+            <p:nvCxnSpPr>
+              <p:cNvPr id="20" name="Straight Connector 19"/>
+              <p:cNvCxnSpPr/>
+              <p:nvPr/>
+            </p:nvCxnSpPr>
+            <p:spPr>
+              <a:xfrm>
+                <a:off x="5110007" y="5336553"/>
+                <a:ext cx="0" cy="269799"/>
+              </a:xfrm>
+              <a:prstGeom prst="line">
+                <a:avLst/>
+              </a:prstGeom>
+              <a:ln w="38100">
+                <a:solidFill>
+                  <a:schemeClr val="tx1"/>
+                </a:solidFill>
+              </a:ln>
+            </p:spPr>
+            <p:style>
+              <a:lnRef idx="1">
+                <a:schemeClr val="accent1"/>
+              </a:lnRef>
+              <a:fillRef idx="0">
+                <a:schemeClr val="accent1"/>
+              </a:fillRef>
+              <a:effectRef idx="0">
+                <a:schemeClr val="accent1"/>
+              </a:effectRef>
+              <a:fontRef idx="minor">
+                <a:schemeClr val="tx1"/>
+              </a:fontRef>
+            </p:style>
+          </p:cxnSp>
+          <p:cxnSp>
+            <p:nvCxnSpPr>
+              <p:cNvPr id="21" name="Straight Connector 20"/>
+              <p:cNvCxnSpPr/>
+              <p:nvPr/>
+            </p:nvCxnSpPr>
+            <p:spPr>
+              <a:xfrm>
+                <a:off x="5110007" y="6199286"/>
+                <a:ext cx="0" cy="269799"/>
+              </a:xfrm>
+              <a:prstGeom prst="line">
+                <a:avLst/>
+              </a:prstGeom>
+              <a:ln w="38100">
+                <a:solidFill>
+                  <a:schemeClr val="tx1"/>
+                </a:solidFill>
+              </a:ln>
+            </p:spPr>
+            <p:style>
+              <a:lnRef idx="1">
+                <a:schemeClr val="accent1"/>
+              </a:lnRef>
+              <a:fillRef idx="0">
+                <a:schemeClr val="accent1"/>
+              </a:fillRef>
+              <a:effectRef idx="0">
+                <a:schemeClr val="accent1"/>
+              </a:effectRef>
+              <a:fontRef idx="minor">
+                <a:schemeClr val="tx1"/>
+              </a:fontRef>
+            </p:style>
+          </p:cxnSp>
+        </p:grpSp>
+      </p:grpSp>
+    </p:spTree>
+    <p:extLst>
+      <p:ext uri="{BB962C8B-B14F-4D97-AF65-F5344CB8AC3E}">
+        <p14:creationId xmlns:p14="http://schemas.microsoft.com/office/powerpoint/2010/main" val="2030337549"/>
+      </p:ext>
+    </p:extLst>
+  </p:cSld>
+  <p:clrMapOvr>
+    <a:masterClrMapping/>
+  </p:clrMapOvr>
+  <p:timing>
+    <p:tnLst>
+      <p:par>
+        <p:cTn id="1" dur="indefinite" restart="never" nodeType="tmRoot"/>
+      </p:par>
+    </p:tnLst>
+  </p:timing>
+</p:sld>
+</file>
+
+<file path=ppt/slides/slide43.xml><?xml version="1.0" encoding="utf-8"?>
+<p:sld xmlns:a="http://schemas.openxmlformats.org/drawingml/2006/main" xmlns:r="http://schemas.openxmlformats.org/officeDocument/2006/relationships" xmlns:p="http://schemas.openxmlformats.org/presentationml/2006/main">
+  <p:cSld>
+    <p:spTree>
+      <p:nvGrpSpPr>
+        <p:cNvPr id="1" name=""/>
+        <p:cNvGrpSpPr/>
+        <p:nvPr/>
+      </p:nvGrpSpPr>
+      <p:grpSpPr>
+        <a:xfrm>
+          <a:off x="0" y="0"/>
+          <a:ext cx="0" cy="0"/>
+          <a:chOff x="0" y="0"/>
+          <a:chExt cx="0" cy="0"/>
+        </a:xfrm>
+      </p:grpSpPr>
+      <p:sp>
+        <p:nvSpPr>
+          <p:cNvPr id="2" name="Title 1"/>
+          <p:cNvSpPr>
+            <a:spLocks noGrp="1"/>
+          </p:cNvSpPr>
+          <p:nvPr>
+            <p:ph type="title"/>
+          </p:nvPr>
+        </p:nvSpPr>
+        <p:spPr/>
+        <p:txBody>
+          <a:bodyPr/>
+          <a:lstStyle/>
+          <a:p>
+            <a:r>
+              <a:rPr lang="en-US" dirty="0" smtClean="0"/>
+              <a:t>Improving Sources</a:t>
+            </a:r>
+            <a:endParaRPr lang="en-US" dirty="0"/>
+          </a:p>
+        </p:txBody>
+      </p:sp>
+      <p:sp>
+        <p:nvSpPr>
+          <p:cNvPr id="3" name="Content Placeholder 2"/>
+          <p:cNvSpPr>
+            <a:spLocks noGrp="1"/>
+          </p:cNvSpPr>
+          <p:nvPr>
+            <p:ph idx="1"/>
+          </p:nvPr>
+        </p:nvSpPr>
+        <p:spPr>
+          <a:xfrm>
+            <a:off x="457200" y="1600203"/>
+            <a:ext cx="8229600" cy="2788918"/>
+          </a:xfrm>
+        </p:spPr>
+        <p:txBody>
+          <a:bodyPr>
+            <a:normAutofit fontScale="85000" lnSpcReduction="10000"/>
+          </a:bodyPr>
+          <a:lstStyle/>
+          <a:p>
+            <a:r>
+              <a:rPr lang="en-US" dirty="0" smtClean="0"/>
+              <a:t>In both cases, the sources can be made more realistic through the addition of resistors</a:t>
+            </a:r>
+          </a:p>
+          <a:p>
+            <a:r>
+              <a:rPr lang="en-US" dirty="0" smtClean="0"/>
+              <a:t>The voltage source gets an internal</a:t>
+            </a:r>
+            <a:r>
+              <a:rPr lang="en-US" i="1" dirty="0" smtClean="0"/>
+              <a:t> </a:t>
+            </a:r>
+            <a:r>
+              <a:rPr lang="en-US" dirty="0" smtClean="0"/>
+              <a:t>series resistor that limits current when shorted</a:t>
+            </a:r>
+          </a:p>
+          <a:p>
+            <a:r>
+              <a:rPr lang="en-US" dirty="0" smtClean="0"/>
+              <a:t>The current source gets an internal parallel resistor that gives the current somewhere to go when shorted</a:t>
+            </a:r>
+            <a:endParaRPr lang="en-US" dirty="0"/>
+          </a:p>
+        </p:txBody>
+      </p:sp>
+      <p:pic>
+        <p:nvPicPr>
+          <p:cNvPr id="5" name="Picture 4"/>
+          <p:cNvPicPr>
+            <a:picLocks noChangeAspect="1"/>
+          </p:cNvPicPr>
+          <p:nvPr/>
+        </p:nvPicPr>
+        <p:blipFill>
+          <a:blip r:embed="rId2">
+            <a:extLst>
+              <a:ext uri="{28A0092B-C50C-407E-A947-70E740481C1C}">
+                <a14:useLocalDpi xmlns:a14="http://schemas.microsoft.com/office/drawing/2010/main" val="0"/>
+              </a:ext>
+            </a:extLst>
+          </a:blip>
+          <a:stretch>
+            <a:fillRect/>
+          </a:stretch>
+        </p:blipFill>
+        <p:spPr>
+          <a:xfrm>
+            <a:off x="1422602" y="4535285"/>
+            <a:ext cx="962025" cy="2209800"/>
+          </a:xfrm>
+          <a:prstGeom prst="rect">
+            <a:avLst/>
+          </a:prstGeom>
+        </p:spPr>
+      </p:pic>
+      <p:pic>
+        <p:nvPicPr>
+          <p:cNvPr id="6" name="Picture 5"/>
+          <p:cNvPicPr>
+            <a:picLocks noChangeAspect="1"/>
+          </p:cNvPicPr>
+          <p:nvPr/>
+        </p:nvPicPr>
+        <p:blipFill>
+          <a:blip r:embed="rId3">
+            <a:extLst>
+              <a:ext uri="{28A0092B-C50C-407E-A947-70E740481C1C}">
+                <a14:useLocalDpi xmlns:a14="http://schemas.microsoft.com/office/drawing/2010/main" val="0"/>
+              </a:ext>
+            </a:extLst>
+          </a:blip>
+          <a:stretch>
+            <a:fillRect/>
+          </a:stretch>
+        </p:blipFill>
+        <p:spPr>
+          <a:xfrm>
+            <a:off x="4742064" y="4773410"/>
+            <a:ext cx="1733550" cy="1733550"/>
+          </a:xfrm>
+          <a:prstGeom prst="rect">
+            <a:avLst/>
+          </a:prstGeom>
+        </p:spPr>
+      </p:pic>
+    </p:spTree>
+    <p:extLst>
+      <p:ext uri="{BB962C8B-B14F-4D97-AF65-F5344CB8AC3E}">
+        <p14:creationId xmlns:p14="http://schemas.microsoft.com/office/powerpoint/2010/main" val="4287520984"/>
+      </p:ext>
+    </p:extLst>
+  </p:cSld>
+  <p:clrMapOvr>
+    <a:masterClrMapping/>
+  </p:clrMapOvr>
+</p:sld>
+</file>
+
+<file path=ppt/slides/slide44.xml><?xml version="1.0" encoding="utf-8"?>
+<p:sld xmlns:a="http://schemas.openxmlformats.org/drawingml/2006/main" xmlns:r="http://schemas.openxmlformats.org/officeDocument/2006/relationships" xmlns:p="http://schemas.openxmlformats.org/presentationml/2006/main">
+  <p:cSld>
+    <p:spTree>
+      <p:nvGrpSpPr>
+        <p:cNvPr id="1" name=""/>
+        <p:cNvGrpSpPr/>
+        <p:nvPr/>
+      </p:nvGrpSpPr>
+      <p:grpSpPr>
+        <a:xfrm>
+          <a:off x="0" y="0"/>
+          <a:ext cx="0" cy="0"/>
+          <a:chOff x="0" y="0"/>
+          <a:chExt cx="0" cy="0"/>
+        </a:xfrm>
+      </p:grpSpPr>
+      <p:sp>
+        <p:nvSpPr>
+          <p:cNvPr id="2" name="Title 1"/>
+          <p:cNvSpPr>
+            <a:spLocks noGrp="1"/>
+          </p:cNvSpPr>
+          <p:nvPr>
+            <p:ph type="title"/>
+          </p:nvPr>
+        </p:nvSpPr>
+        <p:spPr/>
+        <p:txBody>
+          <a:bodyPr/>
+          <a:lstStyle/>
+          <a:p>
+            <a:r>
+              <a:rPr lang="en-US" dirty="0" smtClean="0"/>
+              <a:t>Improving Sources</a:t>
+            </a:r>
+            <a:endParaRPr lang="en-US" dirty="0"/>
+          </a:p>
+        </p:txBody>
+      </p:sp>
+      <p:sp>
+        <p:nvSpPr>
+          <p:cNvPr id="3" name="Content Placeholder 2"/>
+          <p:cNvSpPr>
+            <a:spLocks noGrp="1"/>
+          </p:cNvSpPr>
+          <p:nvPr>
+            <p:ph idx="1"/>
+          </p:nvPr>
+        </p:nvSpPr>
+        <p:spPr>
+          <a:xfrm>
+            <a:off x="457200" y="1600203"/>
+            <a:ext cx="8229600" cy="2788918"/>
+          </a:xfrm>
+        </p:spPr>
+        <p:txBody>
+          <a:bodyPr>
+            <a:normAutofit fontScale="85000" lnSpcReduction="10000"/>
+          </a:bodyPr>
+          <a:lstStyle/>
+          <a:p>
+            <a:r>
+              <a:rPr lang="en-US" dirty="0" smtClean="0"/>
+              <a:t>Both sources can now be characterized with a finite </a:t>
+            </a:r>
+            <a:r>
+              <a:rPr lang="en-US" i="1" dirty="0" smtClean="0"/>
+              <a:t>open-circuit voltage</a:t>
+            </a:r>
+            <a:r>
+              <a:rPr lang="en-US" dirty="0" smtClean="0"/>
+              <a:t> and a finite </a:t>
+            </a:r>
+            <a:r>
+              <a:rPr lang="en-US" i="1" dirty="0" smtClean="0"/>
+              <a:t>short-circuit current</a:t>
+            </a:r>
+          </a:p>
+          <a:p>
+            <a:r>
+              <a:rPr lang="en-US" dirty="0" smtClean="0"/>
+              <a:t>In fact, by correctly choosing the values of the source and the resistor, you can replace a CC source with a CV source that behaves the same (and vice-versa)</a:t>
+            </a:r>
+          </a:p>
+          <a:p>
+            <a:pPr lvl="1"/>
+            <a:r>
+              <a:rPr lang="en-US" dirty="0" smtClean="0"/>
+              <a:t>These are known as </a:t>
+            </a:r>
+            <a:r>
+              <a:rPr lang="en-US" dirty="0" err="1" smtClean="0"/>
+              <a:t>Thévenin’s</a:t>
+            </a:r>
+            <a:r>
+              <a:rPr lang="en-US" dirty="0" smtClean="0"/>
+              <a:t> Theorem and Norton’s Theorem, respectively</a:t>
+            </a:r>
+            <a:endParaRPr lang="en-US" dirty="0"/>
+          </a:p>
+        </p:txBody>
+      </p:sp>
+      <p:pic>
+        <p:nvPicPr>
+          <p:cNvPr id="5" name="Picture 4"/>
+          <p:cNvPicPr>
+            <a:picLocks noChangeAspect="1"/>
+          </p:cNvPicPr>
+          <p:nvPr/>
+        </p:nvPicPr>
+        <p:blipFill>
+          <a:blip r:embed="rId2">
+            <a:extLst>
+              <a:ext uri="{28A0092B-C50C-407E-A947-70E740481C1C}">
+                <a14:useLocalDpi xmlns:a14="http://schemas.microsoft.com/office/drawing/2010/main" val="0"/>
+              </a:ext>
+            </a:extLst>
+          </a:blip>
+          <a:stretch>
+            <a:fillRect/>
+          </a:stretch>
+        </p:blipFill>
+        <p:spPr>
+          <a:xfrm>
+            <a:off x="1422602" y="4535285"/>
+            <a:ext cx="962025" cy="2209800"/>
+          </a:xfrm>
+          <a:prstGeom prst="rect">
+            <a:avLst/>
+          </a:prstGeom>
+        </p:spPr>
+      </p:pic>
+      <p:pic>
+        <p:nvPicPr>
+          <p:cNvPr id="6" name="Picture 5"/>
+          <p:cNvPicPr>
+            <a:picLocks noChangeAspect="1"/>
+          </p:cNvPicPr>
+          <p:nvPr/>
+        </p:nvPicPr>
+        <p:blipFill>
+          <a:blip r:embed="rId3">
+            <a:extLst>
+              <a:ext uri="{28A0092B-C50C-407E-A947-70E740481C1C}">
+                <a14:useLocalDpi xmlns:a14="http://schemas.microsoft.com/office/drawing/2010/main" val="0"/>
+              </a:ext>
+            </a:extLst>
+          </a:blip>
+          <a:stretch>
+            <a:fillRect/>
+          </a:stretch>
+        </p:blipFill>
+        <p:spPr>
+          <a:xfrm>
+            <a:off x="4742064" y="4773410"/>
+            <a:ext cx="1733550" cy="1733550"/>
+          </a:xfrm>
+          <a:prstGeom prst="rect">
+            <a:avLst/>
+          </a:prstGeom>
+        </p:spPr>
+      </p:pic>
+    </p:spTree>
+    <p:extLst>
+      <p:ext uri="{BB962C8B-B14F-4D97-AF65-F5344CB8AC3E}">
+        <p14:creationId xmlns:p14="http://schemas.microsoft.com/office/powerpoint/2010/main" val="2909026872"/>
+      </p:ext>
+    </p:extLst>
+  </p:cSld>
+  <p:clrMapOvr>
+    <a:masterClrMapping/>
+  </p:clrMapOvr>
+</p:sld>
+</file>
+
+<file path=ppt/slides/slide45.xml><?xml version="1.0" encoding="utf-8"?>
+<p:sld xmlns:a="http://schemas.openxmlformats.org/drawingml/2006/main" xmlns:r="http://schemas.openxmlformats.org/officeDocument/2006/relationships" xmlns:p="http://schemas.openxmlformats.org/presentationml/2006/main">
+  <p:cSld>
+    <p:spTree>
+      <p:nvGrpSpPr>
+        <p:cNvPr id="1" name=""/>
+        <p:cNvGrpSpPr/>
+        <p:nvPr/>
+      </p:nvGrpSpPr>
+      <p:grpSpPr>
+        <a:xfrm>
+          <a:off x="0" y="0"/>
+          <a:ext cx="0" cy="0"/>
+          <a:chOff x="0" y="0"/>
+          <a:chExt cx="0" cy="0"/>
+        </a:xfrm>
+      </p:grpSpPr>
+      <p:sp>
+        <p:nvSpPr>
+          <p:cNvPr id="2" name="Title 1"/>
+          <p:cNvSpPr>
+            <a:spLocks noGrp="1"/>
+          </p:cNvSpPr>
+          <p:nvPr>
+            <p:ph type="title"/>
+          </p:nvPr>
+        </p:nvSpPr>
+        <p:spPr/>
+        <p:txBody>
+          <a:bodyPr/>
+          <a:lstStyle/>
+          <a:p>
+            <a:r>
+              <a:rPr lang="en-US" dirty="0" smtClean="0"/>
+              <a:t>Batteries</a:t>
+            </a:r>
+            <a:endParaRPr lang="en-US" dirty="0"/>
+          </a:p>
+        </p:txBody>
+      </p:sp>
+      <p:sp>
+        <p:nvSpPr>
+          <p:cNvPr id="3" name="Content Placeholder 2"/>
+          <p:cNvSpPr>
+            <a:spLocks noGrp="1"/>
+          </p:cNvSpPr>
+          <p:nvPr>
+            <p:ph idx="1"/>
+          </p:nvPr>
+        </p:nvSpPr>
+        <p:spPr>
+          <a:xfrm>
+            <a:off x="457200" y="1600202"/>
+            <a:ext cx="8229600" cy="4825536"/>
+          </a:xfrm>
+        </p:spPr>
+        <p:txBody>
+          <a:bodyPr>
+            <a:normAutofit fontScale="92500" lnSpcReduction="10000"/>
+          </a:bodyPr>
+          <a:lstStyle/>
+          <a:p>
+            <a:r>
+              <a:rPr lang="en-US" b="1" dirty="0" smtClean="0"/>
+              <a:t>In the short term</a:t>
+            </a:r>
+            <a:r>
+              <a:rPr lang="en-US" dirty="0" smtClean="0"/>
+              <a:t>, you can think of batteries as voltage sources with series resistors</a:t>
+            </a:r>
+          </a:p>
+          <a:p>
+            <a:pPr lvl="1"/>
+            <a:r>
+              <a:rPr lang="en-US" dirty="0" smtClean="0"/>
+              <a:t>That is, the more current you pull, the lower the voltage will be</a:t>
+            </a:r>
+          </a:p>
+          <a:p>
+            <a:r>
+              <a:rPr lang="en-US" dirty="0" smtClean="0"/>
+              <a:t>However, batteries have limited capacity</a:t>
+            </a:r>
+          </a:p>
+          <a:p>
+            <a:pPr lvl="1"/>
+            <a:r>
+              <a:rPr lang="en-US" dirty="0" smtClean="0"/>
+              <a:t>Often expressed as </a:t>
+            </a:r>
+            <a:r>
+              <a:rPr lang="en-US" dirty="0" err="1" smtClean="0"/>
+              <a:t>A∙h</a:t>
+            </a:r>
+            <a:r>
+              <a:rPr lang="en-US" dirty="0" smtClean="0"/>
+              <a:t> or </a:t>
+            </a:r>
+            <a:r>
+              <a:rPr lang="en-US" dirty="0" err="1" smtClean="0"/>
+              <a:t>W∙h</a:t>
+            </a:r>
+            <a:endParaRPr lang="en-US" dirty="0" smtClean="0"/>
+          </a:p>
+          <a:p>
+            <a:pPr lvl="1"/>
+            <a:r>
+              <a:rPr lang="en-US" dirty="0" smtClean="0"/>
+              <a:t>A 1 </a:t>
+            </a:r>
+            <a:r>
+              <a:rPr lang="en-US" dirty="0" err="1" smtClean="0"/>
+              <a:t>A∙h</a:t>
+            </a:r>
+            <a:r>
+              <a:rPr lang="en-US" dirty="0" smtClean="0"/>
+              <a:t> battery can supply an amp for an hour before the voltage drops below some threshold</a:t>
+            </a:r>
+          </a:p>
+          <a:p>
+            <a:pPr lvl="1"/>
+            <a:r>
+              <a:rPr lang="en-US" dirty="0" smtClean="0"/>
+              <a:t>FRC batteries are 18 </a:t>
+            </a:r>
+            <a:r>
+              <a:rPr lang="en-US" dirty="0" err="1" smtClean="0"/>
+              <a:t>A∙h</a:t>
+            </a:r>
+            <a:endParaRPr lang="en-US" dirty="0" smtClean="0"/>
+          </a:p>
+          <a:p>
+            <a:pPr lvl="2"/>
+            <a:r>
+              <a:rPr lang="en-US" dirty="0" smtClean="0"/>
+              <a:t>So it would seem that you could draw more than 400 A for the duration of an FRC match</a:t>
+            </a:r>
+            <a:endParaRPr lang="en-US" dirty="0"/>
           </a:p>
         </p:txBody>
       </p:sp>
     </p:spTree>
     <p:extLst>
       <p:ext uri="{BB962C8B-B14F-4D97-AF65-F5344CB8AC3E}">
-        <p14:creationId xmlns:p14="http://schemas.microsoft.com/office/powerpoint/2010/main" val="2990996252"/>
+        <p14:creationId xmlns:p14="http://schemas.microsoft.com/office/powerpoint/2010/main" val="313601131"/>
+      </p:ext>
+    </p:extLst>
+  </p:cSld>
+  <p:clrMapOvr>
+    <a:masterClrMapping/>
+  </p:clrMapOvr>
+</p:sld>
+</file>
+
+<file path=ppt/slides/slide46.xml><?xml version="1.0" encoding="utf-8"?>
+<p:sld xmlns:a="http://schemas.openxmlformats.org/drawingml/2006/main" xmlns:r="http://schemas.openxmlformats.org/officeDocument/2006/relationships" xmlns:p="http://schemas.openxmlformats.org/presentationml/2006/main">
+  <p:cSld>
+    <p:spTree>
+      <p:nvGrpSpPr>
+        <p:cNvPr id="1" name=""/>
+        <p:cNvGrpSpPr/>
+        <p:nvPr/>
+      </p:nvGrpSpPr>
+      <p:grpSpPr>
+        <a:xfrm>
+          <a:off x="0" y="0"/>
+          <a:ext cx="0" cy="0"/>
+          <a:chOff x="0" y="0"/>
+          <a:chExt cx="0" cy="0"/>
+        </a:xfrm>
+      </p:grpSpPr>
+      <p:sp>
+        <p:nvSpPr>
+          <p:cNvPr id="2" name="Title 1"/>
+          <p:cNvSpPr>
+            <a:spLocks noGrp="1"/>
+          </p:cNvSpPr>
+          <p:nvPr>
+            <p:ph type="title"/>
+          </p:nvPr>
+        </p:nvSpPr>
+        <p:spPr/>
+        <p:txBody>
+          <a:bodyPr/>
+          <a:lstStyle/>
+          <a:p>
+            <a:r>
+              <a:rPr lang="en-US" dirty="0" smtClean="0"/>
+              <a:t>Batteries</a:t>
+            </a:r>
+            <a:endParaRPr lang="en-US" dirty="0"/>
+          </a:p>
+        </p:txBody>
+      </p:sp>
+      <p:sp>
+        <p:nvSpPr>
+          <p:cNvPr id="3" name="Content Placeholder 2"/>
+          <p:cNvSpPr>
+            <a:spLocks noGrp="1"/>
+          </p:cNvSpPr>
+          <p:nvPr>
+            <p:ph idx="1"/>
+          </p:nvPr>
+        </p:nvSpPr>
+        <p:spPr>
+          <a:xfrm>
+            <a:off x="457200" y="1600203"/>
+            <a:ext cx="8229600" cy="1650074"/>
+          </a:xfrm>
+        </p:spPr>
+        <p:txBody>
+          <a:bodyPr>
+            <a:normAutofit fontScale="92500" lnSpcReduction="20000"/>
+          </a:bodyPr>
+          <a:lstStyle/>
+          <a:p>
+            <a:r>
+              <a:rPr lang="en-US" dirty="0" smtClean="0"/>
+              <a:t>Plots are labelled as CA, Capacity in Amps (18, in this case)</a:t>
+            </a:r>
+          </a:p>
+          <a:p>
+            <a:r>
+              <a:rPr lang="en-US" dirty="0" smtClean="0"/>
+              <a:t>Note that the </a:t>
+            </a:r>
+            <a:r>
+              <a:rPr lang="en-US" i="1" dirty="0" smtClean="0"/>
+              <a:t>capacity</a:t>
+            </a:r>
+            <a:r>
+              <a:rPr lang="en-US" dirty="0" smtClean="0"/>
+              <a:t> of the battery is lower the faster you use it up</a:t>
+            </a:r>
+            <a:endParaRPr lang="en-US" dirty="0"/>
+          </a:p>
+        </p:txBody>
+      </p:sp>
+      <p:pic>
+        <p:nvPicPr>
+          <p:cNvPr id="4" name="Picture 3"/>
+          <p:cNvPicPr>
+            <a:picLocks noChangeAspect="1"/>
+          </p:cNvPicPr>
+          <p:nvPr/>
+        </p:nvPicPr>
+        <p:blipFill rotWithShape="1">
+          <a:blip r:embed="rId2"/>
+          <a:srcRect l="18066" r="10069"/>
+          <a:stretch/>
+        </p:blipFill>
+        <p:spPr>
+          <a:xfrm>
+            <a:off x="108066" y="3308465"/>
+            <a:ext cx="3834470" cy="3465108"/>
+          </a:xfrm>
+          <a:prstGeom prst="rect">
+            <a:avLst/>
+          </a:prstGeom>
+        </p:spPr>
+      </p:pic>
+      <p:pic>
+        <p:nvPicPr>
+          <p:cNvPr id="5" name="Picture 4"/>
+          <p:cNvPicPr>
+            <a:picLocks noChangeAspect="1"/>
+          </p:cNvPicPr>
+          <p:nvPr/>
+        </p:nvPicPr>
+        <p:blipFill>
+          <a:blip r:embed="rId3"/>
+          <a:stretch>
+            <a:fillRect/>
+          </a:stretch>
+        </p:blipFill>
+        <p:spPr>
+          <a:xfrm>
+            <a:off x="4104364" y="3308465"/>
+            <a:ext cx="4931570" cy="3465108"/>
+          </a:xfrm>
+          <a:prstGeom prst="rect">
+            <a:avLst/>
+          </a:prstGeom>
+        </p:spPr>
+      </p:pic>
+    </p:spTree>
+    <p:extLst>
+      <p:ext uri="{BB962C8B-B14F-4D97-AF65-F5344CB8AC3E}">
+        <p14:creationId xmlns:p14="http://schemas.microsoft.com/office/powerpoint/2010/main" val="2197942909"/>
       </p:ext>
     </p:extLst>
   </p:cSld>
@@ -41495,6 +43709,13 @@
   <p:clrMapOvr>
     <a:masterClrMapping/>
   </p:clrMapOvr>
+  <p:timing>
+    <p:tnLst>
+      <p:par>
+        <p:cTn id="1" dur="indefinite" restart="never" nodeType="tmRoot"/>
+      </p:par>
+    </p:tnLst>
+  </p:timing>
 </p:sld>
 </file>
 
@@ -41674,6 +43895,13 @@
   <p:clrMapOvr>
     <a:masterClrMapping/>
   </p:clrMapOvr>
+  <p:timing>
+    <p:tnLst>
+      <p:par>
+        <p:cTn id="1" dur="indefinite" restart="never" nodeType="tmRoot"/>
+      </p:par>
+    </p:tnLst>
+  </p:timing>
 </p:sld>
 </file>
 
@@ -41841,6 +44069,13 @@
   <p:clrMapOvr>
     <a:masterClrMapping/>
   </p:clrMapOvr>
+  <p:timing>
+    <p:tnLst>
+      <p:par>
+        <p:cTn id="1" dur="indefinite" restart="never" nodeType="tmRoot"/>
+      </p:par>
+    </p:tnLst>
+  </p:timing>
 </p:sld>
 </file>
 
@@ -41975,6 +44210,13 @@
   <p:clrMapOvr>
     <a:masterClrMapping/>
   </p:clrMapOvr>
+  <p:timing>
+    <p:tnLst>
+      <p:par>
+        <p:cTn id="1" dur="indefinite" restart="never" nodeType="tmRoot"/>
+      </p:par>
+    </p:tnLst>
+  </p:timing>
 </p:sld>
 </file>
 
@@ -42059,175 +44301,190 @@
           </a:p>
         </p:txBody>
       </p:sp>
-      <p:sp>
-        <p:nvSpPr>
-          <p:cNvPr id="8" name="Rectangle 7"/>
-          <p:cNvSpPr/>
+      <p:grpSp>
+        <p:nvGrpSpPr>
+          <p:cNvPr id="9" name="Group 8"/>
+          <p:cNvGrpSpPr/>
           <p:nvPr/>
-        </p:nvSpPr>
-        <p:spPr>
+        </p:nvGrpSpPr>
+        <p:grpSpPr>
           <a:xfrm>
-            <a:off x="2175801" y="2298333"/>
-            <a:ext cx="1119031" cy="1132533"/>
+            <a:off x="2175800" y="2298333"/>
+            <a:ext cx="1119032" cy="1132533"/>
+            <a:chOff x="2175800" y="2298333"/>
+            <a:chExt cx="1119032" cy="1132533"/>
           </a:xfrm>
-          <a:prstGeom prst="rect">
-            <a:avLst/>
-          </a:prstGeom>
-          <a:solidFill>
-            <a:schemeClr val="bg1"/>
-          </a:solidFill>
-          <a:ln>
+        </p:grpSpPr>
+        <p:sp>
+          <p:nvSpPr>
+            <p:cNvPr id="8" name="Rectangle 7"/>
+            <p:cNvSpPr/>
+            <p:nvPr/>
+          </p:nvSpPr>
+          <p:spPr>
+            <a:xfrm>
+              <a:off x="2175801" y="2298333"/>
+              <a:ext cx="1119031" cy="1132533"/>
+            </a:xfrm>
+            <a:prstGeom prst="rect">
+              <a:avLst/>
+            </a:prstGeom>
+            <a:solidFill>
+              <a:schemeClr val="bg1"/>
+            </a:solidFill>
+            <a:ln>
+              <a:noFill/>
+            </a:ln>
+          </p:spPr>
+          <p:style>
+            <a:lnRef idx="2">
+              <a:schemeClr val="accent1">
+                <a:shade val="50000"/>
+              </a:schemeClr>
+            </a:lnRef>
+            <a:fillRef idx="1">
+              <a:schemeClr val="accent1"/>
+            </a:fillRef>
+            <a:effectRef idx="0">
+              <a:schemeClr val="accent1"/>
+            </a:effectRef>
+            <a:fontRef idx="minor">
+              <a:schemeClr val="lt1"/>
+            </a:fontRef>
+          </p:style>
+          <p:txBody>
+            <a:bodyPr rtlCol="0" anchor="ctr"/>
+            <a:lstStyle/>
+            <a:p>
+              <a:pPr algn="ctr"/>
+              <a:endParaRPr lang="en-US"/>
+            </a:p>
+          </p:txBody>
+        </p:sp>
+        <p:sp>
+          <p:nvSpPr>
+            <p:cNvPr id="7" name="TextBox 6"/>
+            <p:cNvSpPr txBox="1"/>
+            <p:nvPr/>
+          </p:nvSpPr>
+          <p:spPr>
+            <a:xfrm>
+              <a:off x="2807198" y="2694073"/>
+              <a:ext cx="487634" cy="369332"/>
+            </a:xfrm>
+            <a:prstGeom prst="rect">
+              <a:avLst/>
+            </a:prstGeom>
             <a:noFill/>
-          </a:ln>
-        </p:spPr>
-        <p:style>
-          <a:lnRef idx="2">
-            <a:schemeClr val="accent1">
-              <a:shade val="50000"/>
-            </a:schemeClr>
-          </a:lnRef>
-          <a:fillRef idx="1">
-            <a:schemeClr val="accent1"/>
-          </a:fillRef>
-          <a:effectRef idx="0">
-            <a:schemeClr val="accent1"/>
-          </a:effectRef>
-          <a:fontRef idx="minor">
-            <a:schemeClr val="lt1"/>
-          </a:fontRef>
-        </p:style>
-        <p:txBody>
-          <a:bodyPr rtlCol="0" anchor="ctr"/>
-          <a:lstStyle/>
-          <a:p>
-            <a:pPr algn="ctr"/>
-            <a:endParaRPr lang="en-US"/>
-          </a:p>
-        </p:txBody>
-      </p:sp>
-      <p:sp>
-        <p:nvSpPr>
-          <p:cNvPr id="7" name="TextBox 6"/>
-          <p:cNvSpPr txBox="1"/>
-          <p:nvPr/>
-        </p:nvSpPr>
-        <p:spPr>
-          <a:xfrm>
-            <a:off x="2807198" y="2694073"/>
-            <a:ext cx="487634" cy="369332"/>
-          </a:xfrm>
-          <a:prstGeom prst="rect">
-            <a:avLst/>
-          </a:prstGeom>
-          <a:noFill/>
-        </p:spPr>
-        <p:txBody>
-          <a:bodyPr wrap="none" rtlCol="0">
-            <a:spAutoFit/>
-          </a:bodyPr>
-          <a:lstStyle/>
-          <a:p>
-            <a:r>
-              <a:rPr lang="en-US" dirty="0"/>
-              <a:t>1 A</a:t>
-            </a:r>
-          </a:p>
-        </p:txBody>
-      </p:sp>
-      <p:pic>
-        <p:nvPicPr>
-          <p:cNvPr id="4" name="Picture 3"/>
-          <p:cNvPicPr>
-            <a:picLocks noChangeAspect="1"/>
-          </p:cNvPicPr>
-          <p:nvPr/>
-        </p:nvPicPr>
-        <p:blipFill>
-          <a:blip r:embed="rId2"/>
-          <a:stretch>
-            <a:fillRect/>
-          </a:stretch>
-        </p:blipFill>
-        <p:spPr>
-          <a:xfrm>
-            <a:off x="2175800" y="2568133"/>
-            <a:ext cx="631399" cy="621215"/>
-          </a:xfrm>
-          <a:prstGeom prst="rect">
-            <a:avLst/>
-          </a:prstGeom>
-        </p:spPr>
-      </p:pic>
-      <p:cxnSp>
-        <p:nvCxnSpPr>
-          <p:cNvPr id="5" name="Straight Connector 4"/>
-          <p:cNvCxnSpPr/>
-          <p:nvPr/>
-        </p:nvCxnSpPr>
-        <p:spPr>
-          <a:xfrm>
-            <a:off x="2491498" y="2298334"/>
-            <a:ext cx="0" cy="269799"/>
-          </a:xfrm>
-          <a:prstGeom prst="line">
-            <a:avLst/>
-          </a:prstGeom>
-          <a:ln w="38100">
-            <a:solidFill>
+          </p:spPr>
+          <p:txBody>
+            <a:bodyPr wrap="none" rtlCol="0">
+              <a:spAutoFit/>
+            </a:bodyPr>
+            <a:lstStyle/>
+            <a:p>
+              <a:r>
+                <a:rPr lang="en-US" dirty="0"/>
+                <a:t>1 A</a:t>
+              </a:r>
+            </a:p>
+          </p:txBody>
+        </p:sp>
+        <p:pic>
+          <p:nvPicPr>
+            <p:cNvPr id="4" name="Picture 3"/>
+            <p:cNvPicPr>
+              <a:picLocks noChangeAspect="1"/>
+            </p:cNvPicPr>
+            <p:nvPr/>
+          </p:nvPicPr>
+          <p:blipFill>
+            <a:blip r:embed="rId2"/>
+            <a:stretch>
+              <a:fillRect/>
+            </a:stretch>
+          </p:blipFill>
+          <p:spPr>
+            <a:xfrm>
+              <a:off x="2175800" y="2568133"/>
+              <a:ext cx="631399" cy="621215"/>
+            </a:xfrm>
+            <a:prstGeom prst="rect">
+              <a:avLst/>
+            </a:prstGeom>
+          </p:spPr>
+        </p:pic>
+        <p:cxnSp>
+          <p:nvCxnSpPr>
+            <p:cNvPr id="5" name="Straight Connector 4"/>
+            <p:cNvCxnSpPr/>
+            <p:nvPr/>
+          </p:nvCxnSpPr>
+          <p:spPr>
+            <a:xfrm>
+              <a:off x="2491498" y="2298334"/>
+              <a:ext cx="0" cy="269799"/>
+            </a:xfrm>
+            <a:prstGeom prst="line">
+              <a:avLst/>
+            </a:prstGeom>
+            <a:ln w="38100">
+              <a:solidFill>
+                <a:schemeClr val="tx1"/>
+              </a:solidFill>
+            </a:ln>
+          </p:spPr>
+          <p:style>
+            <a:lnRef idx="1">
+              <a:schemeClr val="accent1"/>
+            </a:lnRef>
+            <a:fillRef idx="0">
+              <a:schemeClr val="accent1"/>
+            </a:fillRef>
+            <a:effectRef idx="0">
+              <a:schemeClr val="accent1"/>
+            </a:effectRef>
+            <a:fontRef idx="minor">
               <a:schemeClr val="tx1"/>
-            </a:solidFill>
-          </a:ln>
-        </p:spPr>
-        <p:style>
-          <a:lnRef idx="1">
-            <a:schemeClr val="accent1"/>
-          </a:lnRef>
-          <a:fillRef idx="0">
-            <a:schemeClr val="accent1"/>
-          </a:fillRef>
-          <a:effectRef idx="0">
-            <a:schemeClr val="accent1"/>
-          </a:effectRef>
-          <a:fontRef idx="minor">
-            <a:schemeClr val="tx1"/>
-          </a:fontRef>
-        </p:style>
-      </p:cxnSp>
-      <p:cxnSp>
-        <p:nvCxnSpPr>
-          <p:cNvPr id="6" name="Straight Connector 5"/>
-          <p:cNvCxnSpPr/>
-          <p:nvPr/>
-        </p:nvCxnSpPr>
-        <p:spPr>
-          <a:xfrm>
-            <a:off x="2491498" y="3161067"/>
-            <a:ext cx="0" cy="269799"/>
-          </a:xfrm>
-          <a:prstGeom prst="line">
-            <a:avLst/>
-          </a:prstGeom>
-          <a:ln w="38100">
-            <a:solidFill>
+            </a:fontRef>
+          </p:style>
+        </p:cxnSp>
+        <p:cxnSp>
+          <p:nvCxnSpPr>
+            <p:cNvPr id="6" name="Straight Connector 5"/>
+            <p:cNvCxnSpPr/>
+            <p:nvPr/>
+          </p:nvCxnSpPr>
+          <p:spPr>
+            <a:xfrm>
+              <a:off x="2491498" y="3161067"/>
+              <a:ext cx="0" cy="269799"/>
+            </a:xfrm>
+            <a:prstGeom prst="line">
+              <a:avLst/>
+            </a:prstGeom>
+            <a:ln w="38100">
+              <a:solidFill>
+                <a:schemeClr val="tx1"/>
+              </a:solidFill>
+            </a:ln>
+          </p:spPr>
+          <p:style>
+            <a:lnRef idx="1">
+              <a:schemeClr val="accent1"/>
+            </a:lnRef>
+            <a:fillRef idx="0">
+              <a:schemeClr val="accent1"/>
+            </a:fillRef>
+            <a:effectRef idx="0">
+              <a:schemeClr val="accent1"/>
+            </a:effectRef>
+            <a:fontRef idx="minor">
               <a:schemeClr val="tx1"/>
-            </a:solidFill>
-          </a:ln>
-        </p:spPr>
-        <p:style>
-          <a:lnRef idx="1">
-            <a:schemeClr val="accent1"/>
-          </a:lnRef>
-          <a:fillRef idx="0">
-            <a:schemeClr val="accent1"/>
-          </a:fillRef>
-          <a:effectRef idx="0">
-            <a:schemeClr val="accent1"/>
-          </a:effectRef>
-          <a:fontRef idx="minor">
-            <a:schemeClr val="tx1"/>
-          </a:fontRef>
-        </p:style>
-      </p:cxnSp>
+            </a:fontRef>
+          </p:style>
+        </p:cxnSp>
+      </p:grpSp>
     </p:spTree>
     <p:extLst>
       <p:ext uri="{BB962C8B-B14F-4D97-AF65-F5344CB8AC3E}">
@@ -42238,6 +44495,13 @@
   <p:clrMapOvr>
     <a:masterClrMapping/>
   </p:clrMapOvr>
+  <p:timing>
+    <p:tnLst>
+      <p:par>
+        <p:cTn id="1" dur="indefinite" restart="never" nodeType="tmRoot"/>
+      </p:par>
+    </p:tnLst>
+  </p:timing>
 </p:sld>
 </file>
 

</xml_diff>